<commit_message>
Basic Layout + Design Elements
</commit_message>
<xml_diff>
--- a/Design.pptx
+++ b/Design.pptx
@@ -2,7 +2,7 @@
 <file path=ppt/presentation.xml><?xml version="1.0" encoding="utf-8"?>
 <p:presentation xmlns:a="http://schemas.openxmlformats.org/drawingml/2006/main" xmlns:r="http://schemas.openxmlformats.org/officeDocument/2006/relationships" xmlns:p="http://schemas.openxmlformats.org/presentationml/2006/main" saveSubsetFonts="1">
   <p:sldMasterIdLst>
-    <p:sldMasterId id="2147483648" r:id="rId1"/>
+    <p:sldMasterId id="2147483660" r:id="rId1"/>
   </p:sldMasterIdLst>
   <p:sldIdLst>
     <p:sldId id="256" r:id="rId2"/>
@@ -119,7 +119,7 @@
 </file>
 
 <file path=ppt/slideLayouts/slideLayout1.xml><?xml version="1.0" encoding="utf-8"?>
-<p:sldLayout xmlns:a="http://schemas.openxmlformats.org/drawingml/2006/main" xmlns:r="http://schemas.openxmlformats.org/officeDocument/2006/relationships" xmlns:p="http://schemas.openxmlformats.org/presentationml/2006/main" type="title" preserve="1">
+<p:sldLayout xmlns:a="http://schemas.openxmlformats.org/drawingml/2006/main" xmlns:r="http://schemas.openxmlformats.org/officeDocument/2006/relationships" xmlns:p="http://schemas.openxmlformats.org/presentationml/2006/main" showMasterSp="0" type="title" preserve="1">
   <p:cSld name="Title Slide">
     <p:spTree>
       <p:nvGrpSpPr>
@@ -135,6 +135,536 @@
           <a:chExt cx="0" cy="0"/>
         </a:xfrm>
       </p:grpSpPr>
+      <p:grpSp>
+        <p:nvGrpSpPr>
+          <p:cNvPr id="7" name="Group 6"/>
+          <p:cNvGrpSpPr/>
+          <p:nvPr/>
+        </p:nvGrpSpPr>
+        <p:grpSpPr>
+          <a:xfrm>
+            <a:off x="0" y="-8467"/>
+            <a:ext cx="12192000" cy="6866467"/>
+            <a:chOff x="0" y="-8467"/>
+            <a:chExt cx="12192000" cy="6866467"/>
+          </a:xfrm>
+        </p:grpSpPr>
+        <p:cxnSp>
+          <p:nvCxnSpPr>
+            <p:cNvPr id="32" name="Straight Connector 31"/>
+            <p:cNvCxnSpPr/>
+            <p:nvPr/>
+          </p:nvCxnSpPr>
+          <p:spPr>
+            <a:xfrm>
+              <a:off x="9371012" y="0"/>
+              <a:ext cx="1219200" cy="6858000"/>
+            </a:xfrm>
+            <a:prstGeom prst="line">
+              <a:avLst/>
+            </a:prstGeom>
+            <a:ln w="9525">
+              <a:solidFill>
+                <a:schemeClr val="bg1">
+                  <a:lumMod val="75000"/>
+                </a:schemeClr>
+              </a:solidFill>
+            </a:ln>
+          </p:spPr>
+          <p:style>
+            <a:lnRef idx="2">
+              <a:schemeClr val="accent1"/>
+            </a:lnRef>
+            <a:fillRef idx="0">
+              <a:schemeClr val="accent1"/>
+            </a:fillRef>
+            <a:effectRef idx="1">
+              <a:schemeClr val="accent1"/>
+            </a:effectRef>
+            <a:fontRef idx="minor">
+              <a:schemeClr val="tx1"/>
+            </a:fontRef>
+          </p:style>
+        </p:cxnSp>
+        <p:cxnSp>
+          <p:nvCxnSpPr>
+            <p:cNvPr id="21" name="Straight Connector 20"/>
+            <p:cNvCxnSpPr/>
+            <p:nvPr/>
+          </p:nvCxnSpPr>
+          <p:spPr>
+            <a:xfrm flipH="1">
+              <a:off x="7425267" y="3681413"/>
+              <a:ext cx="4763558" cy="3176587"/>
+            </a:xfrm>
+            <a:prstGeom prst="line">
+              <a:avLst/>
+            </a:prstGeom>
+            <a:ln w="9525">
+              <a:solidFill>
+                <a:schemeClr val="bg1">
+                  <a:lumMod val="85000"/>
+                </a:schemeClr>
+              </a:solidFill>
+            </a:ln>
+          </p:spPr>
+          <p:style>
+            <a:lnRef idx="2">
+              <a:schemeClr val="accent1"/>
+            </a:lnRef>
+            <a:fillRef idx="0">
+              <a:schemeClr val="accent1"/>
+            </a:fillRef>
+            <a:effectRef idx="1">
+              <a:schemeClr val="accent1"/>
+            </a:effectRef>
+            <a:fontRef idx="minor">
+              <a:schemeClr val="tx1"/>
+            </a:fontRef>
+          </p:style>
+        </p:cxnSp>
+        <p:sp>
+          <p:nvSpPr>
+            <p:cNvPr id="24" name="Rectangle 23"/>
+            <p:cNvSpPr/>
+            <p:nvPr/>
+          </p:nvSpPr>
+          <p:spPr>
+            <a:xfrm>
+              <a:off x="9181476" y="-8467"/>
+              <a:ext cx="3007349" cy="6866467"/>
+            </a:xfrm>
+            <a:custGeom>
+              <a:avLst/>
+              <a:gdLst/>
+              <a:ahLst/>
+              <a:cxnLst/>
+              <a:rect l="l" t="t" r="r" b="b"/>
+              <a:pathLst>
+                <a:path w="3007349" h="6866467">
+                  <a:moveTo>
+                    <a:pt x="2045532" y="0"/>
+                  </a:moveTo>
+                  <a:lnTo>
+                    <a:pt x="3007349" y="0"/>
+                  </a:lnTo>
+                  <a:lnTo>
+                    <a:pt x="3007349" y="6866467"/>
+                  </a:lnTo>
+                  <a:lnTo>
+                    <a:pt x="0" y="6866467"/>
+                  </a:lnTo>
+                  <a:lnTo>
+                    <a:pt x="2045532" y="0"/>
+                  </a:lnTo>
+                  <a:close/>
+                </a:path>
+              </a:pathLst>
+            </a:custGeom>
+            <a:solidFill>
+              <a:schemeClr val="accent1">
+                <a:alpha val="30000"/>
+              </a:schemeClr>
+            </a:solidFill>
+            <a:ln>
+              <a:noFill/>
+            </a:ln>
+            <a:effectLst/>
+          </p:spPr>
+          <p:style>
+            <a:lnRef idx="1">
+              <a:schemeClr val="accent1"/>
+            </a:lnRef>
+            <a:fillRef idx="3">
+              <a:schemeClr val="accent1"/>
+            </a:fillRef>
+            <a:effectRef idx="2">
+              <a:schemeClr val="accent1"/>
+            </a:effectRef>
+            <a:fontRef idx="minor">
+              <a:schemeClr val="lt1"/>
+            </a:fontRef>
+          </p:style>
+        </p:sp>
+        <p:sp>
+          <p:nvSpPr>
+            <p:cNvPr id="26" name="Rectangle 25"/>
+            <p:cNvSpPr/>
+            <p:nvPr/>
+          </p:nvSpPr>
+          <p:spPr>
+            <a:xfrm>
+              <a:off x="9603442" y="-8467"/>
+              <a:ext cx="2588558" cy="6866467"/>
+            </a:xfrm>
+            <a:custGeom>
+              <a:avLst/>
+              <a:gdLst/>
+              <a:ahLst/>
+              <a:cxnLst/>
+              <a:rect l="l" t="t" r="r" b="b"/>
+              <a:pathLst>
+                <a:path w="2573311" h="6866467">
+                  <a:moveTo>
+                    <a:pt x="0" y="0"/>
+                  </a:moveTo>
+                  <a:lnTo>
+                    <a:pt x="2573311" y="0"/>
+                  </a:lnTo>
+                  <a:lnTo>
+                    <a:pt x="2573311" y="6866467"/>
+                  </a:lnTo>
+                  <a:lnTo>
+                    <a:pt x="1202336" y="6866467"/>
+                  </a:lnTo>
+                  <a:lnTo>
+                    <a:pt x="0" y="0"/>
+                  </a:lnTo>
+                  <a:close/>
+                </a:path>
+              </a:pathLst>
+            </a:custGeom>
+            <a:solidFill>
+              <a:schemeClr val="accent1">
+                <a:alpha val="20000"/>
+              </a:schemeClr>
+            </a:solidFill>
+            <a:ln>
+              <a:noFill/>
+            </a:ln>
+            <a:effectLst/>
+          </p:spPr>
+          <p:style>
+            <a:lnRef idx="1">
+              <a:schemeClr val="accent1"/>
+            </a:lnRef>
+            <a:fillRef idx="3">
+              <a:schemeClr val="accent1"/>
+            </a:fillRef>
+            <a:effectRef idx="2">
+              <a:schemeClr val="accent1"/>
+            </a:effectRef>
+            <a:fontRef idx="minor">
+              <a:schemeClr val="lt1"/>
+            </a:fontRef>
+          </p:style>
+        </p:sp>
+        <p:sp>
+          <p:nvSpPr>
+            <p:cNvPr id="27" name="Isosceles Triangle 26"/>
+            <p:cNvSpPr/>
+            <p:nvPr/>
+          </p:nvSpPr>
+          <p:spPr>
+            <a:xfrm>
+              <a:off x="8932333" y="3048000"/>
+              <a:ext cx="3259667" cy="3810000"/>
+            </a:xfrm>
+            <a:prstGeom prst="triangle">
+              <a:avLst>
+                <a:gd name="adj" fmla="val 100000"/>
+              </a:avLst>
+            </a:prstGeom>
+            <a:solidFill>
+              <a:schemeClr val="accent2">
+                <a:alpha val="72000"/>
+              </a:schemeClr>
+            </a:solidFill>
+            <a:ln>
+              <a:noFill/>
+            </a:ln>
+            <a:effectLst/>
+          </p:spPr>
+          <p:style>
+            <a:lnRef idx="1">
+              <a:schemeClr val="accent1"/>
+            </a:lnRef>
+            <a:fillRef idx="3">
+              <a:schemeClr val="accent1"/>
+            </a:fillRef>
+            <a:effectRef idx="2">
+              <a:schemeClr val="accent1"/>
+            </a:effectRef>
+            <a:fontRef idx="minor">
+              <a:schemeClr val="lt1"/>
+            </a:fontRef>
+          </p:style>
+        </p:sp>
+        <p:sp>
+          <p:nvSpPr>
+            <p:cNvPr id="28" name="Rectangle 27"/>
+            <p:cNvSpPr/>
+            <p:nvPr/>
+          </p:nvSpPr>
+          <p:spPr>
+            <a:xfrm>
+              <a:off x="9334500" y="-8467"/>
+              <a:ext cx="2854326" cy="6866467"/>
+            </a:xfrm>
+            <a:custGeom>
+              <a:avLst/>
+              <a:gdLst/>
+              <a:ahLst/>
+              <a:cxnLst/>
+              <a:rect l="l" t="t" r="r" b="b"/>
+              <a:pathLst>
+                <a:path w="2858013" h="6866467">
+                  <a:moveTo>
+                    <a:pt x="0" y="0"/>
+                  </a:moveTo>
+                  <a:lnTo>
+                    <a:pt x="2858013" y="0"/>
+                  </a:lnTo>
+                  <a:lnTo>
+                    <a:pt x="2858013" y="6866467"/>
+                  </a:lnTo>
+                  <a:lnTo>
+                    <a:pt x="2473942" y="6866467"/>
+                  </a:lnTo>
+                  <a:lnTo>
+                    <a:pt x="0" y="0"/>
+                  </a:lnTo>
+                  <a:close/>
+                </a:path>
+              </a:pathLst>
+            </a:custGeom>
+            <a:solidFill>
+              <a:schemeClr val="accent2">
+                <a:lumMod val="75000"/>
+                <a:alpha val="70000"/>
+              </a:schemeClr>
+            </a:solidFill>
+            <a:ln>
+              <a:noFill/>
+            </a:ln>
+            <a:effectLst/>
+          </p:spPr>
+          <p:style>
+            <a:lnRef idx="1">
+              <a:schemeClr val="accent1"/>
+            </a:lnRef>
+            <a:fillRef idx="3">
+              <a:schemeClr val="accent1"/>
+            </a:fillRef>
+            <a:effectRef idx="2">
+              <a:schemeClr val="accent1"/>
+            </a:effectRef>
+            <a:fontRef idx="minor">
+              <a:schemeClr val="lt1"/>
+            </a:fontRef>
+          </p:style>
+        </p:sp>
+        <p:sp>
+          <p:nvSpPr>
+            <p:cNvPr id="29" name="Rectangle 28"/>
+            <p:cNvSpPr/>
+            <p:nvPr/>
+          </p:nvSpPr>
+          <p:spPr>
+            <a:xfrm>
+              <a:off x="10898730" y="-8467"/>
+              <a:ext cx="1290094" cy="6866467"/>
+            </a:xfrm>
+            <a:custGeom>
+              <a:avLst/>
+              <a:gdLst/>
+              <a:ahLst/>
+              <a:cxnLst/>
+              <a:rect l="l" t="t" r="r" b="b"/>
+              <a:pathLst>
+                <a:path w="1290094" h="6858000">
+                  <a:moveTo>
+                    <a:pt x="1019735" y="0"/>
+                  </a:moveTo>
+                  <a:lnTo>
+                    <a:pt x="1290094" y="0"/>
+                  </a:lnTo>
+                  <a:lnTo>
+                    <a:pt x="1290094" y="6858000"/>
+                  </a:lnTo>
+                  <a:lnTo>
+                    <a:pt x="0" y="6858000"/>
+                  </a:lnTo>
+                  <a:lnTo>
+                    <a:pt x="1019735" y="0"/>
+                  </a:lnTo>
+                  <a:close/>
+                </a:path>
+              </a:pathLst>
+            </a:custGeom>
+            <a:solidFill>
+              <a:schemeClr val="accent1">
+                <a:lumMod val="60000"/>
+                <a:lumOff val="40000"/>
+                <a:alpha val="70000"/>
+              </a:schemeClr>
+            </a:solidFill>
+            <a:ln>
+              <a:noFill/>
+            </a:ln>
+            <a:effectLst/>
+          </p:spPr>
+          <p:style>
+            <a:lnRef idx="1">
+              <a:schemeClr val="accent1"/>
+            </a:lnRef>
+            <a:fillRef idx="3">
+              <a:schemeClr val="accent1"/>
+            </a:fillRef>
+            <a:effectRef idx="2">
+              <a:schemeClr val="accent1"/>
+            </a:effectRef>
+            <a:fontRef idx="minor">
+              <a:schemeClr val="lt1"/>
+            </a:fontRef>
+          </p:style>
+        </p:sp>
+        <p:sp>
+          <p:nvSpPr>
+            <p:cNvPr id="30" name="Rectangle 29"/>
+            <p:cNvSpPr/>
+            <p:nvPr/>
+          </p:nvSpPr>
+          <p:spPr>
+            <a:xfrm>
+              <a:off x="10938999" y="-8467"/>
+              <a:ext cx="1249825" cy="6866467"/>
+            </a:xfrm>
+            <a:custGeom>
+              <a:avLst/>
+              <a:gdLst/>
+              <a:ahLst/>
+              <a:cxnLst/>
+              <a:rect l="l" t="t" r="r" b="b"/>
+              <a:pathLst>
+                <a:path w="1249825" h="6858000">
+                  <a:moveTo>
+                    <a:pt x="0" y="0"/>
+                  </a:moveTo>
+                  <a:lnTo>
+                    <a:pt x="1249825" y="0"/>
+                  </a:lnTo>
+                  <a:lnTo>
+                    <a:pt x="1249825" y="6858000"/>
+                  </a:lnTo>
+                  <a:lnTo>
+                    <a:pt x="1109382" y="6858000"/>
+                  </a:lnTo>
+                  <a:lnTo>
+                    <a:pt x="0" y="0"/>
+                  </a:lnTo>
+                  <a:close/>
+                </a:path>
+              </a:pathLst>
+            </a:custGeom>
+            <a:solidFill>
+              <a:schemeClr val="accent1">
+                <a:alpha val="65000"/>
+              </a:schemeClr>
+            </a:solidFill>
+            <a:ln>
+              <a:noFill/>
+            </a:ln>
+            <a:effectLst/>
+          </p:spPr>
+          <p:style>
+            <a:lnRef idx="1">
+              <a:schemeClr val="accent1"/>
+            </a:lnRef>
+            <a:fillRef idx="3">
+              <a:schemeClr val="accent1"/>
+            </a:fillRef>
+            <a:effectRef idx="2">
+              <a:schemeClr val="accent1"/>
+            </a:effectRef>
+            <a:fontRef idx="minor">
+              <a:schemeClr val="lt1"/>
+            </a:fontRef>
+          </p:style>
+        </p:sp>
+        <p:sp>
+          <p:nvSpPr>
+            <p:cNvPr id="31" name="Isosceles Triangle 30"/>
+            <p:cNvSpPr/>
+            <p:nvPr/>
+          </p:nvSpPr>
+          <p:spPr>
+            <a:xfrm>
+              <a:off x="10371666" y="3589867"/>
+              <a:ext cx="1817159" cy="3268133"/>
+            </a:xfrm>
+            <a:prstGeom prst="triangle">
+              <a:avLst>
+                <a:gd name="adj" fmla="val 100000"/>
+              </a:avLst>
+            </a:prstGeom>
+            <a:solidFill>
+              <a:schemeClr val="accent1">
+                <a:alpha val="80000"/>
+              </a:schemeClr>
+            </a:solidFill>
+            <a:ln>
+              <a:noFill/>
+            </a:ln>
+            <a:effectLst/>
+          </p:spPr>
+          <p:style>
+            <a:lnRef idx="1">
+              <a:schemeClr val="accent1"/>
+            </a:lnRef>
+            <a:fillRef idx="3">
+              <a:schemeClr val="accent1"/>
+            </a:fillRef>
+            <a:effectRef idx="2">
+              <a:schemeClr val="accent1"/>
+            </a:effectRef>
+            <a:fontRef idx="minor">
+              <a:schemeClr val="lt1"/>
+            </a:fontRef>
+          </p:style>
+        </p:sp>
+        <p:sp>
+          <p:nvSpPr>
+            <p:cNvPr id="19" name="Isosceles Triangle 18"/>
+            <p:cNvSpPr/>
+            <p:nvPr/>
+          </p:nvSpPr>
+          <p:spPr>
+            <a:xfrm rot="10800000">
+              <a:off x="0" y="0"/>
+              <a:ext cx="842596" cy="5666154"/>
+            </a:xfrm>
+            <a:prstGeom prst="triangle">
+              <a:avLst>
+                <a:gd name="adj" fmla="val 100000"/>
+              </a:avLst>
+            </a:prstGeom>
+            <a:solidFill>
+              <a:schemeClr val="accent1">
+                <a:alpha val="85000"/>
+              </a:schemeClr>
+            </a:solidFill>
+            <a:ln>
+              <a:noFill/>
+            </a:ln>
+            <a:effectLst/>
+          </p:spPr>
+          <p:style>
+            <a:lnRef idx="1">
+              <a:schemeClr val="accent1"/>
+            </a:lnRef>
+            <a:fillRef idx="3">
+              <a:schemeClr val="accent1"/>
+            </a:fillRef>
+            <a:effectRef idx="2">
+              <a:schemeClr val="accent1"/>
+            </a:effectRef>
+            <a:fontRef idx="minor">
+              <a:schemeClr val="lt1"/>
+            </a:fontRef>
+          </p:style>
+        </p:sp>
+      </p:grpSp>
       <p:sp>
         <p:nvSpPr>
           <p:cNvPr id="2" name="Title 1"/>
@@ -147,15 +677,21 @@
         </p:nvSpPr>
         <p:spPr>
           <a:xfrm>
-            <a:off x="1524000" y="1122363"/>
-            <a:ext cx="9144000" cy="2387600"/>
+            <a:off x="1507067" y="2404534"/>
+            <a:ext cx="7766936" cy="1646302"/>
           </a:xfrm>
         </p:spPr>
         <p:txBody>
-          <a:bodyPr anchor="b"/>
+          <a:bodyPr anchor="b">
+            <a:noAutofit/>
+          </a:bodyPr>
           <a:lstStyle>
-            <a:lvl1pPr algn="ctr">
-              <a:defRPr sz="6000"/>
+            <a:lvl1pPr algn="r">
+              <a:defRPr sz="5400">
+                <a:solidFill>
+                  <a:schemeClr val="accent1"/>
+                </a:solidFill>
+              </a:defRPr>
             </a:lvl1pPr>
           </a:lstStyle>
           <a:p>
@@ -163,7 +699,7 @@
               <a:rPr lang="en-US" smtClean="0"/>
               <a:t>Click to edit Master title style</a:t>
             </a:r>
-            <a:endParaRPr lang="en-GB"/>
+            <a:endParaRPr lang="en-US" dirty="0"/>
           </a:p>
         </p:txBody>
       </p:sp>
@@ -179,48 +715,103 @@
         </p:nvSpPr>
         <p:spPr>
           <a:xfrm>
-            <a:off x="1524000" y="3602038"/>
-            <a:ext cx="9144000" cy="1655762"/>
+            <a:off x="1507067" y="4050833"/>
+            <a:ext cx="7766936" cy="1096899"/>
           </a:xfrm>
         </p:spPr>
         <p:txBody>
-          <a:bodyPr/>
+          <a:bodyPr anchor="t"/>
           <a:lstStyle>
-            <a:lvl1pPr marL="0" indent="0" algn="ctr">
-              <a:buNone/>
-              <a:defRPr sz="2400"/>
+            <a:lvl1pPr marL="0" indent="0" algn="r">
+              <a:buNone/>
+              <a:defRPr>
+                <a:solidFill>
+                  <a:schemeClr val="tx1">
+                    <a:lumMod val="50000"/>
+                    <a:lumOff val="50000"/>
+                  </a:schemeClr>
+                </a:solidFill>
+              </a:defRPr>
             </a:lvl1pPr>
             <a:lvl2pPr marL="457200" indent="0" algn="ctr">
               <a:buNone/>
-              <a:defRPr sz="2000"/>
+              <a:defRPr>
+                <a:solidFill>
+                  <a:schemeClr val="tx1">
+                    <a:tint val="75000"/>
+                  </a:schemeClr>
+                </a:solidFill>
+              </a:defRPr>
             </a:lvl2pPr>
             <a:lvl3pPr marL="914400" indent="0" algn="ctr">
               <a:buNone/>
-              <a:defRPr sz="1800"/>
+              <a:defRPr>
+                <a:solidFill>
+                  <a:schemeClr val="tx1">
+                    <a:tint val="75000"/>
+                  </a:schemeClr>
+                </a:solidFill>
+              </a:defRPr>
             </a:lvl3pPr>
             <a:lvl4pPr marL="1371600" indent="0" algn="ctr">
               <a:buNone/>
-              <a:defRPr sz="1600"/>
+              <a:defRPr>
+                <a:solidFill>
+                  <a:schemeClr val="tx1">
+                    <a:tint val="75000"/>
+                  </a:schemeClr>
+                </a:solidFill>
+              </a:defRPr>
             </a:lvl4pPr>
             <a:lvl5pPr marL="1828800" indent="0" algn="ctr">
               <a:buNone/>
-              <a:defRPr sz="1600"/>
+              <a:defRPr>
+                <a:solidFill>
+                  <a:schemeClr val="tx1">
+                    <a:tint val="75000"/>
+                  </a:schemeClr>
+                </a:solidFill>
+              </a:defRPr>
             </a:lvl5pPr>
             <a:lvl6pPr marL="2286000" indent="0" algn="ctr">
               <a:buNone/>
-              <a:defRPr sz="1600"/>
+              <a:defRPr>
+                <a:solidFill>
+                  <a:schemeClr val="tx1">
+                    <a:tint val="75000"/>
+                  </a:schemeClr>
+                </a:solidFill>
+              </a:defRPr>
             </a:lvl6pPr>
             <a:lvl7pPr marL="2743200" indent="0" algn="ctr">
               <a:buNone/>
-              <a:defRPr sz="1600"/>
+              <a:defRPr>
+                <a:solidFill>
+                  <a:schemeClr val="tx1">
+                    <a:tint val="75000"/>
+                  </a:schemeClr>
+                </a:solidFill>
+              </a:defRPr>
             </a:lvl7pPr>
             <a:lvl8pPr marL="3200400" indent="0" algn="ctr">
               <a:buNone/>
-              <a:defRPr sz="1600"/>
+              <a:defRPr>
+                <a:solidFill>
+                  <a:schemeClr val="tx1">
+                    <a:tint val="75000"/>
+                  </a:schemeClr>
+                </a:solidFill>
+              </a:defRPr>
             </a:lvl8pPr>
             <a:lvl9pPr marL="3657600" indent="0" algn="ctr">
               <a:buNone/>
-              <a:defRPr sz="1600"/>
+              <a:defRPr>
+                <a:solidFill>
+                  <a:schemeClr val="tx1">
+                    <a:tint val="75000"/>
+                  </a:schemeClr>
+                </a:solidFill>
+              </a:defRPr>
             </a:lvl9pPr>
           </a:lstStyle>
           <a:p>
@@ -228,7 +819,7 @@
               <a:rPr lang="en-US" smtClean="0"/>
               <a:t>Click to edit Master subtitle style</a:t>
             </a:r>
-            <a:endParaRPr lang="en-GB"/>
+            <a:endParaRPr lang="en-US" dirty="0"/>
           </a:p>
         </p:txBody>
       </p:sp>
@@ -300,7 +891,7 @@
     </p:spTree>
     <p:extLst>
       <p:ext uri="{BB962C8B-B14F-4D97-AF65-F5344CB8AC3E}">
-        <p14:creationId xmlns:p14="http://schemas.microsoft.com/office/powerpoint/2010/main" val="4079061467"/>
+        <p14:creationId xmlns:p14="http://schemas.microsoft.com/office/powerpoint/2010/main" val="1058188321"/>
       </p:ext>
     </p:extLst>
   </p:cSld>
@@ -311,6 +902,1619 @@
 </file>
 
 <file path=ppt/slideLayouts/slideLayout10.xml><?xml version="1.0" encoding="utf-8"?>
+<p:sldLayout xmlns:a="http://schemas.openxmlformats.org/drawingml/2006/main" xmlns:r="http://schemas.openxmlformats.org/officeDocument/2006/relationships" xmlns:p="http://schemas.openxmlformats.org/presentationml/2006/main" preserve="1">
+  <p:cSld name="Title and Caption">
+    <p:spTree>
+      <p:nvGrpSpPr>
+        <p:cNvPr id="1" name=""/>
+        <p:cNvGrpSpPr/>
+        <p:nvPr/>
+      </p:nvGrpSpPr>
+      <p:grpSpPr>
+        <a:xfrm>
+          <a:off x="0" y="0"/>
+          <a:ext cx="0" cy="0"/>
+          <a:chOff x="0" y="0"/>
+          <a:chExt cx="0" cy="0"/>
+        </a:xfrm>
+      </p:grpSpPr>
+      <p:sp>
+        <p:nvSpPr>
+          <p:cNvPr id="2" name="Title 1"/>
+          <p:cNvSpPr>
+            <a:spLocks noGrp="1"/>
+          </p:cNvSpPr>
+          <p:nvPr>
+            <p:ph type="title"/>
+          </p:nvPr>
+        </p:nvSpPr>
+        <p:spPr>
+          <a:xfrm>
+            <a:off x="677335" y="609600"/>
+            <a:ext cx="8596668" cy="3403600"/>
+          </a:xfrm>
+        </p:spPr>
+        <p:txBody>
+          <a:bodyPr anchor="ctr">
+            <a:normAutofit/>
+          </a:bodyPr>
+          <a:lstStyle>
+            <a:lvl1pPr algn="l">
+              <a:defRPr sz="4400" b="0" cap="none"/>
+            </a:lvl1pPr>
+          </a:lstStyle>
+          <a:p>
+            <a:r>
+              <a:rPr lang="en-US" smtClean="0"/>
+              <a:t>Click to edit Master title style</a:t>
+            </a:r>
+            <a:endParaRPr lang="en-US" dirty="0"/>
+          </a:p>
+        </p:txBody>
+      </p:sp>
+      <p:sp>
+        <p:nvSpPr>
+          <p:cNvPr id="3" name="Text Placeholder 2"/>
+          <p:cNvSpPr>
+            <a:spLocks noGrp="1"/>
+          </p:cNvSpPr>
+          <p:nvPr>
+            <p:ph type="body" idx="1"/>
+          </p:nvPr>
+        </p:nvSpPr>
+        <p:spPr>
+          <a:xfrm>
+            <a:off x="677335" y="4470400"/>
+            <a:ext cx="8596668" cy="1570962"/>
+          </a:xfrm>
+        </p:spPr>
+        <p:txBody>
+          <a:bodyPr anchor="ctr">
+            <a:normAutofit/>
+          </a:bodyPr>
+          <a:lstStyle>
+            <a:lvl1pPr marL="0" indent="0" algn="l">
+              <a:buNone/>
+              <a:defRPr sz="1800">
+                <a:solidFill>
+                  <a:schemeClr val="tx1">
+                    <a:lumMod val="75000"/>
+                    <a:lumOff val="25000"/>
+                  </a:schemeClr>
+                </a:solidFill>
+              </a:defRPr>
+            </a:lvl1pPr>
+            <a:lvl2pPr marL="457200" indent="0">
+              <a:buNone/>
+              <a:defRPr sz="1800">
+                <a:solidFill>
+                  <a:schemeClr val="tx1">
+                    <a:tint val="75000"/>
+                  </a:schemeClr>
+                </a:solidFill>
+              </a:defRPr>
+            </a:lvl2pPr>
+            <a:lvl3pPr marL="914400" indent="0">
+              <a:buNone/>
+              <a:defRPr sz="1600">
+                <a:solidFill>
+                  <a:schemeClr val="tx1">
+                    <a:tint val="75000"/>
+                  </a:schemeClr>
+                </a:solidFill>
+              </a:defRPr>
+            </a:lvl3pPr>
+            <a:lvl4pPr marL="1371600" indent="0">
+              <a:buNone/>
+              <a:defRPr sz="1400">
+                <a:solidFill>
+                  <a:schemeClr val="tx1">
+                    <a:tint val="75000"/>
+                  </a:schemeClr>
+                </a:solidFill>
+              </a:defRPr>
+            </a:lvl4pPr>
+            <a:lvl5pPr marL="1828800" indent="0">
+              <a:buNone/>
+              <a:defRPr sz="1400">
+                <a:solidFill>
+                  <a:schemeClr val="tx1">
+                    <a:tint val="75000"/>
+                  </a:schemeClr>
+                </a:solidFill>
+              </a:defRPr>
+            </a:lvl5pPr>
+            <a:lvl6pPr marL="2286000" indent="0">
+              <a:buNone/>
+              <a:defRPr sz="1400">
+                <a:solidFill>
+                  <a:schemeClr val="tx1">
+                    <a:tint val="75000"/>
+                  </a:schemeClr>
+                </a:solidFill>
+              </a:defRPr>
+            </a:lvl6pPr>
+            <a:lvl7pPr marL="2743200" indent="0">
+              <a:buNone/>
+              <a:defRPr sz="1400">
+                <a:solidFill>
+                  <a:schemeClr val="tx1">
+                    <a:tint val="75000"/>
+                  </a:schemeClr>
+                </a:solidFill>
+              </a:defRPr>
+            </a:lvl7pPr>
+            <a:lvl8pPr marL="3200400" indent="0">
+              <a:buNone/>
+              <a:defRPr sz="1400">
+                <a:solidFill>
+                  <a:schemeClr val="tx1">
+                    <a:tint val="75000"/>
+                  </a:schemeClr>
+                </a:solidFill>
+              </a:defRPr>
+            </a:lvl8pPr>
+            <a:lvl9pPr marL="3657600" indent="0">
+              <a:buNone/>
+              <a:defRPr sz="1400">
+                <a:solidFill>
+                  <a:schemeClr val="tx1">
+                    <a:tint val="75000"/>
+                  </a:schemeClr>
+                </a:solidFill>
+              </a:defRPr>
+            </a:lvl9pPr>
+          </a:lstStyle>
+          <a:p>
+            <a:pPr lvl="0"/>
+            <a:r>
+              <a:rPr lang="en-US" smtClean="0"/>
+              <a:t>Click to edit Master text styles</a:t>
+            </a:r>
+          </a:p>
+        </p:txBody>
+      </p:sp>
+      <p:sp>
+        <p:nvSpPr>
+          <p:cNvPr id="4" name="Date Placeholder 3"/>
+          <p:cNvSpPr>
+            <a:spLocks noGrp="1"/>
+          </p:cNvSpPr>
+          <p:nvPr>
+            <p:ph type="dt" sz="half" idx="10"/>
+          </p:nvPr>
+        </p:nvSpPr>
+        <p:spPr/>
+        <p:txBody>
+          <a:bodyPr/>
+          <a:lstStyle/>
+          <a:p>
+            <a:fld id="{30CB22A9-0E83-4290-85DE-03AE20A6F059}" type="datetimeFigureOut">
+              <a:rPr lang="en-GB" smtClean="0"/>
+              <a:t>05/11/2016</a:t>
+            </a:fld>
+            <a:endParaRPr lang="en-GB"/>
+          </a:p>
+        </p:txBody>
+      </p:sp>
+      <p:sp>
+        <p:nvSpPr>
+          <p:cNvPr id="5" name="Footer Placeholder 4"/>
+          <p:cNvSpPr>
+            <a:spLocks noGrp="1"/>
+          </p:cNvSpPr>
+          <p:nvPr>
+            <p:ph type="ftr" sz="quarter" idx="11"/>
+          </p:nvPr>
+        </p:nvSpPr>
+        <p:spPr/>
+        <p:txBody>
+          <a:bodyPr/>
+          <a:lstStyle/>
+          <a:p>
+            <a:endParaRPr lang="en-GB"/>
+          </a:p>
+        </p:txBody>
+      </p:sp>
+      <p:sp>
+        <p:nvSpPr>
+          <p:cNvPr id="6" name="Slide Number Placeholder 5"/>
+          <p:cNvSpPr>
+            <a:spLocks noGrp="1"/>
+          </p:cNvSpPr>
+          <p:nvPr>
+            <p:ph type="sldNum" sz="quarter" idx="12"/>
+          </p:nvPr>
+        </p:nvSpPr>
+        <p:spPr/>
+        <p:txBody>
+          <a:bodyPr/>
+          <a:lstStyle/>
+          <a:p>
+            <a:fld id="{7133BBC1-3CC6-43D4-945E-840ED53B7DD3}" type="slidenum">
+              <a:rPr lang="en-GB" smtClean="0"/>
+              <a:t>‹#›</a:t>
+            </a:fld>
+            <a:endParaRPr lang="en-GB"/>
+          </a:p>
+        </p:txBody>
+      </p:sp>
+    </p:spTree>
+    <p:extLst>
+      <p:ext uri="{BB962C8B-B14F-4D97-AF65-F5344CB8AC3E}">
+        <p14:creationId xmlns:p14="http://schemas.microsoft.com/office/powerpoint/2010/main" val="2259918032"/>
+      </p:ext>
+    </p:extLst>
+  </p:cSld>
+  <p:clrMapOvr>
+    <a:masterClrMapping/>
+  </p:clrMapOvr>
+</p:sldLayout>
+</file>
+
+<file path=ppt/slideLayouts/slideLayout11.xml><?xml version="1.0" encoding="utf-8"?>
+<p:sldLayout xmlns:a="http://schemas.openxmlformats.org/drawingml/2006/main" xmlns:r="http://schemas.openxmlformats.org/officeDocument/2006/relationships" xmlns:p="http://schemas.openxmlformats.org/presentationml/2006/main" preserve="1">
+  <p:cSld name="Quote with Caption">
+    <p:spTree>
+      <p:nvGrpSpPr>
+        <p:cNvPr id="1" name=""/>
+        <p:cNvGrpSpPr/>
+        <p:nvPr/>
+      </p:nvGrpSpPr>
+      <p:grpSpPr>
+        <a:xfrm>
+          <a:off x="0" y="0"/>
+          <a:ext cx="0" cy="0"/>
+          <a:chOff x="0" y="0"/>
+          <a:chExt cx="0" cy="0"/>
+        </a:xfrm>
+      </p:grpSpPr>
+      <p:sp>
+        <p:nvSpPr>
+          <p:cNvPr id="2" name="Title 1"/>
+          <p:cNvSpPr>
+            <a:spLocks noGrp="1"/>
+          </p:cNvSpPr>
+          <p:nvPr>
+            <p:ph type="title"/>
+          </p:nvPr>
+        </p:nvSpPr>
+        <p:spPr>
+          <a:xfrm>
+            <a:off x="931334" y="609600"/>
+            <a:ext cx="8094134" cy="3022600"/>
+          </a:xfrm>
+        </p:spPr>
+        <p:txBody>
+          <a:bodyPr anchor="ctr">
+            <a:normAutofit/>
+          </a:bodyPr>
+          <a:lstStyle>
+            <a:lvl1pPr algn="l">
+              <a:defRPr sz="4400" b="0" cap="none"/>
+            </a:lvl1pPr>
+          </a:lstStyle>
+          <a:p>
+            <a:r>
+              <a:rPr lang="en-US" smtClean="0"/>
+              <a:t>Click to edit Master title style</a:t>
+            </a:r>
+            <a:endParaRPr lang="en-US" dirty="0"/>
+          </a:p>
+        </p:txBody>
+      </p:sp>
+      <p:sp>
+        <p:nvSpPr>
+          <p:cNvPr id="23" name="Text Placeholder 9"/>
+          <p:cNvSpPr>
+            <a:spLocks noGrp="1"/>
+          </p:cNvSpPr>
+          <p:nvPr>
+            <p:ph type="body" sz="quarter" idx="13"/>
+          </p:nvPr>
+        </p:nvSpPr>
+        <p:spPr>
+          <a:xfrm>
+            <a:off x="1366139" y="3632200"/>
+            <a:ext cx="7224524" cy="381000"/>
+          </a:xfrm>
+        </p:spPr>
+        <p:txBody>
+          <a:bodyPr anchor="ctr">
+            <a:noAutofit/>
+          </a:bodyPr>
+          <a:lstStyle>
+            <a:lvl1pPr marL="0" indent="0">
+              <a:buFontTx/>
+              <a:buNone/>
+              <a:defRPr sz="1600">
+                <a:solidFill>
+                  <a:schemeClr val="tx1">
+                    <a:lumMod val="50000"/>
+                    <a:lumOff val="50000"/>
+                  </a:schemeClr>
+                </a:solidFill>
+              </a:defRPr>
+            </a:lvl1pPr>
+            <a:lvl2pPr marL="457200" indent="0">
+              <a:buFontTx/>
+              <a:buNone/>
+              <a:defRPr/>
+            </a:lvl2pPr>
+            <a:lvl3pPr marL="914400" indent="0">
+              <a:buFontTx/>
+              <a:buNone/>
+              <a:defRPr/>
+            </a:lvl3pPr>
+            <a:lvl4pPr marL="1371600" indent="0">
+              <a:buFontTx/>
+              <a:buNone/>
+              <a:defRPr/>
+            </a:lvl4pPr>
+            <a:lvl5pPr marL="1828800" indent="0">
+              <a:buFontTx/>
+              <a:buNone/>
+              <a:defRPr/>
+            </a:lvl5pPr>
+          </a:lstStyle>
+          <a:p>
+            <a:pPr lvl="0"/>
+            <a:r>
+              <a:rPr lang="en-US" smtClean="0"/>
+              <a:t>Click to edit Master text styles</a:t>
+            </a:r>
+          </a:p>
+        </p:txBody>
+      </p:sp>
+      <p:sp>
+        <p:nvSpPr>
+          <p:cNvPr id="3" name="Text Placeholder 2"/>
+          <p:cNvSpPr>
+            <a:spLocks noGrp="1"/>
+          </p:cNvSpPr>
+          <p:nvPr>
+            <p:ph type="body" idx="1"/>
+          </p:nvPr>
+        </p:nvSpPr>
+        <p:spPr>
+          <a:xfrm>
+            <a:off x="677335" y="4470400"/>
+            <a:ext cx="8596668" cy="1570962"/>
+          </a:xfrm>
+        </p:spPr>
+        <p:txBody>
+          <a:bodyPr anchor="ctr">
+            <a:normAutofit/>
+          </a:bodyPr>
+          <a:lstStyle>
+            <a:lvl1pPr marL="0" indent="0" algn="l">
+              <a:buNone/>
+              <a:defRPr sz="1800">
+                <a:solidFill>
+                  <a:schemeClr val="tx1">
+                    <a:lumMod val="75000"/>
+                    <a:lumOff val="25000"/>
+                  </a:schemeClr>
+                </a:solidFill>
+              </a:defRPr>
+            </a:lvl1pPr>
+            <a:lvl2pPr marL="457200" indent="0">
+              <a:buNone/>
+              <a:defRPr sz="1800">
+                <a:solidFill>
+                  <a:schemeClr val="tx1">
+                    <a:tint val="75000"/>
+                  </a:schemeClr>
+                </a:solidFill>
+              </a:defRPr>
+            </a:lvl2pPr>
+            <a:lvl3pPr marL="914400" indent="0">
+              <a:buNone/>
+              <a:defRPr sz="1600">
+                <a:solidFill>
+                  <a:schemeClr val="tx1">
+                    <a:tint val="75000"/>
+                  </a:schemeClr>
+                </a:solidFill>
+              </a:defRPr>
+            </a:lvl3pPr>
+            <a:lvl4pPr marL="1371600" indent="0">
+              <a:buNone/>
+              <a:defRPr sz="1400">
+                <a:solidFill>
+                  <a:schemeClr val="tx1">
+                    <a:tint val="75000"/>
+                  </a:schemeClr>
+                </a:solidFill>
+              </a:defRPr>
+            </a:lvl4pPr>
+            <a:lvl5pPr marL="1828800" indent="0">
+              <a:buNone/>
+              <a:defRPr sz="1400">
+                <a:solidFill>
+                  <a:schemeClr val="tx1">
+                    <a:tint val="75000"/>
+                  </a:schemeClr>
+                </a:solidFill>
+              </a:defRPr>
+            </a:lvl5pPr>
+            <a:lvl6pPr marL="2286000" indent="0">
+              <a:buNone/>
+              <a:defRPr sz="1400">
+                <a:solidFill>
+                  <a:schemeClr val="tx1">
+                    <a:tint val="75000"/>
+                  </a:schemeClr>
+                </a:solidFill>
+              </a:defRPr>
+            </a:lvl6pPr>
+            <a:lvl7pPr marL="2743200" indent="0">
+              <a:buNone/>
+              <a:defRPr sz="1400">
+                <a:solidFill>
+                  <a:schemeClr val="tx1">
+                    <a:tint val="75000"/>
+                  </a:schemeClr>
+                </a:solidFill>
+              </a:defRPr>
+            </a:lvl7pPr>
+            <a:lvl8pPr marL="3200400" indent="0">
+              <a:buNone/>
+              <a:defRPr sz="1400">
+                <a:solidFill>
+                  <a:schemeClr val="tx1">
+                    <a:tint val="75000"/>
+                  </a:schemeClr>
+                </a:solidFill>
+              </a:defRPr>
+            </a:lvl8pPr>
+            <a:lvl9pPr marL="3657600" indent="0">
+              <a:buNone/>
+              <a:defRPr sz="1400">
+                <a:solidFill>
+                  <a:schemeClr val="tx1">
+                    <a:tint val="75000"/>
+                  </a:schemeClr>
+                </a:solidFill>
+              </a:defRPr>
+            </a:lvl9pPr>
+          </a:lstStyle>
+          <a:p>
+            <a:pPr lvl="0"/>
+            <a:r>
+              <a:rPr lang="en-US" smtClean="0"/>
+              <a:t>Click to edit Master text styles</a:t>
+            </a:r>
+          </a:p>
+        </p:txBody>
+      </p:sp>
+      <p:sp>
+        <p:nvSpPr>
+          <p:cNvPr id="4" name="Date Placeholder 3"/>
+          <p:cNvSpPr>
+            <a:spLocks noGrp="1"/>
+          </p:cNvSpPr>
+          <p:nvPr>
+            <p:ph type="dt" sz="half" idx="10"/>
+          </p:nvPr>
+        </p:nvSpPr>
+        <p:spPr/>
+        <p:txBody>
+          <a:bodyPr/>
+          <a:lstStyle/>
+          <a:p>
+            <a:fld id="{30CB22A9-0E83-4290-85DE-03AE20A6F059}" type="datetimeFigureOut">
+              <a:rPr lang="en-GB" smtClean="0"/>
+              <a:t>05/11/2016</a:t>
+            </a:fld>
+            <a:endParaRPr lang="en-GB"/>
+          </a:p>
+        </p:txBody>
+      </p:sp>
+      <p:sp>
+        <p:nvSpPr>
+          <p:cNvPr id="5" name="Footer Placeholder 4"/>
+          <p:cNvSpPr>
+            <a:spLocks noGrp="1"/>
+          </p:cNvSpPr>
+          <p:nvPr>
+            <p:ph type="ftr" sz="quarter" idx="11"/>
+          </p:nvPr>
+        </p:nvSpPr>
+        <p:spPr/>
+        <p:txBody>
+          <a:bodyPr/>
+          <a:lstStyle/>
+          <a:p>
+            <a:endParaRPr lang="en-GB"/>
+          </a:p>
+        </p:txBody>
+      </p:sp>
+      <p:sp>
+        <p:nvSpPr>
+          <p:cNvPr id="6" name="Slide Number Placeholder 5"/>
+          <p:cNvSpPr>
+            <a:spLocks noGrp="1"/>
+          </p:cNvSpPr>
+          <p:nvPr>
+            <p:ph type="sldNum" sz="quarter" idx="12"/>
+          </p:nvPr>
+        </p:nvSpPr>
+        <p:spPr/>
+        <p:txBody>
+          <a:bodyPr/>
+          <a:lstStyle/>
+          <a:p>
+            <a:fld id="{7133BBC1-3CC6-43D4-945E-840ED53B7DD3}" type="slidenum">
+              <a:rPr lang="en-GB" smtClean="0"/>
+              <a:t>‹#›</a:t>
+            </a:fld>
+            <a:endParaRPr lang="en-GB"/>
+          </a:p>
+        </p:txBody>
+      </p:sp>
+      <p:sp>
+        <p:nvSpPr>
+          <p:cNvPr id="20" name="TextBox 19"/>
+          <p:cNvSpPr txBox="1"/>
+          <p:nvPr/>
+        </p:nvSpPr>
+        <p:spPr>
+          <a:xfrm>
+            <a:off x="541870" y="790378"/>
+            <a:ext cx="609600" cy="584776"/>
+          </a:xfrm>
+          <a:prstGeom prst="rect">
+            <a:avLst/>
+          </a:prstGeom>
+        </p:spPr>
+        <p:txBody>
+          <a:bodyPr vert="horz" lIns="91440" tIns="45720" rIns="91440" bIns="45720" rtlCol="0" anchor="ctr">
+            <a:noAutofit/>
+          </a:bodyPr>
+          <a:lstStyle/>
+          <a:p>
+            <a:pPr lvl="0"/>
+            <a:r>
+              <a:rPr lang="en-US" sz="8000" baseline="0" dirty="0">
+                <a:ln w="3175" cmpd="sng">
+                  <a:noFill/>
+                </a:ln>
+                <a:solidFill>
+                  <a:schemeClr val="accent1">
+                    <a:lumMod val="60000"/>
+                    <a:lumOff val="40000"/>
+                  </a:schemeClr>
+                </a:solidFill>
+                <a:effectLst/>
+                <a:latin typeface="Arial"/>
+              </a:rPr>
+              <a:t>“</a:t>
+            </a:r>
+          </a:p>
+        </p:txBody>
+      </p:sp>
+      <p:sp>
+        <p:nvSpPr>
+          <p:cNvPr id="22" name="TextBox 21"/>
+          <p:cNvSpPr txBox="1"/>
+          <p:nvPr/>
+        </p:nvSpPr>
+        <p:spPr>
+          <a:xfrm>
+            <a:off x="8893011" y="2886556"/>
+            <a:ext cx="609600" cy="584776"/>
+          </a:xfrm>
+          <a:prstGeom prst="rect">
+            <a:avLst/>
+          </a:prstGeom>
+        </p:spPr>
+        <p:txBody>
+          <a:bodyPr vert="horz" lIns="91440" tIns="45720" rIns="91440" bIns="45720" rtlCol="0" anchor="ctr">
+            <a:noAutofit/>
+          </a:bodyPr>
+          <a:lstStyle/>
+          <a:p>
+            <a:pPr lvl="0"/>
+            <a:r>
+              <a:rPr lang="en-US" sz="8000" baseline="0" dirty="0">
+                <a:ln w="3175" cmpd="sng">
+                  <a:noFill/>
+                </a:ln>
+                <a:solidFill>
+                  <a:schemeClr val="accent1">
+                    <a:lumMod val="60000"/>
+                    <a:lumOff val="40000"/>
+                  </a:schemeClr>
+                </a:solidFill>
+                <a:latin typeface="Arial"/>
+              </a:rPr>
+              <a:t>”</a:t>
+            </a:r>
+            <a:endParaRPr lang="en-US" dirty="0">
+              <a:solidFill>
+                <a:schemeClr val="accent1">
+                  <a:lumMod val="60000"/>
+                  <a:lumOff val="40000"/>
+                </a:schemeClr>
+              </a:solidFill>
+              <a:latin typeface="Arial"/>
+            </a:endParaRPr>
+          </a:p>
+        </p:txBody>
+      </p:sp>
+    </p:spTree>
+    <p:extLst>
+      <p:ext uri="{BB962C8B-B14F-4D97-AF65-F5344CB8AC3E}">
+        <p14:creationId xmlns:p14="http://schemas.microsoft.com/office/powerpoint/2010/main" val="1621739893"/>
+      </p:ext>
+    </p:extLst>
+  </p:cSld>
+  <p:clrMapOvr>
+    <a:masterClrMapping/>
+  </p:clrMapOvr>
+</p:sldLayout>
+</file>
+
+<file path=ppt/slideLayouts/slideLayout12.xml><?xml version="1.0" encoding="utf-8"?>
+<p:sldLayout xmlns:a="http://schemas.openxmlformats.org/drawingml/2006/main" xmlns:r="http://schemas.openxmlformats.org/officeDocument/2006/relationships" xmlns:p="http://schemas.openxmlformats.org/presentationml/2006/main" preserve="1">
+  <p:cSld name="Name Card">
+    <p:spTree>
+      <p:nvGrpSpPr>
+        <p:cNvPr id="1" name=""/>
+        <p:cNvGrpSpPr/>
+        <p:nvPr/>
+      </p:nvGrpSpPr>
+      <p:grpSpPr>
+        <a:xfrm>
+          <a:off x="0" y="0"/>
+          <a:ext cx="0" cy="0"/>
+          <a:chOff x="0" y="0"/>
+          <a:chExt cx="0" cy="0"/>
+        </a:xfrm>
+      </p:grpSpPr>
+      <p:sp>
+        <p:nvSpPr>
+          <p:cNvPr id="2" name="Title 1"/>
+          <p:cNvSpPr>
+            <a:spLocks noGrp="1"/>
+          </p:cNvSpPr>
+          <p:nvPr>
+            <p:ph type="title"/>
+          </p:nvPr>
+        </p:nvSpPr>
+        <p:spPr>
+          <a:xfrm>
+            <a:off x="677335" y="1931988"/>
+            <a:ext cx="8596668" cy="2595460"/>
+          </a:xfrm>
+        </p:spPr>
+        <p:txBody>
+          <a:bodyPr anchor="b">
+            <a:normAutofit/>
+          </a:bodyPr>
+          <a:lstStyle>
+            <a:lvl1pPr algn="l">
+              <a:defRPr sz="4400" b="0" cap="none"/>
+            </a:lvl1pPr>
+          </a:lstStyle>
+          <a:p>
+            <a:r>
+              <a:rPr lang="en-US" smtClean="0"/>
+              <a:t>Click to edit Master title style</a:t>
+            </a:r>
+            <a:endParaRPr lang="en-US" dirty="0"/>
+          </a:p>
+        </p:txBody>
+      </p:sp>
+      <p:sp>
+        <p:nvSpPr>
+          <p:cNvPr id="3" name="Text Placeholder 2"/>
+          <p:cNvSpPr>
+            <a:spLocks noGrp="1"/>
+          </p:cNvSpPr>
+          <p:nvPr>
+            <p:ph type="body" idx="1"/>
+          </p:nvPr>
+        </p:nvSpPr>
+        <p:spPr>
+          <a:xfrm>
+            <a:off x="677335" y="4527448"/>
+            <a:ext cx="8596668" cy="1513914"/>
+          </a:xfrm>
+        </p:spPr>
+        <p:txBody>
+          <a:bodyPr anchor="t">
+            <a:normAutofit/>
+          </a:bodyPr>
+          <a:lstStyle>
+            <a:lvl1pPr marL="0" indent="0" algn="l">
+              <a:buNone/>
+              <a:defRPr sz="1800">
+                <a:solidFill>
+                  <a:schemeClr val="tx1">
+                    <a:lumMod val="75000"/>
+                    <a:lumOff val="25000"/>
+                  </a:schemeClr>
+                </a:solidFill>
+              </a:defRPr>
+            </a:lvl1pPr>
+            <a:lvl2pPr marL="457200" indent="0">
+              <a:buNone/>
+              <a:defRPr sz="1800">
+                <a:solidFill>
+                  <a:schemeClr val="tx1">
+                    <a:tint val="75000"/>
+                  </a:schemeClr>
+                </a:solidFill>
+              </a:defRPr>
+            </a:lvl2pPr>
+            <a:lvl3pPr marL="914400" indent="0">
+              <a:buNone/>
+              <a:defRPr sz="1600">
+                <a:solidFill>
+                  <a:schemeClr val="tx1">
+                    <a:tint val="75000"/>
+                  </a:schemeClr>
+                </a:solidFill>
+              </a:defRPr>
+            </a:lvl3pPr>
+            <a:lvl4pPr marL="1371600" indent="0">
+              <a:buNone/>
+              <a:defRPr sz="1400">
+                <a:solidFill>
+                  <a:schemeClr val="tx1">
+                    <a:tint val="75000"/>
+                  </a:schemeClr>
+                </a:solidFill>
+              </a:defRPr>
+            </a:lvl4pPr>
+            <a:lvl5pPr marL="1828800" indent="0">
+              <a:buNone/>
+              <a:defRPr sz="1400">
+                <a:solidFill>
+                  <a:schemeClr val="tx1">
+                    <a:tint val="75000"/>
+                  </a:schemeClr>
+                </a:solidFill>
+              </a:defRPr>
+            </a:lvl5pPr>
+            <a:lvl6pPr marL="2286000" indent="0">
+              <a:buNone/>
+              <a:defRPr sz="1400">
+                <a:solidFill>
+                  <a:schemeClr val="tx1">
+                    <a:tint val="75000"/>
+                  </a:schemeClr>
+                </a:solidFill>
+              </a:defRPr>
+            </a:lvl6pPr>
+            <a:lvl7pPr marL="2743200" indent="0">
+              <a:buNone/>
+              <a:defRPr sz="1400">
+                <a:solidFill>
+                  <a:schemeClr val="tx1">
+                    <a:tint val="75000"/>
+                  </a:schemeClr>
+                </a:solidFill>
+              </a:defRPr>
+            </a:lvl7pPr>
+            <a:lvl8pPr marL="3200400" indent="0">
+              <a:buNone/>
+              <a:defRPr sz="1400">
+                <a:solidFill>
+                  <a:schemeClr val="tx1">
+                    <a:tint val="75000"/>
+                  </a:schemeClr>
+                </a:solidFill>
+              </a:defRPr>
+            </a:lvl8pPr>
+            <a:lvl9pPr marL="3657600" indent="0">
+              <a:buNone/>
+              <a:defRPr sz="1400">
+                <a:solidFill>
+                  <a:schemeClr val="tx1">
+                    <a:tint val="75000"/>
+                  </a:schemeClr>
+                </a:solidFill>
+              </a:defRPr>
+            </a:lvl9pPr>
+          </a:lstStyle>
+          <a:p>
+            <a:pPr lvl="0"/>
+            <a:r>
+              <a:rPr lang="en-US" smtClean="0"/>
+              <a:t>Click to edit Master text styles</a:t>
+            </a:r>
+          </a:p>
+        </p:txBody>
+      </p:sp>
+      <p:sp>
+        <p:nvSpPr>
+          <p:cNvPr id="4" name="Date Placeholder 3"/>
+          <p:cNvSpPr>
+            <a:spLocks noGrp="1"/>
+          </p:cNvSpPr>
+          <p:nvPr>
+            <p:ph type="dt" sz="half" idx="10"/>
+          </p:nvPr>
+        </p:nvSpPr>
+        <p:spPr/>
+        <p:txBody>
+          <a:bodyPr/>
+          <a:lstStyle/>
+          <a:p>
+            <a:fld id="{30CB22A9-0E83-4290-85DE-03AE20A6F059}" type="datetimeFigureOut">
+              <a:rPr lang="en-GB" smtClean="0"/>
+              <a:t>05/11/2016</a:t>
+            </a:fld>
+            <a:endParaRPr lang="en-GB"/>
+          </a:p>
+        </p:txBody>
+      </p:sp>
+      <p:sp>
+        <p:nvSpPr>
+          <p:cNvPr id="5" name="Footer Placeholder 4"/>
+          <p:cNvSpPr>
+            <a:spLocks noGrp="1"/>
+          </p:cNvSpPr>
+          <p:nvPr>
+            <p:ph type="ftr" sz="quarter" idx="11"/>
+          </p:nvPr>
+        </p:nvSpPr>
+        <p:spPr/>
+        <p:txBody>
+          <a:bodyPr/>
+          <a:lstStyle/>
+          <a:p>
+            <a:endParaRPr lang="en-GB"/>
+          </a:p>
+        </p:txBody>
+      </p:sp>
+      <p:sp>
+        <p:nvSpPr>
+          <p:cNvPr id="6" name="Slide Number Placeholder 5"/>
+          <p:cNvSpPr>
+            <a:spLocks noGrp="1"/>
+          </p:cNvSpPr>
+          <p:nvPr>
+            <p:ph type="sldNum" sz="quarter" idx="12"/>
+          </p:nvPr>
+        </p:nvSpPr>
+        <p:spPr/>
+        <p:txBody>
+          <a:bodyPr/>
+          <a:lstStyle/>
+          <a:p>
+            <a:fld id="{7133BBC1-3CC6-43D4-945E-840ED53B7DD3}" type="slidenum">
+              <a:rPr lang="en-GB" smtClean="0"/>
+              <a:t>‹#›</a:t>
+            </a:fld>
+            <a:endParaRPr lang="en-GB"/>
+          </a:p>
+        </p:txBody>
+      </p:sp>
+    </p:spTree>
+    <p:extLst>
+      <p:ext uri="{BB962C8B-B14F-4D97-AF65-F5344CB8AC3E}">
+        <p14:creationId xmlns:p14="http://schemas.microsoft.com/office/powerpoint/2010/main" val="2990471064"/>
+      </p:ext>
+    </p:extLst>
+  </p:cSld>
+  <p:clrMapOvr>
+    <a:masterClrMapping/>
+  </p:clrMapOvr>
+</p:sldLayout>
+</file>
+
+<file path=ppt/slideLayouts/slideLayout13.xml><?xml version="1.0" encoding="utf-8"?>
+<p:sldLayout xmlns:a="http://schemas.openxmlformats.org/drawingml/2006/main" xmlns:r="http://schemas.openxmlformats.org/officeDocument/2006/relationships" xmlns:p="http://schemas.openxmlformats.org/presentationml/2006/main" preserve="1">
+  <p:cSld name="Quote Name Card">
+    <p:spTree>
+      <p:nvGrpSpPr>
+        <p:cNvPr id="1" name=""/>
+        <p:cNvGrpSpPr/>
+        <p:nvPr/>
+      </p:nvGrpSpPr>
+      <p:grpSpPr>
+        <a:xfrm>
+          <a:off x="0" y="0"/>
+          <a:ext cx="0" cy="0"/>
+          <a:chOff x="0" y="0"/>
+          <a:chExt cx="0" cy="0"/>
+        </a:xfrm>
+      </p:grpSpPr>
+      <p:sp>
+        <p:nvSpPr>
+          <p:cNvPr id="2" name="Title 1"/>
+          <p:cNvSpPr>
+            <a:spLocks noGrp="1"/>
+          </p:cNvSpPr>
+          <p:nvPr>
+            <p:ph type="title"/>
+          </p:nvPr>
+        </p:nvSpPr>
+        <p:spPr>
+          <a:xfrm>
+            <a:off x="931334" y="609600"/>
+            <a:ext cx="8094134" cy="3022600"/>
+          </a:xfrm>
+        </p:spPr>
+        <p:txBody>
+          <a:bodyPr anchor="ctr">
+            <a:normAutofit/>
+          </a:bodyPr>
+          <a:lstStyle>
+            <a:lvl1pPr algn="l">
+              <a:defRPr sz="4400" b="0" cap="none"/>
+            </a:lvl1pPr>
+          </a:lstStyle>
+          <a:p>
+            <a:r>
+              <a:rPr lang="en-US" smtClean="0"/>
+              <a:t>Click to edit Master title style</a:t>
+            </a:r>
+            <a:endParaRPr lang="en-US" dirty="0"/>
+          </a:p>
+        </p:txBody>
+      </p:sp>
+      <p:sp>
+        <p:nvSpPr>
+          <p:cNvPr id="23" name="Text Placeholder 9"/>
+          <p:cNvSpPr>
+            <a:spLocks noGrp="1"/>
+          </p:cNvSpPr>
+          <p:nvPr>
+            <p:ph type="body" sz="quarter" idx="13"/>
+          </p:nvPr>
+        </p:nvSpPr>
+        <p:spPr>
+          <a:xfrm>
+            <a:off x="677332" y="4013200"/>
+            <a:ext cx="8596669" cy="514248"/>
+          </a:xfrm>
+        </p:spPr>
+        <p:txBody>
+          <a:bodyPr anchor="b">
+            <a:noAutofit/>
+          </a:bodyPr>
+          <a:lstStyle>
+            <a:lvl1pPr marL="0" indent="0">
+              <a:buFontTx/>
+              <a:buNone/>
+              <a:defRPr sz="2400">
+                <a:solidFill>
+                  <a:schemeClr val="tx1">
+                    <a:lumMod val="75000"/>
+                    <a:lumOff val="25000"/>
+                  </a:schemeClr>
+                </a:solidFill>
+              </a:defRPr>
+            </a:lvl1pPr>
+            <a:lvl2pPr marL="457200" indent="0">
+              <a:buFontTx/>
+              <a:buNone/>
+              <a:defRPr/>
+            </a:lvl2pPr>
+            <a:lvl3pPr marL="914400" indent="0">
+              <a:buFontTx/>
+              <a:buNone/>
+              <a:defRPr/>
+            </a:lvl3pPr>
+            <a:lvl4pPr marL="1371600" indent="0">
+              <a:buFontTx/>
+              <a:buNone/>
+              <a:defRPr/>
+            </a:lvl4pPr>
+            <a:lvl5pPr marL="1828800" indent="0">
+              <a:buFontTx/>
+              <a:buNone/>
+              <a:defRPr/>
+            </a:lvl5pPr>
+          </a:lstStyle>
+          <a:p>
+            <a:pPr lvl="0"/>
+            <a:r>
+              <a:rPr lang="en-US" smtClean="0"/>
+              <a:t>Click to edit Master text styles</a:t>
+            </a:r>
+          </a:p>
+        </p:txBody>
+      </p:sp>
+      <p:sp>
+        <p:nvSpPr>
+          <p:cNvPr id="3" name="Text Placeholder 2"/>
+          <p:cNvSpPr>
+            <a:spLocks noGrp="1"/>
+          </p:cNvSpPr>
+          <p:nvPr>
+            <p:ph type="body" idx="1"/>
+          </p:nvPr>
+        </p:nvSpPr>
+        <p:spPr>
+          <a:xfrm>
+            <a:off x="677335" y="4527448"/>
+            <a:ext cx="8596668" cy="1513914"/>
+          </a:xfrm>
+        </p:spPr>
+        <p:txBody>
+          <a:bodyPr anchor="t">
+            <a:normAutofit/>
+          </a:bodyPr>
+          <a:lstStyle>
+            <a:lvl1pPr marL="0" indent="0" algn="l">
+              <a:buNone/>
+              <a:defRPr sz="1800">
+                <a:solidFill>
+                  <a:schemeClr val="tx1">
+                    <a:lumMod val="50000"/>
+                    <a:lumOff val="50000"/>
+                  </a:schemeClr>
+                </a:solidFill>
+              </a:defRPr>
+            </a:lvl1pPr>
+            <a:lvl2pPr marL="457200" indent="0">
+              <a:buNone/>
+              <a:defRPr sz="1800">
+                <a:solidFill>
+                  <a:schemeClr val="tx1">
+                    <a:tint val="75000"/>
+                  </a:schemeClr>
+                </a:solidFill>
+              </a:defRPr>
+            </a:lvl2pPr>
+            <a:lvl3pPr marL="914400" indent="0">
+              <a:buNone/>
+              <a:defRPr sz="1600">
+                <a:solidFill>
+                  <a:schemeClr val="tx1">
+                    <a:tint val="75000"/>
+                  </a:schemeClr>
+                </a:solidFill>
+              </a:defRPr>
+            </a:lvl3pPr>
+            <a:lvl4pPr marL="1371600" indent="0">
+              <a:buNone/>
+              <a:defRPr sz="1400">
+                <a:solidFill>
+                  <a:schemeClr val="tx1">
+                    <a:tint val="75000"/>
+                  </a:schemeClr>
+                </a:solidFill>
+              </a:defRPr>
+            </a:lvl4pPr>
+            <a:lvl5pPr marL="1828800" indent="0">
+              <a:buNone/>
+              <a:defRPr sz="1400">
+                <a:solidFill>
+                  <a:schemeClr val="tx1">
+                    <a:tint val="75000"/>
+                  </a:schemeClr>
+                </a:solidFill>
+              </a:defRPr>
+            </a:lvl5pPr>
+            <a:lvl6pPr marL="2286000" indent="0">
+              <a:buNone/>
+              <a:defRPr sz="1400">
+                <a:solidFill>
+                  <a:schemeClr val="tx1">
+                    <a:tint val="75000"/>
+                  </a:schemeClr>
+                </a:solidFill>
+              </a:defRPr>
+            </a:lvl6pPr>
+            <a:lvl7pPr marL="2743200" indent="0">
+              <a:buNone/>
+              <a:defRPr sz="1400">
+                <a:solidFill>
+                  <a:schemeClr val="tx1">
+                    <a:tint val="75000"/>
+                  </a:schemeClr>
+                </a:solidFill>
+              </a:defRPr>
+            </a:lvl7pPr>
+            <a:lvl8pPr marL="3200400" indent="0">
+              <a:buNone/>
+              <a:defRPr sz="1400">
+                <a:solidFill>
+                  <a:schemeClr val="tx1">
+                    <a:tint val="75000"/>
+                  </a:schemeClr>
+                </a:solidFill>
+              </a:defRPr>
+            </a:lvl8pPr>
+            <a:lvl9pPr marL="3657600" indent="0">
+              <a:buNone/>
+              <a:defRPr sz="1400">
+                <a:solidFill>
+                  <a:schemeClr val="tx1">
+                    <a:tint val="75000"/>
+                  </a:schemeClr>
+                </a:solidFill>
+              </a:defRPr>
+            </a:lvl9pPr>
+          </a:lstStyle>
+          <a:p>
+            <a:pPr lvl="0"/>
+            <a:r>
+              <a:rPr lang="en-US" smtClean="0"/>
+              <a:t>Click to edit Master text styles</a:t>
+            </a:r>
+          </a:p>
+        </p:txBody>
+      </p:sp>
+      <p:sp>
+        <p:nvSpPr>
+          <p:cNvPr id="4" name="Date Placeholder 3"/>
+          <p:cNvSpPr>
+            <a:spLocks noGrp="1"/>
+          </p:cNvSpPr>
+          <p:nvPr>
+            <p:ph type="dt" sz="half" idx="10"/>
+          </p:nvPr>
+        </p:nvSpPr>
+        <p:spPr/>
+        <p:txBody>
+          <a:bodyPr/>
+          <a:lstStyle/>
+          <a:p>
+            <a:fld id="{30CB22A9-0E83-4290-85DE-03AE20A6F059}" type="datetimeFigureOut">
+              <a:rPr lang="en-GB" smtClean="0"/>
+              <a:t>05/11/2016</a:t>
+            </a:fld>
+            <a:endParaRPr lang="en-GB"/>
+          </a:p>
+        </p:txBody>
+      </p:sp>
+      <p:sp>
+        <p:nvSpPr>
+          <p:cNvPr id="5" name="Footer Placeholder 4"/>
+          <p:cNvSpPr>
+            <a:spLocks noGrp="1"/>
+          </p:cNvSpPr>
+          <p:nvPr>
+            <p:ph type="ftr" sz="quarter" idx="11"/>
+          </p:nvPr>
+        </p:nvSpPr>
+        <p:spPr/>
+        <p:txBody>
+          <a:bodyPr/>
+          <a:lstStyle/>
+          <a:p>
+            <a:endParaRPr lang="en-GB"/>
+          </a:p>
+        </p:txBody>
+      </p:sp>
+      <p:sp>
+        <p:nvSpPr>
+          <p:cNvPr id="6" name="Slide Number Placeholder 5"/>
+          <p:cNvSpPr>
+            <a:spLocks noGrp="1"/>
+          </p:cNvSpPr>
+          <p:nvPr>
+            <p:ph type="sldNum" sz="quarter" idx="12"/>
+          </p:nvPr>
+        </p:nvSpPr>
+        <p:spPr/>
+        <p:txBody>
+          <a:bodyPr/>
+          <a:lstStyle/>
+          <a:p>
+            <a:fld id="{7133BBC1-3CC6-43D4-945E-840ED53B7DD3}" type="slidenum">
+              <a:rPr lang="en-GB" smtClean="0"/>
+              <a:t>‹#›</a:t>
+            </a:fld>
+            <a:endParaRPr lang="en-GB"/>
+          </a:p>
+        </p:txBody>
+      </p:sp>
+      <p:sp>
+        <p:nvSpPr>
+          <p:cNvPr id="24" name="TextBox 23"/>
+          <p:cNvSpPr txBox="1"/>
+          <p:nvPr/>
+        </p:nvSpPr>
+        <p:spPr>
+          <a:xfrm>
+            <a:off x="541870" y="790378"/>
+            <a:ext cx="609600" cy="584776"/>
+          </a:xfrm>
+          <a:prstGeom prst="rect">
+            <a:avLst/>
+          </a:prstGeom>
+        </p:spPr>
+        <p:txBody>
+          <a:bodyPr vert="horz" lIns="91440" tIns="45720" rIns="91440" bIns="45720" rtlCol="0" anchor="ctr">
+            <a:noAutofit/>
+          </a:bodyPr>
+          <a:lstStyle/>
+          <a:p>
+            <a:pPr lvl="0"/>
+            <a:r>
+              <a:rPr lang="en-US" sz="8000" baseline="0" dirty="0">
+                <a:ln w="3175" cmpd="sng">
+                  <a:noFill/>
+                </a:ln>
+                <a:solidFill>
+                  <a:schemeClr val="accent1">
+                    <a:lumMod val="60000"/>
+                    <a:lumOff val="40000"/>
+                  </a:schemeClr>
+                </a:solidFill>
+                <a:effectLst/>
+                <a:latin typeface="Arial"/>
+              </a:rPr>
+              <a:t>“</a:t>
+            </a:r>
+          </a:p>
+        </p:txBody>
+      </p:sp>
+      <p:sp>
+        <p:nvSpPr>
+          <p:cNvPr id="25" name="TextBox 24"/>
+          <p:cNvSpPr txBox="1"/>
+          <p:nvPr/>
+        </p:nvSpPr>
+        <p:spPr>
+          <a:xfrm>
+            <a:off x="8893011" y="2886556"/>
+            <a:ext cx="609600" cy="584776"/>
+          </a:xfrm>
+          <a:prstGeom prst="rect">
+            <a:avLst/>
+          </a:prstGeom>
+        </p:spPr>
+        <p:txBody>
+          <a:bodyPr vert="horz" lIns="91440" tIns="45720" rIns="91440" bIns="45720" rtlCol="0" anchor="ctr">
+            <a:noAutofit/>
+          </a:bodyPr>
+          <a:lstStyle/>
+          <a:p>
+            <a:pPr lvl="0"/>
+            <a:r>
+              <a:rPr lang="en-US" sz="8000" baseline="0" dirty="0">
+                <a:ln w="3175" cmpd="sng">
+                  <a:noFill/>
+                </a:ln>
+                <a:solidFill>
+                  <a:schemeClr val="accent1">
+                    <a:lumMod val="60000"/>
+                    <a:lumOff val="40000"/>
+                  </a:schemeClr>
+                </a:solidFill>
+                <a:effectLst/>
+                <a:latin typeface="Arial"/>
+              </a:rPr>
+              <a:t>”</a:t>
+            </a:r>
+          </a:p>
+        </p:txBody>
+      </p:sp>
+    </p:spTree>
+    <p:extLst>
+      <p:ext uri="{BB962C8B-B14F-4D97-AF65-F5344CB8AC3E}">
+        <p14:creationId xmlns:p14="http://schemas.microsoft.com/office/powerpoint/2010/main" val="2994068957"/>
+      </p:ext>
+    </p:extLst>
+  </p:cSld>
+  <p:clrMapOvr>
+    <a:masterClrMapping/>
+  </p:clrMapOvr>
+</p:sldLayout>
+</file>
+
+<file path=ppt/slideLayouts/slideLayout14.xml><?xml version="1.0" encoding="utf-8"?>
+<p:sldLayout xmlns:a="http://schemas.openxmlformats.org/drawingml/2006/main" xmlns:r="http://schemas.openxmlformats.org/officeDocument/2006/relationships" xmlns:p="http://schemas.openxmlformats.org/presentationml/2006/main" preserve="1">
+  <p:cSld name="True or False">
+    <p:spTree>
+      <p:nvGrpSpPr>
+        <p:cNvPr id="1" name=""/>
+        <p:cNvGrpSpPr/>
+        <p:nvPr/>
+      </p:nvGrpSpPr>
+      <p:grpSpPr>
+        <a:xfrm>
+          <a:off x="0" y="0"/>
+          <a:ext cx="0" cy="0"/>
+          <a:chOff x="0" y="0"/>
+          <a:chExt cx="0" cy="0"/>
+        </a:xfrm>
+      </p:grpSpPr>
+      <p:sp>
+        <p:nvSpPr>
+          <p:cNvPr id="2" name="Title 1"/>
+          <p:cNvSpPr>
+            <a:spLocks noGrp="1"/>
+          </p:cNvSpPr>
+          <p:nvPr>
+            <p:ph type="title"/>
+          </p:nvPr>
+        </p:nvSpPr>
+        <p:spPr>
+          <a:xfrm>
+            <a:off x="685799" y="609600"/>
+            <a:ext cx="8588203" cy="3022600"/>
+          </a:xfrm>
+        </p:spPr>
+        <p:txBody>
+          <a:bodyPr anchor="ctr">
+            <a:normAutofit/>
+          </a:bodyPr>
+          <a:lstStyle>
+            <a:lvl1pPr algn="l">
+              <a:defRPr sz="4400" b="0" cap="none"/>
+            </a:lvl1pPr>
+          </a:lstStyle>
+          <a:p>
+            <a:r>
+              <a:rPr lang="en-US" smtClean="0"/>
+              <a:t>Click to edit Master title style</a:t>
+            </a:r>
+            <a:endParaRPr lang="en-US" dirty="0"/>
+          </a:p>
+        </p:txBody>
+      </p:sp>
+      <p:sp>
+        <p:nvSpPr>
+          <p:cNvPr id="23" name="Text Placeholder 9"/>
+          <p:cNvSpPr>
+            <a:spLocks noGrp="1"/>
+          </p:cNvSpPr>
+          <p:nvPr>
+            <p:ph type="body" sz="quarter" idx="13"/>
+          </p:nvPr>
+        </p:nvSpPr>
+        <p:spPr>
+          <a:xfrm>
+            <a:off x="677332" y="4013200"/>
+            <a:ext cx="8596669" cy="514248"/>
+          </a:xfrm>
+        </p:spPr>
+        <p:txBody>
+          <a:bodyPr anchor="b">
+            <a:noAutofit/>
+          </a:bodyPr>
+          <a:lstStyle>
+            <a:lvl1pPr marL="0" indent="0">
+              <a:buFontTx/>
+              <a:buNone/>
+              <a:defRPr sz="2400">
+                <a:solidFill>
+                  <a:schemeClr val="accent1"/>
+                </a:solidFill>
+              </a:defRPr>
+            </a:lvl1pPr>
+            <a:lvl2pPr marL="457200" indent="0">
+              <a:buFontTx/>
+              <a:buNone/>
+              <a:defRPr/>
+            </a:lvl2pPr>
+            <a:lvl3pPr marL="914400" indent="0">
+              <a:buFontTx/>
+              <a:buNone/>
+              <a:defRPr/>
+            </a:lvl3pPr>
+            <a:lvl4pPr marL="1371600" indent="0">
+              <a:buFontTx/>
+              <a:buNone/>
+              <a:defRPr/>
+            </a:lvl4pPr>
+            <a:lvl5pPr marL="1828800" indent="0">
+              <a:buFontTx/>
+              <a:buNone/>
+              <a:defRPr/>
+            </a:lvl5pPr>
+          </a:lstStyle>
+          <a:p>
+            <a:pPr lvl="0"/>
+            <a:r>
+              <a:rPr lang="en-US" smtClean="0"/>
+              <a:t>Click to edit Master text styles</a:t>
+            </a:r>
+          </a:p>
+        </p:txBody>
+      </p:sp>
+      <p:sp>
+        <p:nvSpPr>
+          <p:cNvPr id="3" name="Text Placeholder 2"/>
+          <p:cNvSpPr>
+            <a:spLocks noGrp="1"/>
+          </p:cNvSpPr>
+          <p:nvPr>
+            <p:ph type="body" idx="1"/>
+          </p:nvPr>
+        </p:nvSpPr>
+        <p:spPr>
+          <a:xfrm>
+            <a:off x="677335" y="4527448"/>
+            <a:ext cx="8596668" cy="1513914"/>
+          </a:xfrm>
+        </p:spPr>
+        <p:txBody>
+          <a:bodyPr anchor="t">
+            <a:normAutofit/>
+          </a:bodyPr>
+          <a:lstStyle>
+            <a:lvl1pPr marL="0" indent="0" algn="l">
+              <a:buNone/>
+              <a:defRPr sz="1800">
+                <a:solidFill>
+                  <a:schemeClr val="tx1">
+                    <a:lumMod val="50000"/>
+                    <a:lumOff val="50000"/>
+                  </a:schemeClr>
+                </a:solidFill>
+              </a:defRPr>
+            </a:lvl1pPr>
+            <a:lvl2pPr marL="457200" indent="0">
+              <a:buNone/>
+              <a:defRPr sz="1800">
+                <a:solidFill>
+                  <a:schemeClr val="tx1">
+                    <a:tint val="75000"/>
+                  </a:schemeClr>
+                </a:solidFill>
+              </a:defRPr>
+            </a:lvl2pPr>
+            <a:lvl3pPr marL="914400" indent="0">
+              <a:buNone/>
+              <a:defRPr sz="1600">
+                <a:solidFill>
+                  <a:schemeClr val="tx1">
+                    <a:tint val="75000"/>
+                  </a:schemeClr>
+                </a:solidFill>
+              </a:defRPr>
+            </a:lvl3pPr>
+            <a:lvl4pPr marL="1371600" indent="0">
+              <a:buNone/>
+              <a:defRPr sz="1400">
+                <a:solidFill>
+                  <a:schemeClr val="tx1">
+                    <a:tint val="75000"/>
+                  </a:schemeClr>
+                </a:solidFill>
+              </a:defRPr>
+            </a:lvl4pPr>
+            <a:lvl5pPr marL="1828800" indent="0">
+              <a:buNone/>
+              <a:defRPr sz="1400">
+                <a:solidFill>
+                  <a:schemeClr val="tx1">
+                    <a:tint val="75000"/>
+                  </a:schemeClr>
+                </a:solidFill>
+              </a:defRPr>
+            </a:lvl5pPr>
+            <a:lvl6pPr marL="2286000" indent="0">
+              <a:buNone/>
+              <a:defRPr sz="1400">
+                <a:solidFill>
+                  <a:schemeClr val="tx1">
+                    <a:tint val="75000"/>
+                  </a:schemeClr>
+                </a:solidFill>
+              </a:defRPr>
+            </a:lvl6pPr>
+            <a:lvl7pPr marL="2743200" indent="0">
+              <a:buNone/>
+              <a:defRPr sz="1400">
+                <a:solidFill>
+                  <a:schemeClr val="tx1">
+                    <a:tint val="75000"/>
+                  </a:schemeClr>
+                </a:solidFill>
+              </a:defRPr>
+            </a:lvl7pPr>
+            <a:lvl8pPr marL="3200400" indent="0">
+              <a:buNone/>
+              <a:defRPr sz="1400">
+                <a:solidFill>
+                  <a:schemeClr val="tx1">
+                    <a:tint val="75000"/>
+                  </a:schemeClr>
+                </a:solidFill>
+              </a:defRPr>
+            </a:lvl8pPr>
+            <a:lvl9pPr marL="3657600" indent="0">
+              <a:buNone/>
+              <a:defRPr sz="1400">
+                <a:solidFill>
+                  <a:schemeClr val="tx1">
+                    <a:tint val="75000"/>
+                  </a:schemeClr>
+                </a:solidFill>
+              </a:defRPr>
+            </a:lvl9pPr>
+          </a:lstStyle>
+          <a:p>
+            <a:pPr lvl="0"/>
+            <a:r>
+              <a:rPr lang="en-US" smtClean="0"/>
+              <a:t>Click to edit Master text styles</a:t>
+            </a:r>
+          </a:p>
+        </p:txBody>
+      </p:sp>
+      <p:sp>
+        <p:nvSpPr>
+          <p:cNvPr id="4" name="Date Placeholder 3"/>
+          <p:cNvSpPr>
+            <a:spLocks noGrp="1"/>
+          </p:cNvSpPr>
+          <p:nvPr>
+            <p:ph type="dt" sz="half" idx="10"/>
+          </p:nvPr>
+        </p:nvSpPr>
+        <p:spPr/>
+        <p:txBody>
+          <a:bodyPr/>
+          <a:lstStyle/>
+          <a:p>
+            <a:fld id="{30CB22A9-0E83-4290-85DE-03AE20A6F059}" type="datetimeFigureOut">
+              <a:rPr lang="en-GB" smtClean="0"/>
+              <a:t>05/11/2016</a:t>
+            </a:fld>
+            <a:endParaRPr lang="en-GB"/>
+          </a:p>
+        </p:txBody>
+      </p:sp>
+      <p:sp>
+        <p:nvSpPr>
+          <p:cNvPr id="5" name="Footer Placeholder 4"/>
+          <p:cNvSpPr>
+            <a:spLocks noGrp="1"/>
+          </p:cNvSpPr>
+          <p:nvPr>
+            <p:ph type="ftr" sz="quarter" idx="11"/>
+          </p:nvPr>
+        </p:nvSpPr>
+        <p:spPr/>
+        <p:txBody>
+          <a:bodyPr/>
+          <a:lstStyle/>
+          <a:p>
+            <a:endParaRPr lang="en-GB"/>
+          </a:p>
+        </p:txBody>
+      </p:sp>
+      <p:sp>
+        <p:nvSpPr>
+          <p:cNvPr id="6" name="Slide Number Placeholder 5"/>
+          <p:cNvSpPr>
+            <a:spLocks noGrp="1"/>
+          </p:cNvSpPr>
+          <p:nvPr>
+            <p:ph type="sldNum" sz="quarter" idx="12"/>
+          </p:nvPr>
+        </p:nvSpPr>
+        <p:spPr/>
+        <p:txBody>
+          <a:bodyPr/>
+          <a:lstStyle/>
+          <a:p>
+            <a:fld id="{7133BBC1-3CC6-43D4-945E-840ED53B7DD3}" type="slidenum">
+              <a:rPr lang="en-GB" smtClean="0"/>
+              <a:t>‹#›</a:t>
+            </a:fld>
+            <a:endParaRPr lang="en-GB"/>
+          </a:p>
+        </p:txBody>
+      </p:sp>
+    </p:spTree>
+    <p:extLst>
+      <p:ext uri="{BB962C8B-B14F-4D97-AF65-F5344CB8AC3E}">
+        <p14:creationId xmlns:p14="http://schemas.microsoft.com/office/powerpoint/2010/main" val="1217118963"/>
+      </p:ext>
+    </p:extLst>
+  </p:cSld>
+  <p:clrMapOvr>
+    <a:masterClrMapping/>
+  </p:clrMapOvr>
+</p:sldLayout>
+</file>
+
+<file path=ppt/slideLayouts/slideLayout15.xml><?xml version="1.0" encoding="utf-8"?>
 <p:sldLayout xmlns:a="http://schemas.openxmlformats.org/drawingml/2006/main" xmlns:r="http://schemas.openxmlformats.org/officeDocument/2006/relationships" xmlns:p="http://schemas.openxmlformats.org/presentationml/2006/main" type="vertTx" preserve="1">
   <p:cSld name="Title and Vertical Text">
     <p:spTree>
@@ -346,7 +2550,7 @@
               <a:rPr lang="en-US" smtClean="0"/>
               <a:t>Click to edit Master title style</a:t>
             </a:r>
-            <a:endParaRPr lang="en-GB"/>
+            <a:endParaRPr lang="en-US" dirty="0"/>
           </a:p>
         </p:txBody>
       </p:sp>
@@ -398,7 +2602,7 @@
               <a:rPr lang="en-US" smtClean="0"/>
               <a:t>Fifth level</a:t>
             </a:r>
-            <a:endParaRPr lang="en-GB"/>
+            <a:endParaRPr lang="en-US" dirty="0"/>
           </a:p>
         </p:txBody>
       </p:sp>
@@ -470,7 +2674,7 @@
     </p:spTree>
     <p:extLst>
       <p:ext uri="{BB962C8B-B14F-4D97-AF65-F5344CB8AC3E}">
-        <p14:creationId xmlns:p14="http://schemas.microsoft.com/office/powerpoint/2010/main" val="249597599"/>
+        <p14:creationId xmlns:p14="http://schemas.microsoft.com/office/powerpoint/2010/main" val="1622937775"/>
       </p:ext>
     </p:extLst>
   </p:cSld>
@@ -480,7 +2684,7 @@
 </p:sldLayout>
 </file>
 
-<file path=ppt/slideLayouts/slideLayout11.xml><?xml version="1.0" encoding="utf-8"?>
+<file path=ppt/slideLayouts/slideLayout16.xml><?xml version="1.0" encoding="utf-8"?>
 <p:sldLayout xmlns:a="http://schemas.openxmlformats.org/drawingml/2006/main" xmlns:r="http://schemas.openxmlformats.org/officeDocument/2006/relationships" xmlns:p="http://schemas.openxmlformats.org/presentationml/2006/main" type="vertTitleAndTx" preserve="1">
   <p:cSld name="Vertical Title and Text">
     <p:spTree>
@@ -509,19 +2713,19 @@
         </p:nvSpPr>
         <p:spPr>
           <a:xfrm>
-            <a:off x="8724900" y="365125"/>
-            <a:ext cx="2628900" cy="5811838"/>
+            <a:off x="7967673" y="609599"/>
+            <a:ext cx="1304743" cy="5251451"/>
           </a:xfrm>
         </p:spPr>
         <p:txBody>
-          <a:bodyPr vert="eaVert"/>
+          <a:bodyPr vert="eaVert" anchor="ctr"/>
           <a:lstStyle/>
           <a:p>
             <a:r>
               <a:rPr lang="en-US" smtClean="0"/>
               <a:t>Click to edit Master title style</a:t>
             </a:r>
-            <a:endParaRPr lang="en-GB"/>
+            <a:endParaRPr lang="en-US" dirty="0"/>
           </a:p>
         </p:txBody>
       </p:sp>
@@ -537,8 +2741,8 @@
         </p:nvSpPr>
         <p:spPr>
           <a:xfrm>
-            <a:off x="838200" y="365125"/>
-            <a:ext cx="7734300" cy="5811838"/>
+            <a:off x="677335" y="609600"/>
+            <a:ext cx="7060150" cy="5251450"/>
           </a:xfrm>
         </p:spPr>
         <p:txBody>
@@ -578,7 +2782,7 @@
               <a:rPr lang="en-US" smtClean="0"/>
               <a:t>Fifth level</a:t>
             </a:r>
-            <a:endParaRPr lang="en-GB"/>
+            <a:endParaRPr lang="en-US" dirty="0"/>
           </a:p>
         </p:txBody>
       </p:sp>
@@ -650,7 +2854,7 @@
     </p:spTree>
     <p:extLst>
       <p:ext uri="{BB962C8B-B14F-4D97-AF65-F5344CB8AC3E}">
-        <p14:creationId xmlns:p14="http://schemas.microsoft.com/office/powerpoint/2010/main" val="1560755303"/>
+        <p14:creationId xmlns:p14="http://schemas.microsoft.com/office/powerpoint/2010/main" val="1419523608"/>
       </p:ext>
     </p:extLst>
   </p:cSld>
@@ -689,32 +2893,38 @@
         </p:nvSpPr>
         <p:spPr/>
         <p:txBody>
+          <a:bodyPr>
+            <a:normAutofit/>
+          </a:bodyPr>
+          <a:lstStyle>
+            <a:lvl1pPr>
+              <a:defRPr sz="3600"/>
+            </a:lvl1pPr>
+          </a:lstStyle>
+          <a:p>
+            <a:r>
+              <a:rPr lang="en-US" smtClean="0"/>
+              <a:t>Click to edit Master title style</a:t>
+            </a:r>
+            <a:endParaRPr lang="en-US" dirty="0"/>
+          </a:p>
+        </p:txBody>
+      </p:sp>
+      <p:sp>
+        <p:nvSpPr>
+          <p:cNvPr id="3" name="Content Placeholder 2"/>
+          <p:cNvSpPr>
+            <a:spLocks noGrp="1"/>
+          </p:cNvSpPr>
+          <p:nvPr>
+            <p:ph idx="1"/>
+          </p:nvPr>
+        </p:nvSpPr>
+        <p:spPr/>
+        <p:txBody>
           <a:bodyPr/>
           <a:lstStyle/>
           <a:p>
-            <a:r>
-              <a:rPr lang="en-US" smtClean="0"/>
-              <a:t>Click to edit Master title style</a:t>
-            </a:r>
-            <a:endParaRPr lang="en-GB"/>
-          </a:p>
-        </p:txBody>
-      </p:sp>
-      <p:sp>
-        <p:nvSpPr>
-          <p:cNvPr id="3" name="Content Placeholder 2"/>
-          <p:cNvSpPr>
-            <a:spLocks noGrp="1"/>
-          </p:cNvSpPr>
-          <p:nvPr>
-            <p:ph idx="1"/>
-          </p:nvPr>
-        </p:nvSpPr>
-        <p:spPr/>
-        <p:txBody>
-          <a:bodyPr/>
-          <a:lstStyle/>
-          <a:p>
             <a:pPr lvl="0"/>
             <a:r>
               <a:rPr lang="en-US" smtClean="0"/>
@@ -748,7 +2958,7 @@
               <a:rPr lang="en-US" smtClean="0"/>
               <a:t>Fifth level</a:t>
             </a:r>
-            <a:endParaRPr lang="en-GB"/>
+            <a:endParaRPr lang="en-US" dirty="0"/>
           </a:p>
         </p:txBody>
       </p:sp>
@@ -820,7 +3030,7 @@
     </p:spTree>
     <p:extLst>
       <p:ext uri="{BB962C8B-B14F-4D97-AF65-F5344CB8AC3E}">
-        <p14:creationId xmlns:p14="http://schemas.microsoft.com/office/powerpoint/2010/main" val="2263763459"/>
+        <p14:creationId xmlns:p14="http://schemas.microsoft.com/office/powerpoint/2010/main" val="737853053"/>
       </p:ext>
     </p:extLst>
   </p:cSld>
@@ -859,15 +3069,15 @@
         </p:nvSpPr>
         <p:spPr>
           <a:xfrm>
-            <a:off x="831850" y="1709738"/>
-            <a:ext cx="10515600" cy="2852737"/>
+            <a:off x="677335" y="2700867"/>
+            <a:ext cx="8596668" cy="1826581"/>
           </a:xfrm>
         </p:spPr>
         <p:txBody>
           <a:bodyPr anchor="b"/>
           <a:lstStyle>
-            <a:lvl1pPr>
-              <a:defRPr sz="6000"/>
+            <a:lvl1pPr algn="l">
+              <a:defRPr sz="4000" b="0" cap="none"/>
             </a:lvl1pPr>
           </a:lstStyle>
           <a:p>
@@ -875,7 +3085,7 @@
               <a:rPr lang="en-US" smtClean="0"/>
               <a:t>Click to edit Master title style</a:t>
             </a:r>
-            <a:endParaRPr lang="en-GB"/>
+            <a:endParaRPr lang="en-US" dirty="0"/>
           </a:p>
         </p:txBody>
       </p:sp>
@@ -891,96 +3101,97 @@
         </p:nvSpPr>
         <p:spPr>
           <a:xfrm>
-            <a:off x="831850" y="4589463"/>
-            <a:ext cx="10515600" cy="1500187"/>
+            <a:off x="677335" y="4527448"/>
+            <a:ext cx="8596668" cy="860400"/>
           </a:xfrm>
         </p:spPr>
         <p:txBody>
-          <a:bodyPr/>
+          <a:bodyPr anchor="t"/>
           <a:lstStyle>
-            <a:lvl1pPr marL="0" indent="0">
-              <a:buNone/>
-              <a:defRPr sz="2400">
+            <a:lvl1pPr marL="0" indent="0" algn="l">
+              <a:buNone/>
+              <a:defRPr sz="2000">
+                <a:solidFill>
+                  <a:schemeClr val="tx1">
+                    <a:lumMod val="50000"/>
+                    <a:lumOff val="50000"/>
+                  </a:schemeClr>
+                </a:solidFill>
+              </a:defRPr>
+            </a:lvl1pPr>
+            <a:lvl2pPr marL="457200" indent="0">
+              <a:buNone/>
+              <a:defRPr sz="1800">
                 <a:solidFill>
                   <a:schemeClr val="tx1">
                     <a:tint val="75000"/>
                   </a:schemeClr>
                 </a:solidFill>
               </a:defRPr>
-            </a:lvl1pPr>
-            <a:lvl2pPr marL="457200" indent="0">
-              <a:buNone/>
-              <a:defRPr sz="2000">
+            </a:lvl2pPr>
+            <a:lvl3pPr marL="914400" indent="0">
+              <a:buNone/>
+              <a:defRPr sz="1600">
                 <a:solidFill>
                   <a:schemeClr val="tx1">
                     <a:tint val="75000"/>
                   </a:schemeClr>
                 </a:solidFill>
               </a:defRPr>
-            </a:lvl2pPr>
-            <a:lvl3pPr marL="914400" indent="0">
-              <a:buNone/>
-              <a:defRPr sz="1800">
+            </a:lvl3pPr>
+            <a:lvl4pPr marL="1371600" indent="0">
+              <a:buNone/>
+              <a:defRPr sz="1400">
                 <a:solidFill>
                   <a:schemeClr val="tx1">
                     <a:tint val="75000"/>
                   </a:schemeClr>
                 </a:solidFill>
               </a:defRPr>
-            </a:lvl3pPr>
-            <a:lvl4pPr marL="1371600" indent="0">
-              <a:buNone/>
-              <a:defRPr sz="1600">
+            </a:lvl4pPr>
+            <a:lvl5pPr marL="1828800" indent="0">
+              <a:buNone/>
+              <a:defRPr sz="1400">
                 <a:solidFill>
                   <a:schemeClr val="tx1">
                     <a:tint val="75000"/>
                   </a:schemeClr>
                 </a:solidFill>
               </a:defRPr>
-            </a:lvl4pPr>
-            <a:lvl5pPr marL="1828800" indent="0">
-              <a:buNone/>
-              <a:defRPr sz="1600">
+            </a:lvl5pPr>
+            <a:lvl6pPr marL="2286000" indent="0">
+              <a:buNone/>
+              <a:defRPr sz="1400">
                 <a:solidFill>
                   <a:schemeClr val="tx1">
                     <a:tint val="75000"/>
                   </a:schemeClr>
                 </a:solidFill>
               </a:defRPr>
-            </a:lvl5pPr>
-            <a:lvl6pPr marL="2286000" indent="0">
-              <a:buNone/>
-              <a:defRPr sz="1600">
+            </a:lvl6pPr>
+            <a:lvl7pPr marL="2743200" indent="0">
+              <a:buNone/>
+              <a:defRPr sz="1400">
                 <a:solidFill>
                   <a:schemeClr val="tx1">
                     <a:tint val="75000"/>
                   </a:schemeClr>
                 </a:solidFill>
               </a:defRPr>
-            </a:lvl6pPr>
-            <a:lvl7pPr marL="2743200" indent="0">
-              <a:buNone/>
-              <a:defRPr sz="1600">
+            </a:lvl7pPr>
+            <a:lvl8pPr marL="3200400" indent="0">
+              <a:buNone/>
+              <a:defRPr sz="1400">
                 <a:solidFill>
                   <a:schemeClr val="tx1">
                     <a:tint val="75000"/>
                   </a:schemeClr>
                 </a:solidFill>
               </a:defRPr>
-            </a:lvl7pPr>
-            <a:lvl8pPr marL="3200400" indent="0">
-              <a:buNone/>
-              <a:defRPr sz="1600">
-                <a:solidFill>
-                  <a:schemeClr val="tx1">
-                    <a:tint val="75000"/>
-                  </a:schemeClr>
-                </a:solidFill>
-              </a:defRPr>
             </a:lvl8pPr>
             <a:lvl9pPr marL="3657600" indent="0">
               <a:buNone/>
-              <a:defRPr sz="1600">
+              <a:defRPr sz="1400">
                 <a:solidFill>
                   <a:schemeClr val="tx1">
                     <a:tint val="75000"/>
@@ -1066,7 +3277,7 @@
     </p:spTree>
     <p:extLst>
       <p:ext uri="{BB962C8B-B14F-4D97-AF65-F5344CB8AC3E}">
-        <p14:creationId xmlns:p14="http://schemas.microsoft.com/office/powerpoint/2010/main" val="299895578"/>
+        <p14:creationId xmlns:p14="http://schemas.microsoft.com/office/powerpoint/2010/main" val="3436667615"/>
       </p:ext>
     </p:extLst>
   </p:cSld>
@@ -1112,7 +3323,7 @@
               <a:rPr lang="en-US" smtClean="0"/>
               <a:t>Click to edit Master title style</a:t>
             </a:r>
-            <a:endParaRPr lang="en-GB"/>
+            <a:endParaRPr lang="en-US" dirty="0"/>
           </a:p>
         </p:txBody>
       </p:sp>
@@ -1128,8 +3339,8 @@
         </p:nvSpPr>
         <p:spPr>
           <a:xfrm>
-            <a:off x="838200" y="1825625"/>
-            <a:ext cx="5181600" cy="4351338"/>
+            <a:off x="677334" y="2160589"/>
+            <a:ext cx="4184035" cy="3880772"/>
           </a:xfrm>
         </p:spPr>
         <p:txBody>
@@ -1169,7 +3380,7 @@
               <a:rPr lang="en-US" smtClean="0"/>
               <a:t>Fifth level</a:t>
             </a:r>
-            <a:endParaRPr lang="en-GB"/>
+            <a:endParaRPr lang="en-US" dirty="0"/>
           </a:p>
         </p:txBody>
       </p:sp>
@@ -1185,8 +3396,8 @@
         </p:nvSpPr>
         <p:spPr>
           <a:xfrm>
-            <a:off x="6172200" y="1825625"/>
-            <a:ext cx="5181600" cy="4351338"/>
+            <a:off x="5089970" y="2160589"/>
+            <a:ext cx="4184034" cy="3880773"/>
           </a:xfrm>
         </p:spPr>
         <p:txBody>
@@ -1226,7 +3437,7 @@
               <a:rPr lang="en-US" smtClean="0"/>
               <a:t>Fifth level</a:t>
             </a:r>
-            <a:endParaRPr lang="en-GB"/>
+            <a:endParaRPr lang="en-US" dirty="0"/>
           </a:p>
         </p:txBody>
       </p:sp>
@@ -1298,7 +3509,7 @@
     </p:spTree>
     <p:extLst>
       <p:ext uri="{BB962C8B-B14F-4D97-AF65-F5344CB8AC3E}">
-        <p14:creationId xmlns:p14="http://schemas.microsoft.com/office/powerpoint/2010/main" val="465692187"/>
+        <p14:creationId xmlns:p14="http://schemas.microsoft.com/office/powerpoint/2010/main" val="1490031445"/>
       </p:ext>
     </p:extLst>
   </p:cSld>
@@ -1335,46 +3546,47 @@
             <p:ph type="title"/>
           </p:nvPr>
         </p:nvSpPr>
+        <p:spPr/>
+        <p:txBody>
+          <a:bodyPr/>
+          <a:lstStyle>
+            <a:lvl1pPr>
+              <a:defRPr/>
+            </a:lvl1pPr>
+          </a:lstStyle>
+          <a:p>
+            <a:r>
+              <a:rPr lang="en-US" smtClean="0"/>
+              <a:t>Click to edit Master title style</a:t>
+            </a:r>
+            <a:endParaRPr lang="en-US" dirty="0"/>
+          </a:p>
+        </p:txBody>
+      </p:sp>
+      <p:sp>
+        <p:nvSpPr>
+          <p:cNvPr id="3" name="Text Placeholder 2"/>
+          <p:cNvSpPr>
+            <a:spLocks noGrp="1"/>
+          </p:cNvSpPr>
+          <p:nvPr>
+            <p:ph type="body" idx="1"/>
+          </p:nvPr>
+        </p:nvSpPr>
         <p:spPr>
           <a:xfrm>
-            <a:off x="839788" y="365125"/>
-            <a:ext cx="10515600" cy="1325563"/>
+            <a:off x="675745" y="2160983"/>
+            <a:ext cx="4185623" cy="576262"/>
           </a:xfrm>
         </p:spPr>
         <p:txBody>
-          <a:bodyPr/>
-          <a:lstStyle/>
-          <a:p>
-            <a:r>
-              <a:rPr lang="en-US" smtClean="0"/>
-              <a:t>Click to edit Master title style</a:t>
-            </a:r>
-            <a:endParaRPr lang="en-GB"/>
-          </a:p>
-        </p:txBody>
-      </p:sp>
-      <p:sp>
-        <p:nvSpPr>
-          <p:cNvPr id="3" name="Text Placeholder 2"/>
-          <p:cNvSpPr>
-            <a:spLocks noGrp="1"/>
-          </p:cNvSpPr>
-          <p:nvPr>
-            <p:ph type="body" idx="1"/>
-          </p:nvPr>
-        </p:nvSpPr>
-        <p:spPr>
-          <a:xfrm>
-            <a:off x="839788" y="1681163"/>
-            <a:ext cx="5157787" cy="823912"/>
-          </a:xfrm>
-        </p:spPr>
-        <p:txBody>
-          <a:bodyPr anchor="b"/>
+          <a:bodyPr anchor="b">
+            <a:noAutofit/>
+          </a:bodyPr>
           <a:lstStyle>
             <a:lvl1pPr marL="0" indent="0">
               <a:buNone/>
-              <a:defRPr sz="2400" b="1"/>
+              <a:defRPr sz="2400" b="0"/>
             </a:lvl1pPr>
             <a:lvl2pPr marL="457200" indent="0">
               <a:buNone/>
@@ -1430,12 +3642,14 @@
         </p:nvSpPr>
         <p:spPr>
           <a:xfrm>
-            <a:off x="839788" y="2505075"/>
-            <a:ext cx="5157787" cy="3684588"/>
+            <a:off x="675745" y="2737245"/>
+            <a:ext cx="4185623" cy="3304117"/>
           </a:xfrm>
         </p:spPr>
         <p:txBody>
-          <a:bodyPr/>
+          <a:bodyPr>
+            <a:normAutofit/>
+          </a:bodyPr>
           <a:lstStyle/>
           <a:p>
             <a:pPr lvl="0"/>
@@ -1471,7 +3685,7 @@
               <a:rPr lang="en-US" smtClean="0"/>
               <a:t>Fifth level</a:t>
             </a:r>
-            <a:endParaRPr lang="en-GB"/>
+            <a:endParaRPr lang="en-US" dirty="0"/>
           </a:p>
         </p:txBody>
       </p:sp>
@@ -1487,16 +3701,18 @@
         </p:nvSpPr>
         <p:spPr>
           <a:xfrm>
-            <a:off x="6172200" y="1681163"/>
-            <a:ext cx="5183188" cy="823912"/>
+            <a:off x="5088383" y="2160983"/>
+            <a:ext cx="4185618" cy="576262"/>
           </a:xfrm>
         </p:spPr>
         <p:txBody>
-          <a:bodyPr anchor="b"/>
+          <a:bodyPr anchor="b">
+            <a:noAutofit/>
+          </a:bodyPr>
           <a:lstStyle>
             <a:lvl1pPr marL="0" indent="0">
               <a:buNone/>
-              <a:defRPr sz="2400" b="1"/>
+              <a:defRPr sz="2400" b="0"/>
             </a:lvl1pPr>
             <a:lvl2pPr marL="457200" indent="0">
               <a:buNone/>
@@ -1552,12 +3768,14 @@
         </p:nvSpPr>
         <p:spPr>
           <a:xfrm>
-            <a:off x="6172200" y="2505075"/>
-            <a:ext cx="5183188" cy="3684588"/>
+            <a:off x="5088384" y="2737245"/>
+            <a:ext cx="4185617" cy="3304117"/>
           </a:xfrm>
         </p:spPr>
         <p:txBody>
-          <a:bodyPr/>
+          <a:bodyPr>
+            <a:normAutofit/>
+          </a:bodyPr>
           <a:lstStyle/>
           <a:p>
             <a:pPr lvl="0"/>
@@ -1593,7 +3811,7 @@
               <a:rPr lang="en-US" smtClean="0"/>
               <a:t>Fifth level</a:t>
             </a:r>
-            <a:endParaRPr lang="en-GB"/>
+            <a:endParaRPr lang="en-US" dirty="0"/>
           </a:p>
         </p:txBody>
       </p:sp>
@@ -1665,7 +3883,7 @@
     </p:spTree>
     <p:extLst>
       <p:ext uri="{BB962C8B-B14F-4D97-AF65-F5344CB8AC3E}">
-        <p14:creationId xmlns:p14="http://schemas.microsoft.com/office/powerpoint/2010/main" val="639498604"/>
+        <p14:creationId xmlns:p14="http://schemas.microsoft.com/office/powerpoint/2010/main" val="191938061"/>
       </p:ext>
     </p:extLst>
   </p:cSld>
@@ -1702,7 +3920,12 @@
             <p:ph type="title"/>
           </p:nvPr>
         </p:nvSpPr>
-        <p:spPr/>
+        <p:spPr>
+          <a:xfrm>
+            <a:off x="677334" y="609600"/>
+            <a:ext cx="8596668" cy="1320800"/>
+          </a:xfrm>
+        </p:spPr>
         <p:txBody>
           <a:bodyPr/>
           <a:lstStyle/>
@@ -1711,7 +3934,7 @@
               <a:rPr lang="en-US" smtClean="0"/>
               <a:t>Click to edit Master title style</a:t>
             </a:r>
-            <a:endParaRPr lang="en-GB"/>
+            <a:endParaRPr lang="en-US" dirty="0"/>
           </a:p>
         </p:txBody>
       </p:sp>
@@ -1783,7 +4006,7 @@
     </p:spTree>
     <p:extLst>
       <p:ext uri="{BB962C8B-B14F-4D97-AF65-F5344CB8AC3E}">
-        <p14:creationId xmlns:p14="http://schemas.microsoft.com/office/powerpoint/2010/main" val="484057114"/>
+        <p14:creationId xmlns:p14="http://schemas.microsoft.com/office/powerpoint/2010/main" val="1613634377"/>
       </p:ext>
     </p:extLst>
   </p:cSld>
@@ -1878,7 +4101,7 @@
     </p:spTree>
     <p:extLst>
       <p:ext uri="{BB962C8B-B14F-4D97-AF65-F5344CB8AC3E}">
-        <p14:creationId xmlns:p14="http://schemas.microsoft.com/office/powerpoint/2010/main" val="1409473926"/>
+        <p14:creationId xmlns:p14="http://schemas.microsoft.com/office/powerpoint/2010/main" val="2436982935"/>
       </p:ext>
     </p:extLst>
   </p:cSld>
@@ -1917,15 +4140,17 @@
         </p:nvSpPr>
         <p:spPr>
           <a:xfrm>
-            <a:off x="839788" y="457200"/>
-            <a:ext cx="3932237" cy="1600200"/>
+            <a:off x="677334" y="1498604"/>
+            <a:ext cx="3854528" cy="1278466"/>
           </a:xfrm>
         </p:spPr>
         <p:txBody>
-          <a:bodyPr anchor="b"/>
+          <a:bodyPr anchor="b">
+            <a:normAutofit/>
+          </a:bodyPr>
           <a:lstStyle>
             <a:lvl1pPr>
-              <a:defRPr sz="3200"/>
+              <a:defRPr sz="2000"/>
             </a:lvl1pPr>
           </a:lstStyle>
           <a:p>
@@ -1933,7 +4158,7 @@
               <a:rPr lang="en-US" smtClean="0"/>
               <a:t>Click to edit Master title style</a:t>
             </a:r>
-            <a:endParaRPr lang="en-GB"/>
+            <a:endParaRPr lang="en-US" dirty="0"/>
           </a:p>
         </p:txBody>
       </p:sp>
@@ -1949,41 +4174,15 @@
         </p:nvSpPr>
         <p:spPr>
           <a:xfrm>
-            <a:off x="5183188" y="987425"/>
-            <a:ext cx="6172200" cy="4873625"/>
+            <a:off x="4760461" y="514924"/>
+            <a:ext cx="4513541" cy="5526437"/>
           </a:xfrm>
         </p:spPr>
         <p:txBody>
-          <a:bodyPr/>
-          <a:lstStyle>
-            <a:lvl1pPr>
-              <a:defRPr sz="3200"/>
-            </a:lvl1pPr>
-            <a:lvl2pPr>
-              <a:defRPr sz="2800"/>
-            </a:lvl2pPr>
-            <a:lvl3pPr>
-              <a:defRPr sz="2400"/>
-            </a:lvl3pPr>
-            <a:lvl4pPr>
-              <a:defRPr sz="2000"/>
-            </a:lvl4pPr>
-            <a:lvl5pPr>
-              <a:defRPr sz="2000"/>
-            </a:lvl5pPr>
-            <a:lvl6pPr>
-              <a:defRPr sz="2000"/>
-            </a:lvl6pPr>
-            <a:lvl7pPr>
-              <a:defRPr sz="2000"/>
-            </a:lvl7pPr>
-            <a:lvl8pPr>
-              <a:defRPr sz="2000"/>
-            </a:lvl8pPr>
-            <a:lvl9pPr>
-              <a:defRPr sz="2000"/>
-            </a:lvl9pPr>
-          </a:lstStyle>
+          <a:bodyPr>
+            <a:normAutofit/>
+          </a:bodyPr>
+          <a:lstStyle/>
           <a:p>
             <a:pPr lvl="0"/>
             <a:r>
@@ -2018,7 +4217,7 @@
               <a:rPr lang="en-US" smtClean="0"/>
               <a:t>Fifth level</a:t>
             </a:r>
-            <a:endParaRPr lang="en-GB"/>
+            <a:endParaRPr lang="en-US" dirty="0"/>
           </a:p>
         </p:txBody>
       </p:sp>
@@ -2034,46 +4233,48 @@
         </p:nvSpPr>
         <p:spPr>
           <a:xfrm>
-            <a:off x="839788" y="2057400"/>
-            <a:ext cx="3932237" cy="3811588"/>
+            <a:off x="677334" y="2777069"/>
+            <a:ext cx="3854528" cy="2584449"/>
           </a:xfrm>
         </p:spPr>
         <p:txBody>
-          <a:bodyPr/>
+          <a:bodyPr>
+            <a:normAutofit/>
+          </a:bodyPr>
           <a:lstStyle>
             <a:lvl1pPr marL="0" indent="0">
               <a:buNone/>
-              <a:defRPr sz="1600"/>
+              <a:defRPr sz="1400"/>
             </a:lvl1pPr>
-            <a:lvl2pPr marL="457200" indent="0">
+            <a:lvl2pPr marL="457063" indent="0">
               <a:buNone/>
               <a:defRPr sz="1400"/>
             </a:lvl2pPr>
-            <a:lvl3pPr marL="914400" indent="0">
+            <a:lvl3pPr marL="914126" indent="0">
               <a:buNone/>
               <a:defRPr sz="1200"/>
             </a:lvl3pPr>
-            <a:lvl4pPr marL="1371600" indent="0">
+            <a:lvl4pPr marL="1371189" indent="0">
               <a:buNone/>
               <a:defRPr sz="1000"/>
             </a:lvl4pPr>
-            <a:lvl5pPr marL="1828800" indent="0">
+            <a:lvl5pPr marL="1828251" indent="0">
               <a:buNone/>
               <a:defRPr sz="1000"/>
             </a:lvl5pPr>
-            <a:lvl6pPr marL="2286000" indent="0">
+            <a:lvl6pPr marL="2285314" indent="0">
               <a:buNone/>
               <a:defRPr sz="1000"/>
             </a:lvl6pPr>
-            <a:lvl7pPr marL="2743200" indent="0">
+            <a:lvl7pPr marL="2742377" indent="0">
               <a:buNone/>
               <a:defRPr sz="1000"/>
             </a:lvl7pPr>
-            <a:lvl8pPr marL="3200400" indent="0">
+            <a:lvl8pPr marL="3199440" indent="0">
               <a:buNone/>
               <a:defRPr sz="1000"/>
             </a:lvl8pPr>
-            <a:lvl9pPr marL="3657600" indent="0">
+            <a:lvl9pPr marL="3656503" indent="0">
               <a:buNone/>
               <a:defRPr sz="1000"/>
             </a:lvl9pPr>
@@ -2155,7 +4356,7 @@
     </p:spTree>
     <p:extLst>
       <p:ext uri="{BB962C8B-B14F-4D97-AF65-F5344CB8AC3E}">
-        <p14:creationId xmlns:p14="http://schemas.microsoft.com/office/powerpoint/2010/main" val="581138530"/>
+        <p14:creationId xmlns:p14="http://schemas.microsoft.com/office/powerpoint/2010/main" val="2674438781"/>
       </p:ext>
     </p:extLst>
   </p:cSld>
@@ -2194,15 +4395,17 @@
         </p:nvSpPr>
         <p:spPr>
           <a:xfrm>
-            <a:off x="839788" y="457200"/>
-            <a:ext cx="3932237" cy="1600200"/>
+            <a:off x="677334" y="4800600"/>
+            <a:ext cx="8596667" cy="566738"/>
           </a:xfrm>
         </p:spPr>
         <p:txBody>
-          <a:bodyPr anchor="b"/>
+          <a:bodyPr anchor="b">
+            <a:normAutofit/>
+          </a:bodyPr>
           <a:lstStyle>
-            <a:lvl1pPr>
-              <a:defRPr sz="3200"/>
+            <a:lvl1pPr algn="l">
+              <a:defRPr sz="2400" b="0"/>
             </a:lvl1pPr>
           </a:lstStyle>
           <a:p>
@@ -2210,7 +4413,7 @@
               <a:rPr lang="en-US" smtClean="0"/>
               <a:t>Click to edit Master title style</a:t>
             </a:r>
-            <a:endParaRPr lang="en-GB"/>
+            <a:endParaRPr lang="en-US" dirty="0"/>
           </a:p>
         </p:txBody>
       </p:sp>
@@ -2218,7 +4421,7 @@
         <p:nvSpPr>
           <p:cNvPr id="3" name="Picture Placeholder 2"/>
           <p:cNvSpPr>
-            <a:spLocks noGrp="1"/>
+            <a:spLocks noGrp="1" noChangeAspect="1"/>
           </p:cNvSpPr>
           <p:nvPr>
             <p:ph type="pic" idx="1"/>
@@ -2226,109 +4429,117 @@
         </p:nvSpPr>
         <p:spPr>
           <a:xfrm>
-            <a:off x="5183188" y="987425"/>
-            <a:ext cx="6172200" cy="4873625"/>
+            <a:off x="677334" y="609600"/>
+            <a:ext cx="8596668" cy="3845718"/>
           </a:xfrm>
         </p:spPr>
         <p:txBody>
-          <a:bodyPr/>
+          <a:bodyPr anchor="t">
+            <a:normAutofit/>
+          </a:bodyPr>
           <a:lstStyle>
-            <a:lvl1pPr marL="0" indent="0">
-              <a:buNone/>
-              <a:defRPr sz="3200"/>
-            </a:lvl1pPr>
-            <a:lvl2pPr marL="457200" indent="0">
-              <a:buNone/>
-              <a:defRPr sz="2800"/>
-            </a:lvl2pPr>
-            <a:lvl3pPr marL="914400" indent="0">
-              <a:buNone/>
-              <a:defRPr sz="2400"/>
-            </a:lvl3pPr>
-            <a:lvl4pPr marL="1371600" indent="0">
-              <a:buNone/>
-              <a:defRPr sz="2000"/>
-            </a:lvl4pPr>
-            <a:lvl5pPr marL="1828800" indent="0">
-              <a:buNone/>
-              <a:defRPr sz="2000"/>
-            </a:lvl5pPr>
-            <a:lvl6pPr marL="2286000" indent="0">
-              <a:buNone/>
-              <a:defRPr sz="2000"/>
-            </a:lvl6pPr>
-            <a:lvl7pPr marL="2743200" indent="0">
-              <a:buNone/>
-              <a:defRPr sz="2000"/>
-            </a:lvl7pPr>
-            <a:lvl8pPr marL="3200400" indent="0">
-              <a:buNone/>
-              <a:defRPr sz="2000"/>
-            </a:lvl8pPr>
-            <a:lvl9pPr marL="3657600" indent="0">
-              <a:buNone/>
-              <a:defRPr sz="2000"/>
-            </a:lvl9pPr>
-          </a:lstStyle>
-          <a:p>
-            <a:endParaRPr lang="en-GB"/>
-          </a:p>
-        </p:txBody>
-      </p:sp>
-      <p:sp>
-        <p:nvSpPr>
-          <p:cNvPr id="4" name="Text Placeholder 3"/>
-          <p:cNvSpPr>
-            <a:spLocks noGrp="1"/>
-          </p:cNvSpPr>
-          <p:nvPr>
-            <p:ph type="body" sz="half" idx="2"/>
-          </p:nvPr>
-        </p:nvSpPr>
-        <p:spPr>
-          <a:xfrm>
-            <a:off x="839788" y="2057400"/>
-            <a:ext cx="3932237" cy="3811588"/>
-          </a:xfrm>
-        </p:spPr>
-        <p:txBody>
-          <a:bodyPr/>
-          <a:lstStyle>
-            <a:lvl1pPr marL="0" indent="0">
+            <a:lvl1pPr marL="0" indent="0" algn="ctr">
               <a:buNone/>
               <a:defRPr sz="1600"/>
             </a:lvl1pPr>
             <a:lvl2pPr marL="457200" indent="0">
               <a:buNone/>
-              <a:defRPr sz="1400"/>
+              <a:defRPr sz="1600"/>
             </a:lvl2pPr>
             <a:lvl3pPr marL="914400" indent="0">
               <a:buNone/>
-              <a:defRPr sz="1200"/>
+              <a:defRPr sz="1600"/>
             </a:lvl3pPr>
             <a:lvl4pPr marL="1371600" indent="0">
               <a:buNone/>
-              <a:defRPr sz="1000"/>
+              <a:defRPr sz="1600"/>
             </a:lvl4pPr>
             <a:lvl5pPr marL="1828800" indent="0">
               <a:buNone/>
-              <a:defRPr sz="1000"/>
+              <a:defRPr sz="1600"/>
             </a:lvl5pPr>
             <a:lvl6pPr marL="2286000" indent="0">
               <a:buNone/>
-              <a:defRPr sz="1000"/>
+              <a:defRPr sz="1600"/>
             </a:lvl6pPr>
             <a:lvl7pPr marL="2743200" indent="0">
               <a:buNone/>
-              <a:defRPr sz="1000"/>
+              <a:defRPr sz="1600"/>
             </a:lvl7pPr>
             <a:lvl8pPr marL="3200400" indent="0">
               <a:buNone/>
-              <a:defRPr sz="1000"/>
+              <a:defRPr sz="1600"/>
             </a:lvl8pPr>
             <a:lvl9pPr marL="3657600" indent="0">
               <a:buNone/>
+              <a:defRPr sz="1600"/>
+            </a:lvl9pPr>
+          </a:lstStyle>
+          <a:p>
+            <a:r>
+              <a:rPr lang="en-US" smtClean="0"/>
+              <a:t>Click icon to add picture</a:t>
+            </a:r>
+            <a:endParaRPr lang="en-US" dirty="0"/>
+          </a:p>
+        </p:txBody>
+      </p:sp>
+      <p:sp>
+        <p:nvSpPr>
+          <p:cNvPr id="4" name="Text Placeholder 3"/>
+          <p:cNvSpPr>
+            <a:spLocks noGrp="1"/>
+          </p:cNvSpPr>
+          <p:nvPr>
+            <p:ph type="body" sz="half" idx="2"/>
+          </p:nvPr>
+        </p:nvSpPr>
+        <p:spPr>
+          <a:xfrm>
+            <a:off x="677334" y="5367338"/>
+            <a:ext cx="8596667" cy="674024"/>
+          </a:xfrm>
+        </p:spPr>
+        <p:txBody>
+          <a:bodyPr>
+            <a:normAutofit/>
+          </a:bodyPr>
+          <a:lstStyle>
+            <a:lvl1pPr marL="0" indent="0">
+              <a:buNone/>
+              <a:defRPr sz="1200"/>
+            </a:lvl1pPr>
+            <a:lvl2pPr marL="457200" indent="0">
+              <a:buNone/>
+              <a:defRPr sz="1200"/>
+            </a:lvl2pPr>
+            <a:lvl3pPr marL="914400" indent="0">
+              <a:buNone/>
               <a:defRPr sz="1000"/>
+            </a:lvl3pPr>
+            <a:lvl4pPr marL="1371600" indent="0">
+              <a:buNone/>
+              <a:defRPr sz="900"/>
+            </a:lvl4pPr>
+            <a:lvl5pPr marL="1828800" indent="0">
+              <a:buNone/>
+              <a:defRPr sz="900"/>
+            </a:lvl5pPr>
+            <a:lvl6pPr marL="2286000" indent="0">
+              <a:buNone/>
+              <a:defRPr sz="900"/>
+            </a:lvl6pPr>
+            <a:lvl7pPr marL="2743200" indent="0">
+              <a:buNone/>
+              <a:defRPr sz="900"/>
+            </a:lvl7pPr>
+            <a:lvl8pPr marL="3200400" indent="0">
+              <a:buNone/>
+              <a:defRPr sz="900"/>
+            </a:lvl8pPr>
+            <a:lvl9pPr marL="3657600" indent="0">
+              <a:buNone/>
+              <a:defRPr sz="900"/>
             </a:lvl9pPr>
           </a:lstStyle>
           <a:p>
@@ -2408,7 +4619,7 @@
     </p:spTree>
     <p:extLst>
       <p:ext uri="{BB962C8B-B14F-4D97-AF65-F5344CB8AC3E}">
-        <p14:creationId xmlns:p14="http://schemas.microsoft.com/office/powerpoint/2010/main" val="3168466257"/>
+        <p14:creationId xmlns:p14="http://schemas.microsoft.com/office/powerpoint/2010/main" val="3705047850"/>
       </p:ext>
     </p:extLst>
   </p:cSld>
@@ -2422,7 +4633,7 @@
 <p:sldMaster xmlns:a="http://schemas.openxmlformats.org/drawingml/2006/main" xmlns:r="http://schemas.openxmlformats.org/officeDocument/2006/relationships" xmlns:p="http://schemas.openxmlformats.org/presentationml/2006/main">
   <p:cSld>
     <p:bg>
-      <p:bgRef idx="1001">
+      <p:bgRef idx="1003">
         <a:schemeClr val="bg1"/>
       </p:bgRef>
     </p:bg>
@@ -2440,6 +4651,536 @@
           <a:chExt cx="0" cy="0"/>
         </a:xfrm>
       </p:grpSpPr>
+      <p:grpSp>
+        <p:nvGrpSpPr>
+          <p:cNvPr id="7" name="Group 6"/>
+          <p:cNvGrpSpPr/>
+          <p:nvPr/>
+        </p:nvGrpSpPr>
+        <p:grpSpPr>
+          <a:xfrm>
+            <a:off x="0" y="-8467"/>
+            <a:ext cx="12192000" cy="6866467"/>
+            <a:chOff x="0" y="-8467"/>
+            <a:chExt cx="12192000" cy="6866467"/>
+          </a:xfrm>
+        </p:grpSpPr>
+        <p:cxnSp>
+          <p:nvCxnSpPr>
+            <p:cNvPr id="20" name="Straight Connector 19"/>
+            <p:cNvCxnSpPr/>
+            <p:nvPr/>
+          </p:nvCxnSpPr>
+          <p:spPr>
+            <a:xfrm>
+              <a:off x="9371012" y="0"/>
+              <a:ext cx="1219200" cy="6858000"/>
+            </a:xfrm>
+            <a:prstGeom prst="line">
+              <a:avLst/>
+            </a:prstGeom>
+            <a:ln w="9525">
+              <a:solidFill>
+                <a:schemeClr val="bg1">
+                  <a:lumMod val="75000"/>
+                </a:schemeClr>
+              </a:solidFill>
+            </a:ln>
+          </p:spPr>
+          <p:style>
+            <a:lnRef idx="2">
+              <a:schemeClr val="accent1"/>
+            </a:lnRef>
+            <a:fillRef idx="0">
+              <a:schemeClr val="accent1"/>
+            </a:fillRef>
+            <a:effectRef idx="1">
+              <a:schemeClr val="accent1"/>
+            </a:effectRef>
+            <a:fontRef idx="minor">
+              <a:schemeClr val="tx1"/>
+            </a:fontRef>
+          </p:style>
+        </p:cxnSp>
+        <p:cxnSp>
+          <p:nvCxnSpPr>
+            <p:cNvPr id="21" name="Straight Connector 20"/>
+            <p:cNvCxnSpPr/>
+            <p:nvPr/>
+          </p:nvCxnSpPr>
+          <p:spPr>
+            <a:xfrm flipH="1">
+              <a:off x="7425267" y="3681413"/>
+              <a:ext cx="4763558" cy="3176587"/>
+            </a:xfrm>
+            <a:prstGeom prst="line">
+              <a:avLst/>
+            </a:prstGeom>
+            <a:ln w="9525">
+              <a:solidFill>
+                <a:schemeClr val="bg1">
+                  <a:lumMod val="85000"/>
+                </a:schemeClr>
+              </a:solidFill>
+            </a:ln>
+          </p:spPr>
+          <p:style>
+            <a:lnRef idx="2">
+              <a:schemeClr val="accent1"/>
+            </a:lnRef>
+            <a:fillRef idx="0">
+              <a:schemeClr val="accent1"/>
+            </a:fillRef>
+            <a:effectRef idx="1">
+              <a:schemeClr val="accent1"/>
+            </a:effectRef>
+            <a:fontRef idx="minor">
+              <a:schemeClr val="tx1"/>
+            </a:fontRef>
+          </p:style>
+        </p:cxnSp>
+        <p:sp>
+          <p:nvSpPr>
+            <p:cNvPr id="22" name="Rectangle 23"/>
+            <p:cNvSpPr/>
+            <p:nvPr/>
+          </p:nvSpPr>
+          <p:spPr>
+            <a:xfrm>
+              <a:off x="9181476" y="-8467"/>
+              <a:ext cx="3007349" cy="6866467"/>
+            </a:xfrm>
+            <a:custGeom>
+              <a:avLst/>
+              <a:gdLst/>
+              <a:ahLst/>
+              <a:cxnLst/>
+              <a:rect l="l" t="t" r="r" b="b"/>
+              <a:pathLst>
+                <a:path w="3007349" h="6866467">
+                  <a:moveTo>
+                    <a:pt x="2045532" y="0"/>
+                  </a:moveTo>
+                  <a:lnTo>
+                    <a:pt x="3007349" y="0"/>
+                  </a:lnTo>
+                  <a:lnTo>
+                    <a:pt x="3007349" y="6866467"/>
+                  </a:lnTo>
+                  <a:lnTo>
+                    <a:pt x="0" y="6866467"/>
+                  </a:lnTo>
+                  <a:lnTo>
+                    <a:pt x="2045532" y="0"/>
+                  </a:lnTo>
+                  <a:close/>
+                </a:path>
+              </a:pathLst>
+            </a:custGeom>
+            <a:solidFill>
+              <a:schemeClr val="accent1">
+                <a:alpha val="30000"/>
+              </a:schemeClr>
+            </a:solidFill>
+            <a:ln>
+              <a:noFill/>
+            </a:ln>
+            <a:effectLst/>
+          </p:spPr>
+          <p:style>
+            <a:lnRef idx="1">
+              <a:schemeClr val="accent1"/>
+            </a:lnRef>
+            <a:fillRef idx="3">
+              <a:schemeClr val="accent1"/>
+            </a:fillRef>
+            <a:effectRef idx="2">
+              <a:schemeClr val="accent1"/>
+            </a:effectRef>
+            <a:fontRef idx="minor">
+              <a:schemeClr val="lt1"/>
+            </a:fontRef>
+          </p:style>
+        </p:sp>
+        <p:sp>
+          <p:nvSpPr>
+            <p:cNvPr id="23" name="Rectangle 25"/>
+            <p:cNvSpPr/>
+            <p:nvPr/>
+          </p:nvSpPr>
+          <p:spPr>
+            <a:xfrm>
+              <a:off x="9603442" y="-8467"/>
+              <a:ext cx="2588558" cy="6866467"/>
+            </a:xfrm>
+            <a:custGeom>
+              <a:avLst/>
+              <a:gdLst/>
+              <a:ahLst/>
+              <a:cxnLst/>
+              <a:rect l="l" t="t" r="r" b="b"/>
+              <a:pathLst>
+                <a:path w="2573311" h="6866467">
+                  <a:moveTo>
+                    <a:pt x="0" y="0"/>
+                  </a:moveTo>
+                  <a:lnTo>
+                    <a:pt x="2573311" y="0"/>
+                  </a:lnTo>
+                  <a:lnTo>
+                    <a:pt x="2573311" y="6866467"/>
+                  </a:lnTo>
+                  <a:lnTo>
+                    <a:pt x="1202336" y="6866467"/>
+                  </a:lnTo>
+                  <a:lnTo>
+                    <a:pt x="0" y="0"/>
+                  </a:lnTo>
+                  <a:close/>
+                </a:path>
+              </a:pathLst>
+            </a:custGeom>
+            <a:solidFill>
+              <a:schemeClr val="accent1">
+                <a:alpha val="20000"/>
+              </a:schemeClr>
+            </a:solidFill>
+            <a:ln>
+              <a:noFill/>
+            </a:ln>
+            <a:effectLst/>
+          </p:spPr>
+          <p:style>
+            <a:lnRef idx="1">
+              <a:schemeClr val="accent1"/>
+            </a:lnRef>
+            <a:fillRef idx="3">
+              <a:schemeClr val="accent1"/>
+            </a:fillRef>
+            <a:effectRef idx="2">
+              <a:schemeClr val="accent1"/>
+            </a:effectRef>
+            <a:fontRef idx="minor">
+              <a:schemeClr val="lt1"/>
+            </a:fontRef>
+          </p:style>
+        </p:sp>
+        <p:sp>
+          <p:nvSpPr>
+            <p:cNvPr id="24" name="Isosceles Triangle 23"/>
+            <p:cNvSpPr/>
+            <p:nvPr/>
+          </p:nvSpPr>
+          <p:spPr>
+            <a:xfrm>
+              <a:off x="8932333" y="3048000"/>
+              <a:ext cx="3259667" cy="3810000"/>
+            </a:xfrm>
+            <a:prstGeom prst="triangle">
+              <a:avLst>
+                <a:gd name="adj" fmla="val 100000"/>
+              </a:avLst>
+            </a:prstGeom>
+            <a:solidFill>
+              <a:schemeClr val="accent2">
+                <a:alpha val="72000"/>
+              </a:schemeClr>
+            </a:solidFill>
+            <a:ln>
+              <a:noFill/>
+            </a:ln>
+            <a:effectLst/>
+          </p:spPr>
+          <p:style>
+            <a:lnRef idx="1">
+              <a:schemeClr val="accent1"/>
+            </a:lnRef>
+            <a:fillRef idx="3">
+              <a:schemeClr val="accent1"/>
+            </a:fillRef>
+            <a:effectRef idx="2">
+              <a:schemeClr val="accent1"/>
+            </a:effectRef>
+            <a:fontRef idx="minor">
+              <a:schemeClr val="lt1"/>
+            </a:fontRef>
+          </p:style>
+        </p:sp>
+        <p:sp>
+          <p:nvSpPr>
+            <p:cNvPr id="25" name="Rectangle 27"/>
+            <p:cNvSpPr/>
+            <p:nvPr/>
+          </p:nvSpPr>
+          <p:spPr>
+            <a:xfrm>
+              <a:off x="9334500" y="-8467"/>
+              <a:ext cx="2854326" cy="6866467"/>
+            </a:xfrm>
+            <a:custGeom>
+              <a:avLst/>
+              <a:gdLst/>
+              <a:ahLst/>
+              <a:cxnLst/>
+              <a:rect l="l" t="t" r="r" b="b"/>
+              <a:pathLst>
+                <a:path w="2858013" h="6866467">
+                  <a:moveTo>
+                    <a:pt x="0" y="0"/>
+                  </a:moveTo>
+                  <a:lnTo>
+                    <a:pt x="2858013" y="0"/>
+                  </a:lnTo>
+                  <a:lnTo>
+                    <a:pt x="2858013" y="6866467"/>
+                  </a:lnTo>
+                  <a:lnTo>
+                    <a:pt x="2473942" y="6866467"/>
+                  </a:lnTo>
+                  <a:lnTo>
+                    <a:pt x="0" y="0"/>
+                  </a:lnTo>
+                  <a:close/>
+                </a:path>
+              </a:pathLst>
+            </a:custGeom>
+            <a:solidFill>
+              <a:schemeClr val="accent2">
+                <a:lumMod val="75000"/>
+                <a:alpha val="70000"/>
+              </a:schemeClr>
+            </a:solidFill>
+            <a:ln>
+              <a:noFill/>
+            </a:ln>
+            <a:effectLst/>
+          </p:spPr>
+          <p:style>
+            <a:lnRef idx="1">
+              <a:schemeClr val="accent1"/>
+            </a:lnRef>
+            <a:fillRef idx="3">
+              <a:schemeClr val="accent1"/>
+            </a:fillRef>
+            <a:effectRef idx="2">
+              <a:schemeClr val="accent1"/>
+            </a:effectRef>
+            <a:fontRef idx="minor">
+              <a:schemeClr val="lt1"/>
+            </a:fontRef>
+          </p:style>
+        </p:sp>
+        <p:sp>
+          <p:nvSpPr>
+            <p:cNvPr id="26" name="Rectangle 28"/>
+            <p:cNvSpPr/>
+            <p:nvPr/>
+          </p:nvSpPr>
+          <p:spPr>
+            <a:xfrm>
+              <a:off x="10898730" y="-8467"/>
+              <a:ext cx="1290094" cy="6866467"/>
+            </a:xfrm>
+            <a:custGeom>
+              <a:avLst/>
+              <a:gdLst/>
+              <a:ahLst/>
+              <a:cxnLst/>
+              <a:rect l="l" t="t" r="r" b="b"/>
+              <a:pathLst>
+                <a:path w="1290094" h="6858000">
+                  <a:moveTo>
+                    <a:pt x="1019735" y="0"/>
+                  </a:moveTo>
+                  <a:lnTo>
+                    <a:pt x="1290094" y="0"/>
+                  </a:lnTo>
+                  <a:lnTo>
+                    <a:pt x="1290094" y="6858000"/>
+                  </a:lnTo>
+                  <a:lnTo>
+                    <a:pt x="0" y="6858000"/>
+                  </a:lnTo>
+                  <a:lnTo>
+                    <a:pt x="1019735" y="0"/>
+                  </a:lnTo>
+                  <a:close/>
+                </a:path>
+              </a:pathLst>
+            </a:custGeom>
+            <a:solidFill>
+              <a:schemeClr val="accent1">
+                <a:lumMod val="60000"/>
+                <a:lumOff val="40000"/>
+                <a:alpha val="70000"/>
+              </a:schemeClr>
+            </a:solidFill>
+            <a:ln>
+              <a:noFill/>
+            </a:ln>
+            <a:effectLst/>
+          </p:spPr>
+          <p:style>
+            <a:lnRef idx="1">
+              <a:schemeClr val="accent1"/>
+            </a:lnRef>
+            <a:fillRef idx="3">
+              <a:schemeClr val="accent1"/>
+            </a:fillRef>
+            <a:effectRef idx="2">
+              <a:schemeClr val="accent1"/>
+            </a:effectRef>
+            <a:fontRef idx="minor">
+              <a:schemeClr val="lt1"/>
+            </a:fontRef>
+          </p:style>
+        </p:sp>
+        <p:sp>
+          <p:nvSpPr>
+            <p:cNvPr id="27" name="Rectangle 29"/>
+            <p:cNvSpPr/>
+            <p:nvPr/>
+          </p:nvSpPr>
+          <p:spPr>
+            <a:xfrm>
+              <a:off x="10938999" y="-8467"/>
+              <a:ext cx="1249825" cy="6866467"/>
+            </a:xfrm>
+            <a:custGeom>
+              <a:avLst/>
+              <a:gdLst/>
+              <a:ahLst/>
+              <a:cxnLst/>
+              <a:rect l="l" t="t" r="r" b="b"/>
+              <a:pathLst>
+                <a:path w="1249825" h="6858000">
+                  <a:moveTo>
+                    <a:pt x="0" y="0"/>
+                  </a:moveTo>
+                  <a:lnTo>
+                    <a:pt x="1249825" y="0"/>
+                  </a:lnTo>
+                  <a:lnTo>
+                    <a:pt x="1249825" y="6858000"/>
+                  </a:lnTo>
+                  <a:lnTo>
+                    <a:pt x="1109382" y="6858000"/>
+                  </a:lnTo>
+                  <a:lnTo>
+                    <a:pt x="0" y="0"/>
+                  </a:lnTo>
+                  <a:close/>
+                </a:path>
+              </a:pathLst>
+            </a:custGeom>
+            <a:solidFill>
+              <a:schemeClr val="accent1">
+                <a:alpha val="65000"/>
+              </a:schemeClr>
+            </a:solidFill>
+            <a:ln>
+              <a:noFill/>
+            </a:ln>
+            <a:effectLst/>
+          </p:spPr>
+          <p:style>
+            <a:lnRef idx="1">
+              <a:schemeClr val="accent1"/>
+            </a:lnRef>
+            <a:fillRef idx="3">
+              <a:schemeClr val="accent1"/>
+            </a:fillRef>
+            <a:effectRef idx="2">
+              <a:schemeClr val="accent1"/>
+            </a:effectRef>
+            <a:fontRef idx="minor">
+              <a:schemeClr val="lt1"/>
+            </a:fontRef>
+          </p:style>
+        </p:sp>
+        <p:sp>
+          <p:nvSpPr>
+            <p:cNvPr id="28" name="Isosceles Triangle 27"/>
+            <p:cNvSpPr/>
+            <p:nvPr/>
+          </p:nvSpPr>
+          <p:spPr>
+            <a:xfrm>
+              <a:off x="10371666" y="3589867"/>
+              <a:ext cx="1817159" cy="3268133"/>
+            </a:xfrm>
+            <a:prstGeom prst="triangle">
+              <a:avLst>
+                <a:gd name="adj" fmla="val 100000"/>
+              </a:avLst>
+            </a:prstGeom>
+            <a:solidFill>
+              <a:schemeClr val="accent1">
+                <a:alpha val="80000"/>
+              </a:schemeClr>
+            </a:solidFill>
+            <a:ln>
+              <a:noFill/>
+            </a:ln>
+            <a:effectLst/>
+          </p:spPr>
+          <p:style>
+            <a:lnRef idx="1">
+              <a:schemeClr val="accent1"/>
+            </a:lnRef>
+            <a:fillRef idx="3">
+              <a:schemeClr val="accent1"/>
+            </a:fillRef>
+            <a:effectRef idx="2">
+              <a:schemeClr val="accent1"/>
+            </a:effectRef>
+            <a:fontRef idx="minor">
+              <a:schemeClr val="lt1"/>
+            </a:fontRef>
+          </p:style>
+        </p:sp>
+        <p:sp>
+          <p:nvSpPr>
+            <p:cNvPr id="29" name="Isosceles Triangle 28"/>
+            <p:cNvSpPr/>
+            <p:nvPr/>
+          </p:nvSpPr>
+          <p:spPr>
+            <a:xfrm>
+              <a:off x="0" y="4013200"/>
+              <a:ext cx="448733" cy="2844800"/>
+            </a:xfrm>
+            <a:prstGeom prst="triangle">
+              <a:avLst>
+                <a:gd name="adj" fmla="val 0"/>
+              </a:avLst>
+            </a:prstGeom>
+            <a:solidFill>
+              <a:schemeClr val="accent1">
+                <a:alpha val="85000"/>
+              </a:schemeClr>
+            </a:solidFill>
+            <a:ln>
+              <a:noFill/>
+            </a:ln>
+            <a:effectLst/>
+          </p:spPr>
+          <p:style>
+            <a:lnRef idx="1">
+              <a:schemeClr val="accent1"/>
+            </a:lnRef>
+            <a:fillRef idx="3">
+              <a:schemeClr val="accent1"/>
+            </a:fillRef>
+            <a:effectRef idx="2">
+              <a:schemeClr val="accent1"/>
+            </a:effectRef>
+            <a:fontRef idx="minor">
+              <a:schemeClr val="lt1"/>
+            </a:fontRef>
+          </p:style>
+        </p:sp>
+      </p:grpSp>
       <p:sp>
         <p:nvSpPr>
           <p:cNvPr id="2" name="Title Placeholder 1"/>
@@ -2452,15 +5193,15 @@
         </p:nvSpPr>
         <p:spPr>
           <a:xfrm>
-            <a:off x="838200" y="365125"/>
-            <a:ext cx="10515600" cy="1325563"/>
+            <a:off x="677334" y="609600"/>
+            <a:ext cx="8596668" cy="1320800"/>
           </a:xfrm>
           <a:prstGeom prst="rect">
             <a:avLst/>
           </a:prstGeom>
         </p:spPr>
         <p:txBody>
-          <a:bodyPr vert="horz" lIns="91440" tIns="45720" rIns="91440" bIns="45720" rtlCol="0" anchor="ctr">
+          <a:bodyPr vert="horz" lIns="91440" tIns="45720" rIns="91440" bIns="45720" rtlCol="0" anchor="t">
             <a:normAutofit/>
           </a:bodyPr>
           <a:lstStyle/>
@@ -2469,7 +5210,7 @@
               <a:rPr lang="en-US" smtClean="0"/>
               <a:t>Click to edit Master title style</a:t>
             </a:r>
-            <a:endParaRPr lang="en-GB"/>
+            <a:endParaRPr lang="en-US" dirty="0"/>
           </a:p>
         </p:txBody>
       </p:sp>
@@ -2485,8 +5226,8 @@
         </p:nvSpPr>
         <p:spPr>
           <a:xfrm>
-            <a:off x="838200" y="1825625"/>
-            <a:ext cx="10515600" cy="4351338"/>
+            <a:off x="677334" y="2160589"/>
+            <a:ext cx="8596668" cy="3880773"/>
           </a:xfrm>
           <a:prstGeom prst="rect">
             <a:avLst/>
@@ -2531,7 +5272,7 @@
               <a:rPr lang="en-US" smtClean="0"/>
               <a:t>Fifth level</a:t>
             </a:r>
-            <a:endParaRPr lang="en-GB"/>
+            <a:endParaRPr lang="en-US" dirty="0"/>
           </a:p>
         </p:txBody>
       </p:sp>
@@ -2547,8 +5288,8 @@
         </p:nvSpPr>
         <p:spPr>
           <a:xfrm>
-            <a:off x="838200" y="6356350"/>
-            <a:ext cx="2743200" cy="365125"/>
+            <a:off x="7205133" y="6041362"/>
+            <a:ext cx="911939" cy="365125"/>
           </a:xfrm>
           <a:prstGeom prst="rect">
             <a:avLst/>
@@ -2557,8 +5298,8 @@
         <p:txBody>
           <a:bodyPr vert="horz" lIns="91440" tIns="45720" rIns="91440" bIns="45720" rtlCol="0" anchor="ctr"/>
           <a:lstStyle>
-            <a:lvl1pPr algn="l">
-              <a:defRPr sz="1200">
+            <a:lvl1pPr algn="r">
+              <a:defRPr sz="900">
                 <a:solidFill>
                   <a:schemeClr val="tx1">
                     <a:tint val="75000"/>
@@ -2588,8 +5329,8 @@
         </p:nvSpPr>
         <p:spPr>
           <a:xfrm>
-            <a:off x="4038600" y="6356350"/>
-            <a:ext cx="4114800" cy="365125"/>
+            <a:off x="677334" y="6041362"/>
+            <a:ext cx="6297612" cy="365125"/>
           </a:xfrm>
           <a:prstGeom prst="rect">
             <a:avLst/>
@@ -2598,8 +5339,8 @@
         <p:txBody>
           <a:bodyPr vert="horz" lIns="91440" tIns="45720" rIns="91440" bIns="45720" rtlCol="0" anchor="ctr"/>
           <a:lstStyle>
-            <a:lvl1pPr algn="ctr">
-              <a:defRPr sz="1200">
+            <a:lvl1pPr algn="l">
+              <a:defRPr sz="900">
                 <a:solidFill>
                   <a:schemeClr val="tx1">
                     <a:tint val="75000"/>
@@ -2625,8 +5366,8 @@
         </p:nvSpPr>
         <p:spPr>
           <a:xfrm>
-            <a:off x="8610600" y="6356350"/>
-            <a:ext cx="2743200" cy="365125"/>
+            <a:off x="8590663" y="6041362"/>
+            <a:ext cx="683339" cy="365125"/>
           </a:xfrm>
           <a:prstGeom prst="rect">
             <a:avLst/>
@@ -2636,11 +5377,9 @@
           <a:bodyPr vert="horz" lIns="91440" tIns="45720" rIns="91440" bIns="45720" rtlCol="0" anchor="ctr"/>
           <a:lstStyle>
             <a:lvl1pPr algn="r">
-              <a:defRPr sz="1200">
-                <a:solidFill>
-                  <a:schemeClr val="tx1">
-                    <a:tint val="75000"/>
-                  </a:schemeClr>
+              <a:defRPr sz="900">
+                <a:solidFill>
+                  <a:schemeClr val="accent1"/>
                 </a:solidFill>
               </a:defRPr>
             </a:lvl1pPr>
@@ -2657,201 +5396,322 @@
     </p:spTree>
     <p:extLst>
       <p:ext uri="{BB962C8B-B14F-4D97-AF65-F5344CB8AC3E}">
-        <p14:creationId xmlns:p14="http://schemas.microsoft.com/office/powerpoint/2010/main" val="2207093811"/>
+        <p14:creationId xmlns:p14="http://schemas.microsoft.com/office/powerpoint/2010/main" val="2644251332"/>
       </p:ext>
     </p:extLst>
   </p:cSld>
-  <p:clrMap bg1="lt1" tx1="dk1" bg2="lt2" tx2="dk2" accent1="accent1" accent2="accent2" accent3="accent3" accent4="accent4" accent5="accent5" accent6="accent6" hlink="hlink" folHlink="folHlink"/>
+  <p:clrMap bg1="dk1" tx1="lt1" bg2="dk2" tx2="lt2" accent1="accent1" accent2="accent2" accent3="accent3" accent4="accent4" accent5="accent5" accent6="accent6" hlink="hlink" folHlink="folHlink"/>
   <p:sldLayoutIdLst>
-    <p:sldLayoutId id="2147483649" r:id="rId1"/>
-    <p:sldLayoutId id="2147483650" r:id="rId2"/>
-    <p:sldLayoutId id="2147483651" r:id="rId3"/>
-    <p:sldLayoutId id="2147483652" r:id="rId4"/>
-    <p:sldLayoutId id="2147483653" r:id="rId5"/>
-    <p:sldLayoutId id="2147483654" r:id="rId6"/>
-    <p:sldLayoutId id="2147483655" r:id="rId7"/>
-    <p:sldLayoutId id="2147483656" r:id="rId8"/>
-    <p:sldLayoutId id="2147483657" r:id="rId9"/>
-    <p:sldLayoutId id="2147483658" r:id="rId10"/>
-    <p:sldLayoutId id="2147483659" r:id="rId11"/>
+    <p:sldLayoutId id="2147483661" r:id="rId1"/>
+    <p:sldLayoutId id="2147483662" r:id="rId2"/>
+    <p:sldLayoutId id="2147483663" r:id="rId3"/>
+    <p:sldLayoutId id="2147483664" r:id="rId4"/>
+    <p:sldLayoutId id="2147483665" r:id="rId5"/>
+    <p:sldLayoutId id="2147483666" r:id="rId6"/>
+    <p:sldLayoutId id="2147483667" r:id="rId7"/>
+    <p:sldLayoutId id="2147483668" r:id="rId8"/>
+    <p:sldLayoutId id="2147483669" r:id="rId9"/>
+    <p:sldLayoutId id="2147483670" r:id="rId10"/>
+    <p:sldLayoutId id="2147483671" r:id="rId11"/>
+    <p:sldLayoutId id="2147483672" r:id="rId12"/>
+    <p:sldLayoutId id="2147483673" r:id="rId13"/>
+    <p:sldLayoutId id="2147483674" r:id="rId14"/>
+    <p:sldLayoutId id="2147483675" r:id="rId15"/>
+    <p:sldLayoutId id="2147483676" r:id="rId16"/>
   </p:sldLayoutIdLst>
   <p:txStyles>
     <p:titleStyle>
-      <a:lvl1pPr algn="l" defTabSz="914400" rtl="0" eaLnBrk="1" latinLnBrk="0" hangingPunct="1">
-        <a:lnSpc>
-          <a:spcPct val="90000"/>
-        </a:lnSpc>
+      <a:lvl1pPr algn="l" defTabSz="457200" rtl="0" eaLnBrk="1" latinLnBrk="0" hangingPunct="1">
         <a:spcBef>
           <a:spcPct val="0"/>
         </a:spcBef>
         <a:buNone/>
-        <a:defRPr sz="4400" kern="1200">
+        <a:defRPr sz="3600" kern="1200">
           <a:solidFill>
-            <a:schemeClr val="tx1"/>
+            <a:schemeClr val="accent1"/>
           </a:solidFill>
           <a:latin typeface="+mj-lt"/>
           <a:ea typeface="+mj-ea"/>
           <a:cs typeface="+mj-cs"/>
         </a:defRPr>
       </a:lvl1pPr>
+      <a:lvl2pPr eaLnBrk="1" hangingPunct="1">
+        <a:defRPr>
+          <a:solidFill>
+            <a:schemeClr val="tx2"/>
+          </a:solidFill>
+        </a:defRPr>
+      </a:lvl2pPr>
+      <a:lvl3pPr eaLnBrk="1" hangingPunct="1">
+        <a:defRPr>
+          <a:solidFill>
+            <a:schemeClr val="tx2"/>
+          </a:solidFill>
+        </a:defRPr>
+      </a:lvl3pPr>
+      <a:lvl4pPr eaLnBrk="1" hangingPunct="1">
+        <a:defRPr>
+          <a:solidFill>
+            <a:schemeClr val="tx2"/>
+          </a:solidFill>
+        </a:defRPr>
+      </a:lvl4pPr>
+      <a:lvl5pPr eaLnBrk="1" hangingPunct="1">
+        <a:defRPr>
+          <a:solidFill>
+            <a:schemeClr val="tx2"/>
+          </a:solidFill>
+        </a:defRPr>
+      </a:lvl5pPr>
+      <a:lvl6pPr eaLnBrk="1" hangingPunct="1">
+        <a:defRPr>
+          <a:solidFill>
+            <a:schemeClr val="tx2"/>
+          </a:solidFill>
+        </a:defRPr>
+      </a:lvl6pPr>
+      <a:lvl7pPr eaLnBrk="1" hangingPunct="1">
+        <a:defRPr>
+          <a:solidFill>
+            <a:schemeClr val="tx2"/>
+          </a:solidFill>
+        </a:defRPr>
+      </a:lvl7pPr>
+      <a:lvl8pPr eaLnBrk="1" hangingPunct="1">
+        <a:defRPr>
+          <a:solidFill>
+            <a:schemeClr val="tx2"/>
+          </a:solidFill>
+        </a:defRPr>
+      </a:lvl8pPr>
+      <a:lvl9pPr eaLnBrk="1" hangingPunct="1">
+        <a:defRPr>
+          <a:solidFill>
+            <a:schemeClr val="tx2"/>
+          </a:solidFill>
+        </a:defRPr>
+      </a:lvl9pPr>
     </p:titleStyle>
     <p:bodyStyle>
-      <a:lvl1pPr marL="228600" indent="-228600" algn="l" defTabSz="914400" rtl="0" eaLnBrk="1" latinLnBrk="0" hangingPunct="1">
-        <a:lnSpc>
-          <a:spcPct val="90000"/>
-        </a:lnSpc>
+      <a:lvl1pPr marL="342900" indent="-342900" algn="l" defTabSz="457200" rtl="0" eaLnBrk="1" latinLnBrk="0" hangingPunct="1">
         <a:spcBef>
           <a:spcPts val="1000"/>
         </a:spcBef>
-        <a:buFont typeface="Arial" panose="020B0604020202020204" pitchFamily="34" charset="0"/>
-        <a:buChar char="•"/>
-        <a:defRPr sz="2800" kern="1200">
+        <a:spcAft>
+          <a:spcPts val="0"/>
+        </a:spcAft>
+        <a:buClr>
+          <a:schemeClr val="accent1"/>
+        </a:buClr>
+        <a:buSzPct val="80000"/>
+        <a:buFont typeface="Wingdings 3" charset="2"/>
+        <a:buChar char=""/>
+        <a:defRPr sz="1800" kern="1200">
           <a:solidFill>
-            <a:schemeClr val="tx1"/>
+            <a:schemeClr val="tx1">
+              <a:lumMod val="75000"/>
+              <a:lumOff val="25000"/>
+            </a:schemeClr>
           </a:solidFill>
           <a:latin typeface="+mn-lt"/>
           <a:ea typeface="+mn-ea"/>
           <a:cs typeface="+mn-cs"/>
         </a:defRPr>
       </a:lvl1pPr>
-      <a:lvl2pPr marL="685800" indent="-228600" algn="l" defTabSz="914400" rtl="0" eaLnBrk="1" latinLnBrk="0" hangingPunct="1">
-        <a:lnSpc>
-          <a:spcPct val="90000"/>
-        </a:lnSpc>
+      <a:lvl2pPr marL="742950" indent="-285750" algn="l" defTabSz="457200" rtl="0" eaLnBrk="1" latinLnBrk="0" hangingPunct="1">
         <a:spcBef>
-          <a:spcPts val="500"/>
+          <a:spcPts val="1000"/>
         </a:spcBef>
-        <a:buFont typeface="Arial" panose="020B0604020202020204" pitchFamily="34" charset="0"/>
-        <a:buChar char="•"/>
-        <a:defRPr sz="2400" kern="1200">
+        <a:spcAft>
+          <a:spcPts val="0"/>
+        </a:spcAft>
+        <a:buClr>
+          <a:schemeClr val="accent1"/>
+        </a:buClr>
+        <a:buSzPct val="80000"/>
+        <a:buFont typeface="Wingdings 3" charset="2"/>
+        <a:buChar char=""/>
+        <a:defRPr sz="1600" kern="1200">
           <a:solidFill>
-            <a:schemeClr val="tx1"/>
+            <a:schemeClr val="tx1">
+              <a:lumMod val="75000"/>
+              <a:lumOff val="25000"/>
+            </a:schemeClr>
           </a:solidFill>
           <a:latin typeface="+mn-lt"/>
           <a:ea typeface="+mn-ea"/>
           <a:cs typeface="+mn-cs"/>
         </a:defRPr>
       </a:lvl2pPr>
-      <a:lvl3pPr marL="1143000" indent="-228600" algn="l" defTabSz="914400" rtl="0" eaLnBrk="1" latinLnBrk="0" hangingPunct="1">
-        <a:lnSpc>
-          <a:spcPct val="90000"/>
-        </a:lnSpc>
+      <a:lvl3pPr marL="1143000" indent="-228600" algn="l" defTabSz="457200" rtl="0" eaLnBrk="1" latinLnBrk="0" hangingPunct="1">
         <a:spcBef>
-          <a:spcPts val="500"/>
+          <a:spcPts val="1000"/>
         </a:spcBef>
-        <a:buFont typeface="Arial" panose="020B0604020202020204" pitchFamily="34" charset="0"/>
-        <a:buChar char="•"/>
-        <a:defRPr sz="2000" kern="1200">
+        <a:spcAft>
+          <a:spcPts val="0"/>
+        </a:spcAft>
+        <a:buClr>
+          <a:schemeClr val="accent1"/>
+        </a:buClr>
+        <a:buSzPct val="80000"/>
+        <a:buFont typeface="Wingdings 3" charset="2"/>
+        <a:buChar char=""/>
+        <a:defRPr sz="1400" kern="1200">
           <a:solidFill>
-            <a:schemeClr val="tx1"/>
+            <a:schemeClr val="tx1">
+              <a:lumMod val="75000"/>
+              <a:lumOff val="25000"/>
+            </a:schemeClr>
           </a:solidFill>
           <a:latin typeface="+mn-lt"/>
           <a:ea typeface="+mn-ea"/>
           <a:cs typeface="+mn-cs"/>
         </a:defRPr>
       </a:lvl3pPr>
-      <a:lvl4pPr marL="1600200" indent="-228600" algn="l" defTabSz="914400" rtl="0" eaLnBrk="1" latinLnBrk="0" hangingPunct="1">
-        <a:lnSpc>
-          <a:spcPct val="90000"/>
-        </a:lnSpc>
+      <a:lvl4pPr marL="1600200" indent="-228600" algn="l" defTabSz="457200" rtl="0" eaLnBrk="1" latinLnBrk="0" hangingPunct="1">
         <a:spcBef>
-          <a:spcPts val="500"/>
+          <a:spcPts val="1000"/>
         </a:spcBef>
-        <a:buFont typeface="Arial" panose="020B0604020202020204" pitchFamily="34" charset="0"/>
-        <a:buChar char="•"/>
-        <a:defRPr sz="1800" kern="1200">
+        <a:spcAft>
+          <a:spcPts val="0"/>
+        </a:spcAft>
+        <a:buClr>
+          <a:schemeClr val="accent1"/>
+        </a:buClr>
+        <a:buSzPct val="80000"/>
+        <a:buFont typeface="Wingdings 3" charset="2"/>
+        <a:buChar char=""/>
+        <a:defRPr sz="1200" kern="1200">
           <a:solidFill>
-            <a:schemeClr val="tx1"/>
+            <a:schemeClr val="tx1">
+              <a:lumMod val="75000"/>
+              <a:lumOff val="25000"/>
+            </a:schemeClr>
           </a:solidFill>
           <a:latin typeface="+mn-lt"/>
           <a:ea typeface="+mn-ea"/>
           <a:cs typeface="+mn-cs"/>
         </a:defRPr>
       </a:lvl4pPr>
-      <a:lvl5pPr marL="2057400" indent="-228600" algn="l" defTabSz="914400" rtl="0" eaLnBrk="1" latinLnBrk="0" hangingPunct="1">
-        <a:lnSpc>
-          <a:spcPct val="90000"/>
-        </a:lnSpc>
+      <a:lvl5pPr marL="2057400" indent="-228600" algn="l" defTabSz="457200" rtl="0" eaLnBrk="1" latinLnBrk="0" hangingPunct="1">
         <a:spcBef>
-          <a:spcPts val="500"/>
+          <a:spcPts val="1000"/>
         </a:spcBef>
-        <a:buFont typeface="Arial" panose="020B0604020202020204" pitchFamily="34" charset="0"/>
-        <a:buChar char="•"/>
-        <a:defRPr sz="1800" kern="1200">
+        <a:spcAft>
+          <a:spcPts val="0"/>
+        </a:spcAft>
+        <a:buClr>
+          <a:schemeClr val="accent1"/>
+        </a:buClr>
+        <a:buSzPct val="80000"/>
+        <a:buFont typeface="Wingdings 3" charset="2"/>
+        <a:buChar char=""/>
+        <a:defRPr sz="1200" kern="1200">
           <a:solidFill>
-            <a:schemeClr val="tx1"/>
+            <a:schemeClr val="tx1">
+              <a:lumMod val="75000"/>
+              <a:lumOff val="25000"/>
+            </a:schemeClr>
           </a:solidFill>
           <a:latin typeface="+mn-lt"/>
           <a:ea typeface="+mn-ea"/>
           <a:cs typeface="+mn-cs"/>
         </a:defRPr>
       </a:lvl5pPr>
-      <a:lvl6pPr marL="2514600" indent="-228600" algn="l" defTabSz="914400" rtl="0" eaLnBrk="1" latinLnBrk="0" hangingPunct="1">
-        <a:lnSpc>
-          <a:spcPct val="90000"/>
-        </a:lnSpc>
+      <a:lvl6pPr marL="2514600" indent="-228600" algn="l" defTabSz="457200" rtl="0" eaLnBrk="1" latinLnBrk="0" hangingPunct="1">
         <a:spcBef>
-          <a:spcPts val="500"/>
+          <a:spcPts val="1000"/>
         </a:spcBef>
-        <a:buFont typeface="Arial" panose="020B0604020202020204" pitchFamily="34" charset="0"/>
-        <a:buChar char="•"/>
-        <a:defRPr sz="1800" kern="1200">
+        <a:spcAft>
+          <a:spcPts val="0"/>
+        </a:spcAft>
+        <a:buClr>
+          <a:schemeClr val="accent1"/>
+        </a:buClr>
+        <a:buSzPct val="80000"/>
+        <a:buFont typeface="Wingdings 3" charset="2"/>
+        <a:buChar char=""/>
+        <a:defRPr sz="1200" kern="1200">
           <a:solidFill>
-            <a:schemeClr val="tx1"/>
+            <a:schemeClr val="tx1">
+              <a:lumMod val="75000"/>
+              <a:lumOff val="25000"/>
+            </a:schemeClr>
           </a:solidFill>
           <a:latin typeface="+mn-lt"/>
           <a:ea typeface="+mn-ea"/>
           <a:cs typeface="+mn-cs"/>
         </a:defRPr>
       </a:lvl6pPr>
-      <a:lvl7pPr marL="2971800" indent="-228600" algn="l" defTabSz="914400" rtl="0" eaLnBrk="1" latinLnBrk="0" hangingPunct="1">
-        <a:lnSpc>
-          <a:spcPct val="90000"/>
-        </a:lnSpc>
+      <a:lvl7pPr marL="2971800" indent="-228600" algn="l" defTabSz="457200" rtl="0" eaLnBrk="1" latinLnBrk="0" hangingPunct="1">
         <a:spcBef>
-          <a:spcPts val="500"/>
+          <a:spcPts val="1000"/>
         </a:spcBef>
-        <a:buFont typeface="Arial" panose="020B0604020202020204" pitchFamily="34" charset="0"/>
-        <a:buChar char="•"/>
-        <a:defRPr sz="1800" kern="1200">
+        <a:spcAft>
+          <a:spcPts val="0"/>
+        </a:spcAft>
+        <a:buClr>
+          <a:schemeClr val="accent1"/>
+        </a:buClr>
+        <a:buSzPct val="80000"/>
+        <a:buFont typeface="Wingdings 3" charset="2"/>
+        <a:buChar char=""/>
+        <a:defRPr sz="1200" kern="1200">
           <a:solidFill>
-            <a:schemeClr val="tx1"/>
+            <a:schemeClr val="tx1">
+              <a:lumMod val="75000"/>
+              <a:lumOff val="25000"/>
+            </a:schemeClr>
           </a:solidFill>
           <a:latin typeface="+mn-lt"/>
           <a:ea typeface="+mn-ea"/>
           <a:cs typeface="+mn-cs"/>
         </a:defRPr>
       </a:lvl7pPr>
-      <a:lvl8pPr marL="3429000" indent="-228600" algn="l" defTabSz="914400" rtl="0" eaLnBrk="1" latinLnBrk="0" hangingPunct="1">
-        <a:lnSpc>
-          <a:spcPct val="90000"/>
-        </a:lnSpc>
+      <a:lvl8pPr marL="3429000" indent="-228600" algn="l" defTabSz="457200" rtl="0" eaLnBrk="1" latinLnBrk="0" hangingPunct="1">
         <a:spcBef>
-          <a:spcPts val="500"/>
+          <a:spcPts val="1000"/>
         </a:spcBef>
-        <a:buFont typeface="Arial" panose="020B0604020202020204" pitchFamily="34" charset="0"/>
-        <a:buChar char="•"/>
-        <a:defRPr sz="1800" kern="1200">
+        <a:spcAft>
+          <a:spcPts val="0"/>
+        </a:spcAft>
+        <a:buClr>
+          <a:schemeClr val="accent1"/>
+        </a:buClr>
+        <a:buSzPct val="80000"/>
+        <a:buFont typeface="Wingdings 3" charset="2"/>
+        <a:buChar char=""/>
+        <a:defRPr sz="1200" kern="1200">
           <a:solidFill>
-            <a:schemeClr val="tx1"/>
+            <a:schemeClr val="tx1">
+              <a:lumMod val="75000"/>
+              <a:lumOff val="25000"/>
+            </a:schemeClr>
           </a:solidFill>
           <a:latin typeface="+mn-lt"/>
           <a:ea typeface="+mn-ea"/>
           <a:cs typeface="+mn-cs"/>
         </a:defRPr>
       </a:lvl8pPr>
-      <a:lvl9pPr marL="3886200" indent="-228600" algn="l" defTabSz="914400" rtl="0" eaLnBrk="1" latinLnBrk="0" hangingPunct="1">
-        <a:lnSpc>
-          <a:spcPct val="90000"/>
-        </a:lnSpc>
+      <a:lvl9pPr marL="3886200" indent="-228600" algn="l" defTabSz="457200" rtl="0" eaLnBrk="1" latinLnBrk="0" hangingPunct="1">
         <a:spcBef>
-          <a:spcPts val="500"/>
+          <a:spcPts val="1000"/>
         </a:spcBef>
-        <a:buFont typeface="Arial" panose="020B0604020202020204" pitchFamily="34" charset="0"/>
-        <a:buChar char="•"/>
-        <a:defRPr sz="1800" kern="1200">
+        <a:spcAft>
+          <a:spcPts val="0"/>
+        </a:spcAft>
+        <a:buClr>
+          <a:schemeClr val="accent1"/>
+        </a:buClr>
+        <a:buSzPct val="80000"/>
+        <a:buFont typeface="Wingdings 3" charset="2"/>
+        <a:buChar char=""/>
+        <a:defRPr sz="1200" kern="1200">
           <a:solidFill>
-            <a:schemeClr val="tx1"/>
+            <a:schemeClr val="tx1">
+              <a:lumMod val="75000"/>
+              <a:lumOff val="25000"/>
+            </a:schemeClr>
           </a:solidFill>
           <a:latin typeface="+mn-lt"/>
           <a:ea typeface="+mn-ea"/>
@@ -2863,7 +5723,7 @@
       <a:defPPr>
         <a:defRPr lang="en-US"/>
       </a:defPPr>
-      <a:lvl1pPr marL="0" algn="l" defTabSz="914400" rtl="0" eaLnBrk="1" latinLnBrk="0" hangingPunct="1">
+      <a:lvl1pPr marL="0" algn="l" defTabSz="457200" rtl="0" eaLnBrk="1" latinLnBrk="0" hangingPunct="1">
         <a:defRPr sz="1800" kern="1200">
           <a:solidFill>
             <a:schemeClr val="tx1"/>
@@ -2873,7 +5733,7 @@
           <a:cs typeface="+mn-cs"/>
         </a:defRPr>
       </a:lvl1pPr>
-      <a:lvl2pPr marL="457200" algn="l" defTabSz="914400" rtl="0" eaLnBrk="1" latinLnBrk="0" hangingPunct="1">
+      <a:lvl2pPr marL="457200" algn="l" defTabSz="457200" rtl="0" eaLnBrk="1" latinLnBrk="0" hangingPunct="1">
         <a:defRPr sz="1800" kern="1200">
           <a:solidFill>
             <a:schemeClr val="tx1"/>
@@ -2883,7 +5743,7 @@
           <a:cs typeface="+mn-cs"/>
         </a:defRPr>
       </a:lvl2pPr>
-      <a:lvl3pPr marL="914400" algn="l" defTabSz="914400" rtl="0" eaLnBrk="1" latinLnBrk="0" hangingPunct="1">
+      <a:lvl3pPr marL="914400" algn="l" defTabSz="457200" rtl="0" eaLnBrk="1" latinLnBrk="0" hangingPunct="1">
         <a:defRPr sz="1800" kern="1200">
           <a:solidFill>
             <a:schemeClr val="tx1"/>
@@ -2893,7 +5753,7 @@
           <a:cs typeface="+mn-cs"/>
         </a:defRPr>
       </a:lvl3pPr>
-      <a:lvl4pPr marL="1371600" algn="l" defTabSz="914400" rtl="0" eaLnBrk="1" latinLnBrk="0" hangingPunct="1">
+      <a:lvl4pPr marL="1371600" algn="l" defTabSz="457200" rtl="0" eaLnBrk="1" latinLnBrk="0" hangingPunct="1">
         <a:defRPr sz="1800" kern="1200">
           <a:solidFill>
             <a:schemeClr val="tx1"/>
@@ -2903,7 +5763,7 @@
           <a:cs typeface="+mn-cs"/>
         </a:defRPr>
       </a:lvl4pPr>
-      <a:lvl5pPr marL="1828800" algn="l" defTabSz="914400" rtl="0" eaLnBrk="1" latinLnBrk="0" hangingPunct="1">
+      <a:lvl5pPr marL="1828800" algn="l" defTabSz="457200" rtl="0" eaLnBrk="1" latinLnBrk="0" hangingPunct="1">
         <a:defRPr sz="1800" kern="1200">
           <a:solidFill>
             <a:schemeClr val="tx1"/>
@@ -2913,7 +5773,7 @@
           <a:cs typeface="+mn-cs"/>
         </a:defRPr>
       </a:lvl5pPr>
-      <a:lvl6pPr marL="2286000" algn="l" defTabSz="914400" rtl="0" eaLnBrk="1" latinLnBrk="0" hangingPunct="1">
+      <a:lvl6pPr marL="2286000" algn="l" defTabSz="457200" rtl="0" eaLnBrk="1" latinLnBrk="0" hangingPunct="1">
         <a:defRPr sz="1800" kern="1200">
           <a:solidFill>
             <a:schemeClr val="tx1"/>
@@ -2923,7 +5783,7 @@
           <a:cs typeface="+mn-cs"/>
         </a:defRPr>
       </a:lvl6pPr>
-      <a:lvl7pPr marL="2743200" algn="l" defTabSz="914400" rtl="0" eaLnBrk="1" latinLnBrk="0" hangingPunct="1">
+      <a:lvl7pPr marL="2743200" algn="l" defTabSz="457200" rtl="0" eaLnBrk="1" latinLnBrk="0" hangingPunct="1">
         <a:defRPr sz="1800" kern="1200">
           <a:solidFill>
             <a:schemeClr val="tx1"/>
@@ -2933,7 +5793,7 @@
           <a:cs typeface="+mn-cs"/>
         </a:defRPr>
       </a:lvl7pPr>
-      <a:lvl8pPr marL="3200400" algn="l" defTabSz="914400" rtl="0" eaLnBrk="1" latinLnBrk="0" hangingPunct="1">
+      <a:lvl8pPr marL="3200400" algn="l" defTabSz="457200" rtl="0" eaLnBrk="1" latinLnBrk="0" hangingPunct="1">
         <a:defRPr sz="1800" kern="1200">
           <a:solidFill>
             <a:schemeClr val="tx1"/>
@@ -2943,7 +5803,7 @@
           <a:cs typeface="+mn-cs"/>
         </a:defRPr>
       </a:lvl8pPr>
-      <a:lvl9pPr marL="3657600" algn="l" defTabSz="914400" rtl="0" eaLnBrk="1" latinLnBrk="0" hangingPunct="1">
+      <a:lvl9pPr marL="3657600" algn="l" defTabSz="457200" rtl="0" eaLnBrk="1" latinLnBrk="0" hangingPunct="1">
         <a:defRPr sz="1800" kern="1200">
           <a:solidFill>
             <a:schemeClr val="tx1"/>
@@ -2975,6 +5835,130 @@
           <a:chExt cx="0" cy="0"/>
         </a:xfrm>
       </p:grpSpPr>
+      <p:sp>
+        <p:nvSpPr>
+          <p:cNvPr id="43" name="Title 1"/>
+          <p:cNvSpPr txBox="1">
+            <a:spLocks/>
+          </p:cNvSpPr>
+          <p:nvPr/>
+        </p:nvSpPr>
+        <p:spPr>
+          <a:xfrm>
+            <a:off x="754607" y="2747493"/>
+            <a:ext cx="8596668" cy="1320800"/>
+          </a:xfrm>
+          <a:prstGeom prst="rect">
+            <a:avLst/>
+          </a:prstGeom>
+        </p:spPr>
+        <p:txBody>
+          <a:bodyPr vert="horz" lIns="91440" tIns="45720" rIns="91440" bIns="45720" rtlCol="0" anchor="b">
+            <a:noAutofit/>
+          </a:bodyPr>
+          <a:lstStyle>
+            <a:lvl1pPr algn="r" defTabSz="457200" rtl="0" eaLnBrk="1" latinLnBrk="0" hangingPunct="1">
+              <a:spcBef>
+                <a:spcPct val="0"/>
+              </a:spcBef>
+              <a:buNone/>
+              <a:defRPr sz="5400" kern="1200">
+                <a:solidFill>
+                  <a:schemeClr val="accent1"/>
+                </a:solidFill>
+                <a:latin typeface="+mj-lt"/>
+                <a:ea typeface="+mj-ea"/>
+                <a:cs typeface="+mj-cs"/>
+              </a:defRPr>
+            </a:lvl1pPr>
+            <a:lvl2pPr eaLnBrk="1" hangingPunct="1">
+              <a:defRPr>
+                <a:solidFill>
+                  <a:schemeClr val="tx2"/>
+                </a:solidFill>
+              </a:defRPr>
+            </a:lvl2pPr>
+            <a:lvl3pPr eaLnBrk="1" hangingPunct="1">
+              <a:defRPr>
+                <a:solidFill>
+                  <a:schemeClr val="tx2"/>
+                </a:solidFill>
+              </a:defRPr>
+            </a:lvl3pPr>
+            <a:lvl4pPr eaLnBrk="1" hangingPunct="1">
+              <a:defRPr>
+                <a:solidFill>
+                  <a:schemeClr val="tx2"/>
+                </a:solidFill>
+              </a:defRPr>
+            </a:lvl4pPr>
+            <a:lvl5pPr eaLnBrk="1" hangingPunct="1">
+              <a:defRPr>
+                <a:solidFill>
+                  <a:schemeClr val="tx2"/>
+                </a:solidFill>
+              </a:defRPr>
+            </a:lvl5pPr>
+            <a:lvl6pPr eaLnBrk="1" hangingPunct="1">
+              <a:defRPr>
+                <a:solidFill>
+                  <a:schemeClr val="tx2"/>
+                </a:solidFill>
+              </a:defRPr>
+            </a:lvl6pPr>
+            <a:lvl7pPr eaLnBrk="1" hangingPunct="1">
+              <a:defRPr>
+                <a:solidFill>
+                  <a:schemeClr val="tx2"/>
+                </a:solidFill>
+              </a:defRPr>
+            </a:lvl7pPr>
+            <a:lvl8pPr eaLnBrk="1" hangingPunct="1">
+              <a:defRPr>
+                <a:solidFill>
+                  <a:schemeClr val="tx2"/>
+                </a:solidFill>
+              </a:defRPr>
+            </a:lvl8pPr>
+            <a:lvl9pPr eaLnBrk="1" hangingPunct="1">
+              <a:defRPr>
+                <a:solidFill>
+                  <a:schemeClr val="tx2"/>
+                </a:solidFill>
+              </a:defRPr>
+            </a:lvl9pPr>
+          </a:lstStyle>
+          <a:p>
+            <a:pPr algn="l"/>
+            <a:r>
+              <a:rPr lang="en-GB" dirty="0" smtClean="0"/>
+              <a:t>Falkirk Community Trust</a:t>
+            </a:r>
+          </a:p>
+          <a:p>
+            <a:pPr algn="l"/>
+            <a:r>
+              <a:rPr lang="en-GB" sz="3200" dirty="0" smtClean="0">
+                <a:solidFill>
+                  <a:schemeClr val="accent1">
+                    <a:lumMod val="40000"/>
+                    <a:lumOff val="60000"/>
+                  </a:schemeClr>
+                </a:solidFill>
+              </a:rPr>
+              <a:t>Team 5-Code For Good 2016</a:t>
+            </a:r>
+            <a:endParaRPr lang="en-GB" sz="3200" dirty="0">
+              <a:solidFill>
+                <a:schemeClr val="accent1">
+                  <a:lumMod val="40000"/>
+                  <a:lumOff val="60000"/>
+                </a:schemeClr>
+              </a:solidFill>
+            </a:endParaRPr>
+          </a:p>
+        </p:txBody>
+      </p:sp>
     </p:spTree>
     <p:extLst>
       <p:ext uri="{BB962C8B-B14F-4D97-AF65-F5344CB8AC3E}">
@@ -3050,7 +6034,7 @@
           <a:bodyPr/>
           <a:lstStyle/>
           <a:p>
-            <a:endParaRPr lang="en-GB"/>
+            <a:endParaRPr lang="en-GB" dirty="0"/>
           </a:p>
         </p:txBody>
       </p:sp>
@@ -3363,9 +6347,9 @@
 </file>
 
 <file path=ppt/theme/theme1.xml><?xml version="1.0" encoding="utf-8"?>
-<a:theme xmlns:a="http://schemas.openxmlformats.org/drawingml/2006/main" name="Office Theme">
+<a:theme xmlns:a="http://schemas.openxmlformats.org/drawingml/2006/main" name="Facet">
   <a:themeElements>
-    <a:clrScheme name="Office">
+    <a:clrScheme name="Blue Warm">
       <a:dk1>
         <a:sysClr val="windowText" lastClr="000000"/>
       </a:dk1>
@@ -3373,52 +6357,52 @@
         <a:sysClr val="window" lastClr="FFFFFF"/>
       </a:lt1>
       <a:dk2>
-        <a:srgbClr val="44546A"/>
+        <a:srgbClr val="242852"/>
       </a:dk2>
       <a:lt2>
-        <a:srgbClr val="E7E6E6"/>
+        <a:srgbClr val="ACCBF9"/>
       </a:lt2>
       <a:accent1>
-        <a:srgbClr val="5B9BD5"/>
+        <a:srgbClr val="4A66AC"/>
       </a:accent1>
       <a:accent2>
-        <a:srgbClr val="ED7D31"/>
+        <a:srgbClr val="629DD1"/>
       </a:accent2>
       <a:accent3>
-        <a:srgbClr val="A5A5A5"/>
+        <a:srgbClr val="297FD5"/>
       </a:accent3>
       <a:accent4>
-        <a:srgbClr val="FFC000"/>
+        <a:srgbClr val="7F8FA9"/>
       </a:accent4>
       <a:accent5>
-        <a:srgbClr val="4472C4"/>
+        <a:srgbClr val="5AA2AE"/>
       </a:accent5>
       <a:accent6>
-        <a:srgbClr val="70AD47"/>
+        <a:srgbClr val="9D90A0"/>
       </a:accent6>
       <a:hlink>
-        <a:srgbClr val="0563C1"/>
+        <a:srgbClr val="9454C3"/>
       </a:hlink>
       <a:folHlink>
-        <a:srgbClr val="954F72"/>
+        <a:srgbClr val="3EBBF0"/>
       </a:folHlink>
     </a:clrScheme>
-    <a:fontScheme name="Office">
+    <a:fontScheme name="Facet">
       <a:majorFont>
-        <a:latin typeface="Calibri Light" panose="020F0302020204030204"/>
+        <a:latin typeface="Trebuchet MS" panose="020B0603020202020204"/>
         <a:ea typeface=""/>
         <a:cs typeface=""/>
-        <a:font script="Jpan" typeface="ＭＳ Ｐゴシック"/>
+        <a:font script="Jpan" typeface="メイリオ"/>
         <a:font script="Hang" typeface="맑은 고딕"/>
-        <a:font script="Hans" typeface="宋体"/>
-        <a:font script="Hant" typeface="新細明體"/>
-        <a:font script="Arab" typeface="Times New Roman"/>
-        <a:font script="Hebr" typeface="Times New Roman"/>
-        <a:font script="Thai" typeface="Angsana New"/>
+        <a:font script="Hans" typeface="方正姚体"/>
+        <a:font script="Hant" typeface="微軟正黑體"/>
+        <a:font script="Arab" typeface="Tahoma"/>
+        <a:font script="Hebr" typeface="Arial"/>
+        <a:font script="Thai" typeface="Cordia New"/>
         <a:font script="Ethi" typeface="Nyala"/>
         <a:font script="Beng" typeface="Vrinda"/>
         <a:font script="Gujr" typeface="Shruti"/>
-        <a:font script="Khmr" typeface="MoolBoran"/>
+        <a:font script="Khmr" typeface="DaunPenh"/>
         <a:font script="Knda" typeface="Tunga"/>
         <a:font script="Guru" typeface="Raavi"/>
         <a:font script="Cans" typeface="Euphemia"/>
@@ -3435,21 +6419,21 @@
         <a:font script="Laoo" typeface="DokChampa"/>
         <a:font script="Sinh" typeface="Iskoola Pota"/>
         <a:font script="Mong" typeface="Mongolian Baiti"/>
-        <a:font script="Viet" typeface="Times New Roman"/>
+        <a:font script="Viet" typeface="Tahoma"/>
         <a:font script="Uigh" typeface="Microsoft Uighur"/>
         <a:font script="Geor" typeface="Sylfaen"/>
       </a:majorFont>
       <a:minorFont>
-        <a:latin typeface="Calibri" panose="020F0502020204030204"/>
+        <a:latin typeface="Trebuchet MS" panose="020B0603020202020204"/>
         <a:ea typeface=""/>
         <a:cs typeface=""/>
-        <a:font script="Jpan" typeface="ＭＳ Ｐゴシック"/>
-        <a:font script="Hang" typeface="맑은 고딕"/>
-        <a:font script="Hans" typeface="宋体"/>
-        <a:font script="Hant" typeface="新細明體"/>
-        <a:font script="Arab" typeface="Arial"/>
-        <a:font script="Hebr" typeface="Arial"/>
-        <a:font script="Thai" typeface="Cordia New"/>
+        <a:font script="Jpan" typeface="メイリオ"/>
+        <a:font script="Hang" typeface="HY그래픽M"/>
+        <a:font script="Hans" typeface="华文新魏"/>
+        <a:font script="Hant" typeface="微軟正黑體"/>
+        <a:font script="Arab" typeface="Tahoma"/>
+        <a:font script="Hebr" typeface="Gisha"/>
+        <a:font script="Thai" typeface="IrisUPC"/>
         <a:font script="Ethi" typeface="Nyala"/>
         <a:font script="Beng" typeface="Vrinda"/>
         <a:font script="Gujr" typeface="Shruti"/>
@@ -3475,7 +6459,7 @@
         <a:font script="Geor" typeface="Sylfaen"/>
       </a:minorFont>
     </a:fontScheme>
-    <a:fmtScheme name="Office">
+    <a:fmtScheme name="Facet">
       <a:fillStyleLst>
         <a:solidFill>
           <a:schemeClr val="phClr"/>
@@ -3484,23 +6468,13 @@
           <a:gsLst>
             <a:gs pos="0">
               <a:schemeClr val="phClr">
+                <a:tint val="65000"/>
                 <a:lumMod val="110000"/>
-                <a:satMod val="105000"/>
-                <a:tint val="67000"/>
               </a:schemeClr>
             </a:gs>
-            <a:gs pos="50000">
+            <a:gs pos="88000">
               <a:schemeClr val="phClr">
-                <a:lumMod val="105000"/>
-                <a:satMod val="103000"/>
-                <a:tint val="73000"/>
-              </a:schemeClr>
-            </a:gs>
-            <a:gs pos="100000">
-              <a:schemeClr val="phClr">
-                <a:lumMod val="105000"/>
-                <a:satMod val="109000"/>
-                <a:tint val="81000"/>
+                <a:tint val="90000"/>
               </a:schemeClr>
             </a:gs>
           </a:gsLst>
@@ -3510,23 +6484,14 @@
           <a:gsLst>
             <a:gs pos="0">
               <a:schemeClr val="phClr">
-                <a:satMod val="103000"/>
-                <a:lumMod val="102000"/>
-                <a:tint val="94000"/>
+                <a:tint val="96000"/>
+                <a:lumMod val="100000"/>
               </a:schemeClr>
             </a:gs>
-            <a:gs pos="50000">
+            <a:gs pos="78000">
               <a:schemeClr val="phClr">
-                <a:satMod val="110000"/>
-                <a:lumMod val="100000"/>
-                <a:shade val="100000"/>
-              </a:schemeClr>
-            </a:gs>
-            <a:gs pos="100000">
-              <a:schemeClr val="phClr">
-                <a:lumMod val="99000"/>
-                <a:satMod val="120000"/>
-                <a:shade val="78000"/>
+                <a:shade val="94000"/>
+                <a:lumMod val="94000"/>
               </a:schemeClr>
             </a:gs>
           </a:gsLst>
@@ -3534,26 +6499,23 @@
         </a:gradFill>
       </a:fillStyleLst>
       <a:lnStyleLst>
-        <a:ln w="6350" cap="flat" cmpd="sng" algn="ctr">
+        <a:ln w="12700" cap="rnd" cmpd="sng" algn="ctr">
           <a:solidFill>
             <a:schemeClr val="phClr"/>
           </a:solidFill>
           <a:prstDash val="solid"/>
-          <a:miter lim="800000"/>
         </a:ln>
-        <a:ln w="12700" cap="flat" cmpd="sng" algn="ctr">
+        <a:ln w="19050" cap="rnd" cmpd="sng" algn="ctr">
           <a:solidFill>
             <a:schemeClr val="phClr"/>
           </a:solidFill>
           <a:prstDash val="solid"/>
-          <a:miter lim="800000"/>
         </a:ln>
-        <a:ln w="19050" cap="flat" cmpd="sng" algn="ctr">
+        <a:ln w="25400" cap="rnd" cmpd="sng" algn="ctr">
           <a:solidFill>
             <a:schemeClr val="phClr"/>
           </a:solidFill>
           <a:prstDash val="solid"/>
-          <a:miter lim="800000"/>
         </a:ln>
       </a:lnStyleLst>
       <a:effectStyleLst>
@@ -3561,54 +6523,72 @@
           <a:effectLst/>
         </a:effectStyle>
         <a:effectStyle>
-          <a:effectLst/>
+          <a:effectLst>
+            <a:outerShdw blurRad="38100" dist="25400" dir="5400000" rotWithShape="0">
+              <a:srgbClr val="000000">
+                <a:alpha val="35000"/>
+              </a:srgbClr>
+            </a:outerShdw>
+          </a:effectLst>
         </a:effectStyle>
         <a:effectStyle>
           <a:effectLst>
-            <a:outerShdw blurRad="57150" dist="19050" dir="5400000" algn="ctr" rotWithShape="0">
+            <a:outerShdw blurRad="50800" dist="38100" dir="5400000" rotWithShape="0">
               <a:srgbClr val="000000">
-                <a:alpha val="63000"/>
+                <a:alpha val="35000"/>
               </a:srgbClr>
             </a:outerShdw>
           </a:effectLst>
+          <a:scene3d>
+            <a:camera prst="orthographicFront">
+              <a:rot lat="0" lon="0" rev="0"/>
+            </a:camera>
+            <a:lightRig rig="threePt" dir="tl"/>
+          </a:scene3d>
+          <a:sp3d prstMaterial="plastic">
+            <a:bevelT w="0" h="0"/>
+          </a:sp3d>
         </a:effectStyle>
       </a:effectStyleLst>
       <a:bgFillStyleLst>
         <a:solidFill>
           <a:schemeClr val="phClr"/>
         </a:solidFill>
-        <a:solidFill>
-          <a:schemeClr val="phClr">
-            <a:tint val="95000"/>
-            <a:satMod val="170000"/>
-          </a:schemeClr>
-        </a:solidFill>
         <a:gradFill rotWithShape="1">
           <a:gsLst>
             <a:gs pos="0">
               <a:schemeClr val="phClr">
-                <a:tint val="93000"/>
-                <a:satMod val="150000"/>
-                <a:shade val="98000"/>
-                <a:lumMod val="102000"/>
+                <a:tint val="90000"/>
+                <a:lumMod val="104000"/>
               </a:schemeClr>
             </a:gs>
-            <a:gs pos="50000">
+            <a:gs pos="94000">
               <a:schemeClr val="phClr">
-                <a:tint val="98000"/>
-                <a:satMod val="130000"/>
-                <a:shade val="90000"/>
-                <a:lumMod val="103000"/>
+                <a:shade val="96000"/>
+                <a:lumMod val="82000"/>
+              </a:schemeClr>
+            </a:gs>
+          </a:gsLst>
+          <a:lin ang="5400000" scaled="0"/>
+        </a:gradFill>
+        <a:gradFill rotWithShape="1">
+          <a:gsLst>
+            <a:gs pos="0">
+              <a:schemeClr val="phClr">
+                <a:tint val="90000"/>
+                <a:lumMod val="110000"/>
               </a:schemeClr>
             </a:gs>
             <a:gs pos="100000">
               <a:schemeClr val="phClr">
-                <a:shade val="63000"/>
-                <a:satMod val="120000"/>
+                <a:shade val="94000"/>
+                <a:lumMod val="96000"/>
               </a:schemeClr>
             </a:gs>
           </a:gsLst>
-          <a:lin ang="5400000" scaled="0"/>
+          <a:path path="circle">
+            <a:fillToRect l="50000" t="50000" r="100000" b="100000"/>
+          </a:path>
         </a:gradFill>
       </a:bgFillStyleLst>
     </a:fmtScheme>
@@ -3617,7 +6597,7 @@
   <a:extraClrSchemeLst/>
   <a:extLst>
     <a:ext uri="{05A4C25C-085E-4340-85A3-A5531E510DB2}">
-      <thm15:themeFamily xmlns:thm15="http://schemas.microsoft.com/office/thememl/2012/main" name="Office Theme" id="{62F939B6-93AF-4DB8-9C6B-D6C7DFDC589F}" vid="{4A3C46E8-61CC-4603-A589-7422A47A8E4A}"/>
+      <thm15:themeFamily xmlns:thm15="http://schemas.microsoft.com/office/thememl/2012/main" name="Facet" id="{C0C680CD-088A-49FC-A102-D699147F32B2}" vid="{CFBC31BA-B70F-4F30-BCAA-4F3011E16C4D}"/>
     </a:ext>
   </a:extLst>
 </a:theme>

</xml_diff>

<commit_message>
Info on Brief, Idea and Reqs added
</commit_message>
<xml_diff>
--- a/Design.pptx
+++ b/Design.pptx
@@ -6029,11 +6029,60 @@
             <p:ph idx="1"/>
           </p:nvPr>
         </p:nvSpPr>
-        <p:spPr/>
+        <p:spPr>
+          <a:xfrm>
+            <a:off x="677334" y="2727261"/>
+            <a:ext cx="8596668" cy="1329586"/>
+          </a:xfrm>
+        </p:spPr>
         <p:txBody>
           <a:bodyPr/>
           <a:lstStyle/>
           <a:p>
+            <a:r>
+              <a:rPr lang="en-GB" dirty="0"/>
+              <a:t>To create </a:t>
+            </a:r>
+            <a:r>
+              <a:rPr lang="en-GB" dirty="0" smtClean="0"/>
+              <a:t>a </a:t>
+            </a:r>
+            <a:r>
+              <a:rPr lang="en-GB" dirty="0"/>
+              <a:t>smart park </a:t>
+            </a:r>
+            <a:r>
+              <a:rPr lang="en-GB" dirty="0" smtClean="0"/>
+              <a:t>experience by making use of </a:t>
+            </a:r>
+            <a:r>
+              <a:rPr lang="en-GB" dirty="0"/>
+              <a:t>interactive “</a:t>
+            </a:r>
+            <a:r>
+              <a:rPr lang="en-GB" dirty="0" smtClean="0"/>
+              <a:t>posts”. Visitors </a:t>
+            </a:r>
+            <a:r>
+              <a:rPr lang="en-GB" dirty="0"/>
+              <a:t>will be able communicate with </a:t>
+            </a:r>
+            <a:r>
+              <a:rPr lang="en-GB" dirty="0" smtClean="0"/>
+              <a:t>these </a:t>
+            </a:r>
+            <a:r>
+              <a:rPr lang="en-GB" dirty="0"/>
+              <a:t>posts directly or indirectly. The posts can gather their own data from their attached equipment, the internet or visitors smart phones</a:t>
+            </a:r>
+            <a:r>
+              <a:rPr lang="en-GB" dirty="0" smtClean="0"/>
+              <a:t>, </a:t>
+            </a:r>
+            <a:r>
+              <a:rPr lang="en-GB" dirty="0"/>
+              <a:t>and do something interesting with it. </a:t>
+            </a:r>
             <a:endParaRPr lang="en-GB" dirty="0"/>
           </a:p>
         </p:txBody>
@@ -6091,6 +6140,45 @@
           </a:p>
         </p:txBody>
       </p:sp>
+      <p:sp>
+        <p:nvSpPr>
+          <p:cNvPr id="8" name="Content Placeholder 7"/>
+          <p:cNvSpPr>
+            <a:spLocks noGrp="1"/>
+          </p:cNvSpPr>
+          <p:nvPr>
+            <p:ph idx="1"/>
+          </p:nvPr>
+        </p:nvSpPr>
+        <p:spPr>
+          <a:xfrm>
+            <a:off x="677334" y="2611350"/>
+            <a:ext cx="8596668" cy="1651557"/>
+          </a:xfrm>
+        </p:spPr>
+        <p:txBody>
+          <a:bodyPr/>
+          <a:lstStyle/>
+          <a:p>
+            <a:r>
+              <a:rPr lang="en-GB" dirty="0" smtClean="0"/>
+              <a:t>A QR-Code based treasure hunt.</a:t>
+            </a:r>
+          </a:p>
+          <a:p>
+            <a:r>
+              <a:rPr lang="en-GB" dirty="0" smtClean="0"/>
+              <a:t>Pre-planned routes joinable at any point directing Visitors to various different attractions within the Helix.</a:t>
+            </a:r>
+          </a:p>
+          <a:p>
+            <a:r>
+              <a:rPr lang="en-GB" dirty="0" smtClean="0"/>
+              <a:t>Interactive ‘posts’ that provide information and enable interactivity.</a:t>
+            </a:r>
+          </a:p>
+        </p:txBody>
+      </p:sp>
     </p:spTree>
     <p:extLst>
       <p:ext uri="{BB962C8B-B14F-4D97-AF65-F5344CB8AC3E}">
@@ -6101,6 +6189,13 @@
   <p:clrMapOvr>
     <a:masterClrMapping/>
   </p:clrMapOvr>
+  <p:timing>
+    <p:tnLst>
+      <p:par>
+        <p:cTn id="1" dur="indefinite" restart="never" nodeType="tmRoot"/>
+      </p:par>
+    </p:tnLst>
+  </p:timing>
 </p:sld>
 </file>
 
@@ -6144,6 +6239,88 @@
           </a:p>
         </p:txBody>
       </p:sp>
+      <p:sp>
+        <p:nvSpPr>
+          <p:cNvPr id="5" name="Content Placeholder 4"/>
+          <p:cNvSpPr>
+            <a:spLocks noGrp="1"/>
+          </p:cNvSpPr>
+          <p:nvPr>
+            <p:ph idx="1"/>
+          </p:nvPr>
+        </p:nvSpPr>
+        <p:spPr/>
+        <p:txBody>
+          <a:bodyPr/>
+          <a:lstStyle/>
+          <a:p>
+            <a:r>
+              <a:rPr lang="en-GB" dirty="0" smtClean="0"/>
+              <a:t>The Posts</a:t>
+            </a:r>
+          </a:p>
+          <a:p>
+            <a:pPr lvl="1"/>
+            <a:r>
+              <a:rPr lang="en-GB" dirty="0" smtClean="0"/>
+              <a:t>Must be able to display unique dynamic QR codes.</a:t>
+            </a:r>
+          </a:p>
+          <a:p>
+            <a:pPr lvl="1"/>
+            <a:r>
+              <a:rPr lang="en-GB" dirty="0" smtClean="0"/>
+              <a:t>Must be able to tell when a Visitor is nearby so it can generate a valid QR Code.</a:t>
+            </a:r>
+          </a:p>
+          <a:p>
+            <a:pPr lvl="1"/>
+            <a:r>
+              <a:rPr lang="en-GB" dirty="0" smtClean="0"/>
+              <a:t>These QR codes must link to the appropriate page on the app.</a:t>
+            </a:r>
+          </a:p>
+          <a:p>
+            <a:r>
+              <a:rPr lang="en-GB" dirty="0" smtClean="0"/>
+              <a:t>The App</a:t>
+            </a:r>
+          </a:p>
+          <a:p>
+            <a:pPr lvl="1"/>
+            <a:r>
+              <a:rPr lang="en-GB" dirty="0" smtClean="0"/>
+              <a:t>Must store relevant user information.</a:t>
+            </a:r>
+          </a:p>
+          <a:p>
+            <a:pPr lvl="1"/>
+            <a:r>
+              <a:rPr lang="en-GB" dirty="0" smtClean="0"/>
+              <a:t>Must be able to Scan the QR Codes.</a:t>
+            </a:r>
+          </a:p>
+          <a:p>
+            <a:pPr lvl="1"/>
+            <a:r>
+              <a:rPr lang="en-GB" dirty="0" smtClean="0"/>
+              <a:t>Manage Achievements.</a:t>
+            </a:r>
+          </a:p>
+          <a:p>
+            <a:pPr lvl="1"/>
+            <a:r>
+              <a:rPr lang="en-GB" dirty="0" smtClean="0"/>
+              <a:t>Create </a:t>
+            </a:r>
+            <a:r>
+              <a:rPr lang="en-GB" smtClean="0"/>
+              <a:t>and Track Routes.</a:t>
+            </a:r>
+            <a:endParaRPr lang="en-GB" dirty="0"/>
+          </a:p>
+        </p:txBody>
+      </p:sp>
     </p:spTree>
     <p:extLst>
       <p:ext uri="{BB962C8B-B14F-4D97-AF65-F5344CB8AC3E}">
@@ -6154,6 +6331,13 @@
   <p:clrMapOvr>
     <a:masterClrMapping/>
   </p:clrMapOvr>
+  <p:timing>
+    <p:tnLst>
+      <p:par>
+        <p:cTn id="1" dur="indefinite" restart="never" nodeType="tmRoot"/>
+      </p:par>
+    </p:tnLst>
+  </p:timing>
 </p:sld>
 </file>
 

</xml_diff>

<commit_message>
App Design + Improvements/Extensions slide added
</commit_message>
<xml_diff>
--- a/Design.pptx
+++ b/Design.pptx
@@ -6290,7 +6290,7 @@
             <a:pPr lvl="1"/>
             <a:r>
               <a:rPr lang="en-GB" dirty="0" smtClean="0"/>
-              <a:t>Must store relevant user information.</a:t>
+              <a:t>Must be able to store and retrieve relevant user information.</a:t>
             </a:r>
           </a:p>
           <a:p>
@@ -6311,11 +6311,22 @@
             <a:pPr lvl="1"/>
             <a:r>
               <a:rPr lang="en-GB" dirty="0" smtClean="0"/>
-              <a:t>Create </a:t>
-            </a:r>
-            <a:r>
-              <a:rPr lang="en-GB" smtClean="0"/>
-              <a:t>and Track Routes.</a:t>
+              <a:t>Create and Track Routes.</a:t>
+            </a:r>
+          </a:p>
+          <a:p>
+            <a:pPr lvl="1"/>
+            <a:r>
+              <a:rPr lang="en-GB" dirty="0" smtClean="0"/>
+              <a:t>Share achievements on </a:t>
+            </a:r>
+            <a:r>
+              <a:rPr lang="en-GB" dirty="0"/>
+              <a:t>S</a:t>
+            </a:r>
+            <a:r>
+              <a:rPr lang="en-GB" dirty="0" smtClean="0"/>
+              <a:t>ocial Media.</a:t>
             </a:r>
             <a:endParaRPr lang="en-GB" dirty="0"/>
           </a:p>
@@ -6381,6 +6392,57 @@
           </a:p>
         </p:txBody>
       </p:sp>
+      <p:sp>
+        <p:nvSpPr>
+          <p:cNvPr id="5" name="Content Placeholder 4"/>
+          <p:cNvSpPr>
+            <a:spLocks noGrp="1"/>
+          </p:cNvSpPr>
+          <p:nvPr>
+            <p:ph idx="1"/>
+          </p:nvPr>
+        </p:nvSpPr>
+        <p:spPr>
+          <a:xfrm>
+            <a:off x="677334" y="3141711"/>
+            <a:ext cx="3997697" cy="1600042"/>
+          </a:xfrm>
+        </p:spPr>
+        <p:txBody>
+          <a:bodyPr/>
+          <a:lstStyle/>
+          <a:p>
+            <a:r>
+              <a:rPr lang="en-GB" dirty="0" smtClean="0"/>
+              <a:t>Simple Intuitive Design.</a:t>
+            </a:r>
+          </a:p>
+          <a:p>
+            <a:r>
+              <a:rPr lang="en-GB" dirty="0" smtClean="0"/>
+              <a:t>Consistent with The Helix’s official website.</a:t>
+            </a:r>
+          </a:p>
+          <a:p>
+            <a:r>
+              <a:rPr lang="en-GB" dirty="0" smtClean="0"/>
+              <a:t>Implements Google Maps.</a:t>
+            </a:r>
+          </a:p>
+          <a:p>
+            <a:pPr marL="0" indent="0">
+              <a:buNone/>
+            </a:pPr>
+            <a:endParaRPr lang="en-GB" dirty="0" smtClean="0"/>
+          </a:p>
+          <a:p>
+            <a:endParaRPr lang="en-GB" dirty="0" smtClean="0"/>
+          </a:p>
+          <a:p>
+            <a:endParaRPr lang="en-GB" dirty="0"/>
+          </a:p>
+        </p:txBody>
+      </p:sp>
       <p:pic>
         <p:nvPicPr>
           <p:cNvPr id="4" name="Picture 3"/>
@@ -6403,8 +6465,38 @@
         </p:blipFill>
         <p:spPr>
           <a:xfrm>
-            <a:off x="7972138" y="1282715"/>
+            <a:off x="4675031" y="1269999"/>
             <a:ext cx="3180966" cy="5343465"/>
+          </a:xfrm>
+          <a:prstGeom prst="rect">
+            <a:avLst/>
+          </a:prstGeom>
+        </p:spPr>
+      </p:pic>
+      <p:pic>
+        <p:nvPicPr>
+          <p:cNvPr id="6" name="Picture 5"/>
+          <p:cNvPicPr>
+            <a:picLocks noChangeAspect="1"/>
+          </p:cNvPicPr>
+          <p:nvPr/>
+        </p:nvPicPr>
+        <p:blipFill>
+          <a:blip r:embed="rId3">
+            <a:extLst>
+              <a:ext uri="{28A0092B-C50C-407E-A947-70E740481C1C}">
+                <a14:useLocalDpi xmlns:a14="http://schemas.microsoft.com/office/drawing/2010/main" val="0"/>
+              </a:ext>
+            </a:extLst>
+          </a:blip>
+          <a:stretch>
+            <a:fillRect/>
+          </a:stretch>
+        </p:blipFill>
+        <p:spPr>
+          <a:xfrm>
+            <a:off x="8161438" y="1269998"/>
+            <a:ext cx="3248264" cy="5343465"/>
           </a:xfrm>
           <a:prstGeom prst="rect">
             <a:avLst/>
@@ -6421,6 +6513,13 @@
   <p:clrMapOvr>
     <a:masterClrMapping/>
   </p:clrMapOvr>
+  <p:timing>
+    <p:tnLst>
+      <p:par>
+        <p:cTn id="1" dur="indefinite" restart="never" nodeType="tmRoot"/>
+      </p:par>
+    </p:tnLst>
+  </p:timing>
 </p:sld>
 </file>
 
@@ -6474,6 +6573,13 @@
   <p:clrMapOvr>
     <a:masterClrMapping/>
   </p:clrMapOvr>
+  <p:timing>
+    <p:tnLst>
+      <p:par>
+        <p:cTn id="1" dur="indefinite" restart="never" nodeType="tmRoot"/>
+      </p:par>
+    </p:tnLst>
+  </p:timing>
 </p:sld>
 </file>
 
@@ -6511,9 +6617,69 @@
           <a:p>
             <a:r>
               <a:rPr lang="en-GB" dirty="0" smtClean="0"/>
-              <a:t>Possible Improvements/Extensions</a:t>
+              <a:t>Improvements/Extensions</a:t>
             </a:r>
             <a:endParaRPr lang="en-GB" dirty="0"/>
+          </a:p>
+        </p:txBody>
+      </p:sp>
+      <p:sp>
+        <p:nvSpPr>
+          <p:cNvPr id="4" name="Content Placeholder 3"/>
+          <p:cNvSpPr>
+            <a:spLocks noGrp="1"/>
+          </p:cNvSpPr>
+          <p:nvPr>
+            <p:ph idx="1"/>
+          </p:nvPr>
+        </p:nvSpPr>
+        <p:spPr/>
+        <p:txBody>
+          <a:bodyPr/>
+          <a:lstStyle/>
+          <a:p>
+            <a:r>
+              <a:rPr lang="en-GB" dirty="0" smtClean="0"/>
+              <a:t>Constructing a database to store User details would be a functional requirement because of the large numbers of possible users.</a:t>
+            </a:r>
+          </a:p>
+          <a:p>
+            <a:r>
+              <a:rPr lang="en-GB" dirty="0" smtClean="0"/>
+              <a:t>GPS could be used to track your position on the route when you are </a:t>
+            </a:r>
+            <a:r>
+              <a:rPr lang="en-GB" dirty="0" err="1" smtClean="0"/>
+              <a:t>outwith</a:t>
+            </a:r>
+            <a:r>
+              <a:rPr lang="en-GB" dirty="0" smtClean="0"/>
+              <a:t> the vicinity of the posts.</a:t>
+            </a:r>
+          </a:p>
+          <a:p>
+            <a:r>
+              <a:rPr lang="en-GB" dirty="0" smtClean="0"/>
+              <a:t>Posts could gather weather information and send alerts to Visitor’s apps advising them on courses of action.</a:t>
+            </a:r>
+          </a:p>
+          <a:p>
+            <a:pPr lvl="1"/>
+            <a:r>
+              <a:rPr lang="en-GB" dirty="0" smtClean="0"/>
+              <a:t>E.g. “It’s going to Rain! How about heading to the café?” or “It’s sunny today, perfect for kayaking at the Helix Lagoon.”</a:t>
+            </a:r>
+          </a:p>
+          <a:p>
+            <a:endParaRPr lang="en-GB" dirty="0" smtClean="0"/>
+          </a:p>
+          <a:p>
+            <a:pPr lvl="1"/>
+            <a:endParaRPr lang="en-GB" dirty="0" smtClean="0"/>
+          </a:p>
+          <a:p>
+            <a:pPr lvl="1"/>
+            <a:endParaRPr lang="en-GB" dirty="0" smtClean="0"/>
           </a:p>
         </p:txBody>
       </p:sp>
@@ -6527,6 +6693,13 @@
   <p:clrMapOvr>
     <a:masterClrMapping/>
   </p:clrMapOvr>
+  <p:timing>
+    <p:tnLst>
+      <p:par>
+        <p:cTn id="1" dur="indefinite" restart="never" nodeType="tmRoot"/>
+      </p:par>
+    </p:tnLst>
+  </p:timing>
 </p:sld>
 </file>
 

</xml_diff>

<commit_message>
added info about qr scanner
</commit_message>
<xml_diff>
--- a/Design.pptx
+++ b/Design.pptx
@@ -841,7 +841,7 @@
           <a:p>
             <a:fld id="{30CB22A9-0E83-4290-85DE-03AE20A6F059}" type="datetimeFigureOut">
               <a:rPr lang="en-GB" smtClean="0"/>
-              <a:t>05/11/2016</a:t>
+              <a:t>06/11/2016</a:t>
             </a:fld>
             <a:endParaRPr lang="en-GB"/>
           </a:p>
@@ -1092,7 +1092,7 @@
           <a:p>
             <a:fld id="{30CB22A9-0E83-4290-85DE-03AE20A6F059}" type="datetimeFigureOut">
               <a:rPr lang="en-GB" smtClean="0"/>
-              <a:t>05/11/2016</a:t>
+              <a:t>06/11/2016</a:t>
             </a:fld>
             <a:endParaRPr lang="en-GB"/>
           </a:p>
@@ -1406,7 +1406,7 @@
           <a:p>
             <a:fld id="{30CB22A9-0E83-4290-85DE-03AE20A6F059}" type="datetimeFigureOut">
               <a:rPr lang="en-GB" smtClean="0"/>
-              <a:t>05/11/2016</a:t>
+              <a:t>06/11/2016</a:t>
             </a:fld>
             <a:endParaRPr lang="en-GB"/>
           </a:p>
@@ -1747,7 +1747,7 @@
           <a:p>
             <a:fld id="{30CB22A9-0E83-4290-85DE-03AE20A6F059}" type="datetimeFigureOut">
               <a:rPr lang="en-GB" smtClean="0"/>
-              <a:t>05/11/2016</a:t>
+              <a:t>06/11/2016</a:t>
             </a:fld>
             <a:endParaRPr lang="en-GB"/>
           </a:p>
@@ -2061,7 +2061,7 @@
           <a:p>
             <a:fld id="{30CB22A9-0E83-4290-85DE-03AE20A6F059}" type="datetimeFigureOut">
               <a:rPr lang="en-GB" smtClean="0"/>
-              <a:t>05/11/2016</a:t>
+              <a:t>06/11/2016</a:t>
             </a:fld>
             <a:endParaRPr lang="en-GB"/>
           </a:p>
@@ -2454,7 +2454,7 @@
           <a:p>
             <a:fld id="{30CB22A9-0E83-4290-85DE-03AE20A6F059}" type="datetimeFigureOut">
               <a:rPr lang="en-GB" smtClean="0"/>
-              <a:t>05/11/2016</a:t>
+              <a:t>06/11/2016</a:t>
             </a:fld>
             <a:endParaRPr lang="en-GB"/>
           </a:p>
@@ -2624,7 +2624,7 @@
           <a:p>
             <a:fld id="{30CB22A9-0E83-4290-85DE-03AE20A6F059}" type="datetimeFigureOut">
               <a:rPr lang="en-GB" smtClean="0"/>
-              <a:t>05/11/2016</a:t>
+              <a:t>06/11/2016</a:t>
             </a:fld>
             <a:endParaRPr lang="en-GB"/>
           </a:p>
@@ -2804,7 +2804,7 @@
           <a:p>
             <a:fld id="{30CB22A9-0E83-4290-85DE-03AE20A6F059}" type="datetimeFigureOut">
               <a:rPr lang="en-GB" smtClean="0"/>
-              <a:t>05/11/2016</a:t>
+              <a:t>06/11/2016</a:t>
             </a:fld>
             <a:endParaRPr lang="en-GB"/>
           </a:p>
@@ -2980,7 +2980,7 @@
           <a:p>
             <a:fld id="{30CB22A9-0E83-4290-85DE-03AE20A6F059}" type="datetimeFigureOut">
               <a:rPr lang="en-GB" smtClean="0"/>
-              <a:t>05/11/2016</a:t>
+              <a:t>06/11/2016</a:t>
             </a:fld>
             <a:endParaRPr lang="en-GB"/>
           </a:p>
@@ -3227,7 +3227,7 @@
           <a:p>
             <a:fld id="{30CB22A9-0E83-4290-85DE-03AE20A6F059}" type="datetimeFigureOut">
               <a:rPr lang="en-GB" smtClean="0"/>
-              <a:t>05/11/2016</a:t>
+              <a:t>06/11/2016</a:t>
             </a:fld>
             <a:endParaRPr lang="en-GB"/>
           </a:p>
@@ -3459,7 +3459,7 @@
           <a:p>
             <a:fld id="{30CB22A9-0E83-4290-85DE-03AE20A6F059}" type="datetimeFigureOut">
               <a:rPr lang="en-GB" smtClean="0"/>
-              <a:t>05/11/2016</a:t>
+              <a:t>06/11/2016</a:t>
             </a:fld>
             <a:endParaRPr lang="en-GB"/>
           </a:p>
@@ -3833,7 +3833,7 @@
           <a:p>
             <a:fld id="{30CB22A9-0E83-4290-85DE-03AE20A6F059}" type="datetimeFigureOut">
               <a:rPr lang="en-GB" smtClean="0"/>
-              <a:t>05/11/2016</a:t>
+              <a:t>06/11/2016</a:t>
             </a:fld>
             <a:endParaRPr lang="en-GB"/>
           </a:p>
@@ -3956,7 +3956,7 @@
           <a:p>
             <a:fld id="{30CB22A9-0E83-4290-85DE-03AE20A6F059}" type="datetimeFigureOut">
               <a:rPr lang="en-GB" smtClean="0"/>
-              <a:t>05/11/2016</a:t>
+              <a:t>06/11/2016</a:t>
             </a:fld>
             <a:endParaRPr lang="en-GB"/>
           </a:p>
@@ -4051,7 +4051,7 @@
           <a:p>
             <a:fld id="{30CB22A9-0E83-4290-85DE-03AE20A6F059}" type="datetimeFigureOut">
               <a:rPr lang="en-GB" smtClean="0"/>
-              <a:t>05/11/2016</a:t>
+              <a:t>06/11/2016</a:t>
             </a:fld>
             <a:endParaRPr lang="en-GB"/>
           </a:p>
@@ -4306,7 +4306,7 @@
           <a:p>
             <a:fld id="{30CB22A9-0E83-4290-85DE-03AE20A6F059}" type="datetimeFigureOut">
               <a:rPr lang="en-GB" smtClean="0"/>
-              <a:t>05/11/2016</a:t>
+              <a:t>06/11/2016</a:t>
             </a:fld>
             <a:endParaRPr lang="en-GB"/>
           </a:p>
@@ -4569,7 +4569,7 @@
           <a:p>
             <a:fld id="{30CB22A9-0E83-4290-85DE-03AE20A6F059}" type="datetimeFigureOut">
               <a:rPr lang="en-GB" smtClean="0"/>
-              <a:t>05/11/2016</a:t>
+              <a:t>06/11/2016</a:t>
             </a:fld>
             <a:endParaRPr lang="en-GB"/>
           </a:p>
@@ -5312,7 +5312,7 @@
           <a:p>
             <a:fld id="{30CB22A9-0E83-4290-85DE-03AE20A6F059}" type="datetimeFigureOut">
               <a:rPr lang="en-GB" smtClean="0"/>
-              <a:t>05/11/2016</a:t>
+              <a:t>06/11/2016</a:t>
             </a:fld>
             <a:endParaRPr lang="en-GB"/>
           </a:p>
@@ -6084,7 +6084,6 @@
               <a:rPr lang="en-GB" dirty="0"/>
               <a:t>and do something interesting with it. </a:t>
             </a:r>
-            <a:endParaRPr lang="en-GB" dirty="0"/>
           </a:p>
         </p:txBody>
       </p:sp>
@@ -6829,6 +6828,22 @@
             </a:r>
           </a:p>
           <a:p>
+            <a:r>
+              <a:rPr lang="en-GB" dirty="0" smtClean="0"/>
+              <a:t>Ideally the QR Scanner would be self contained within the app, which due to </a:t>
+            </a:r>
+            <a:r>
+              <a:rPr lang="en-GB" smtClean="0"/>
+              <a:t>time constraints, we used a 3</a:t>
+            </a:r>
+            <a:r>
+              <a:rPr lang="en-GB" baseline="30000" smtClean="0"/>
+              <a:t>rd</a:t>
+            </a:r>
+            <a:r>
+              <a:rPr lang="en-GB" smtClean="0"/>
+              <a:t> party app.</a:t>
+            </a:r>
             <a:endParaRPr lang="en-GB" dirty="0" smtClean="0"/>
           </a:p>
           <a:p>

</xml_diff>